<commit_message>
Update to paper graphs + presentation
</commit_message>
<xml_diff>
--- a/Presentation.pptx
+++ b/Presentation.pptx
@@ -6,6 +6,11 @@
   </p:sldMasterIdLst>
   <p:sldIdLst>
     <p:sldId id="256" r:id="rId2"/>
+    <p:sldId id="257" r:id="rId3"/>
+    <p:sldId id="258" r:id="rId4"/>
+    <p:sldId id="259" r:id="rId5"/>
+    <p:sldId id="261" r:id="rId6"/>
+    <p:sldId id="262" r:id="rId7"/>
   </p:sldIdLst>
   <p:sldSz cx="12192000" cy="6858000"/>
   <p:notesSz cx="6858000" cy="9144000"/>
@@ -104,7 +109,2737 @@
       </a:defRPr>
     </a:lvl9pPr>
   </p:defaultTextStyle>
+  <p:extLst>
+    <p:ext uri="{EFAFB233-063F-42B5-8137-9DF3F51BA10A}">
+      <p15:sldGuideLst xmlns:p15="http://schemas.microsoft.com/office/powerpoint/2012/main"/>
+    </p:ext>
+  </p:extLst>
 </p:presentation>
+</file>
+
+<file path=ppt/charts/chart1.xml><?xml version="1.0" encoding="utf-8"?>
+<c:chartSpace xmlns:c="http://schemas.openxmlformats.org/drawingml/2006/chart" xmlns:a="http://schemas.openxmlformats.org/drawingml/2006/main" xmlns:r="http://schemas.openxmlformats.org/officeDocument/2006/relationships" xmlns:c16r2="http://schemas.microsoft.com/office/drawing/2015/06/chart">
+  <c:date1904 val="0"/>
+  <c:lang val="en-US"/>
+  <c:roundedCorners val="0"/>
+  <mc:AlternateContent xmlns:mc="http://schemas.openxmlformats.org/markup-compatibility/2006">
+    <mc:Choice xmlns:c14="http://schemas.microsoft.com/office/drawing/2007/8/2/chart" Requires="c14">
+      <c14:style val="102"/>
+    </mc:Choice>
+    <mc:Fallback>
+      <c:style val="2"/>
+    </mc:Fallback>
+  </mc:AlternateContent>
+  <c:chart>
+    <c:title>
+      <c:tx>
+        <c:rich>
+          <a:bodyPr rot="0" spcFirstLastPara="1" vertOverflow="ellipsis" vert="horz" wrap="square" anchor="ctr" anchorCtr="1"/>
+          <a:lstStyle/>
+          <a:p>
+            <a:pPr>
+              <a:defRPr sz="2128" b="0" i="0" u="none" strike="noStrike" kern="1200" cap="none" spc="50" normalizeH="0" baseline="0">
+                <a:solidFill>
+                  <a:schemeClr val="tx1">
+                    <a:lumMod val="65000"/>
+                    <a:lumOff val="35000"/>
+                  </a:schemeClr>
+                </a:solidFill>
+                <a:latin typeface="+mj-lt"/>
+                <a:ea typeface="+mj-ea"/>
+                <a:cs typeface="+mj-cs"/>
+              </a:defRPr>
+            </a:pPr>
+            <a:r>
+              <a:rPr lang="en-US"/>
+              <a:t>Average Number of Turns Comparing Heatmap Use</a:t>
+            </a:r>
+          </a:p>
+        </c:rich>
+      </c:tx>
+      <c:overlay val="0"/>
+      <c:spPr>
+        <a:noFill/>
+        <a:ln>
+          <a:noFill/>
+        </a:ln>
+        <a:effectLst/>
+      </c:spPr>
+      <c:txPr>
+        <a:bodyPr rot="0" spcFirstLastPara="1" vertOverflow="ellipsis" vert="horz" wrap="square" anchor="ctr" anchorCtr="1"/>
+        <a:lstStyle/>
+        <a:p>
+          <a:pPr>
+            <a:defRPr sz="2128" b="0" i="0" u="none" strike="noStrike" kern="1200" cap="none" spc="50" normalizeH="0" baseline="0">
+              <a:solidFill>
+                <a:schemeClr val="tx1">
+                  <a:lumMod val="65000"/>
+                  <a:lumOff val="35000"/>
+                </a:schemeClr>
+              </a:solidFill>
+              <a:latin typeface="+mj-lt"/>
+              <a:ea typeface="+mj-ea"/>
+              <a:cs typeface="+mj-cs"/>
+            </a:defRPr>
+          </a:pPr>
+          <a:endParaRPr lang="en-US"/>
+        </a:p>
+      </c:txPr>
+    </c:title>
+    <c:autoTitleDeleted val="0"/>
+    <c:plotArea>
+      <c:layout/>
+      <c:barChart>
+        <c:barDir val="col"/>
+        <c:grouping val="clustered"/>
+        <c:varyColors val="0"/>
+        <c:ser>
+          <c:idx val="0"/>
+          <c:order val="0"/>
+          <c:spPr>
+            <a:solidFill>
+              <a:schemeClr val="accent1">
+                <a:alpha val="70000"/>
+              </a:schemeClr>
+            </a:solidFill>
+            <a:ln>
+              <a:noFill/>
+            </a:ln>
+            <a:effectLst/>
+          </c:spPr>
+          <c:invertIfNegative val="0"/>
+          <c:cat>
+            <c:strRef>
+              <c:f>Sheet1!$F$1003:$I$1003</c:f>
+              <c:strCache>
+                <c:ptCount val="4"/>
+                <c:pt idx="0">
+                  <c:v>Random Strafing and Cleanup</c:v>
+                </c:pt>
+                <c:pt idx="1">
+                  <c:v>Random Cleanup</c:v>
+                </c:pt>
+                <c:pt idx="2">
+                  <c:v>Heatmap</c:v>
+                </c:pt>
+                <c:pt idx="3">
+                  <c:v>Random Strafing</c:v>
+                </c:pt>
+              </c:strCache>
+            </c:strRef>
+          </c:cat>
+          <c:val>
+            <c:numRef>
+              <c:f>Sheet1!$F$1004:$I$1004</c:f>
+              <c:numCache>
+                <c:formatCode>General</c:formatCode>
+                <c:ptCount val="4"/>
+                <c:pt idx="0">
+                  <c:v>125.5022</c:v>
+                </c:pt>
+                <c:pt idx="1">
+                  <c:v>125.44764000000001</c:v>
+                </c:pt>
+                <c:pt idx="2">
+                  <c:v>125.27654</c:v>
+                </c:pt>
+                <c:pt idx="3">
+                  <c:v>125.54266</c:v>
+                </c:pt>
+              </c:numCache>
+            </c:numRef>
+          </c:val>
+          <c:extLst>
+            <c:ext xmlns:c16="http://schemas.microsoft.com/office/drawing/2014/chart" uri="{C3380CC4-5D6E-409C-BE32-E72D297353CC}">
+              <c16:uniqueId val="{00000000-01CA-425F-B87A-592A38CC0CC7}"/>
+            </c:ext>
+          </c:extLst>
+        </c:ser>
+        <c:dLbls>
+          <c:showLegendKey val="0"/>
+          <c:showVal val="0"/>
+          <c:showCatName val="0"/>
+          <c:showSerName val="0"/>
+          <c:showPercent val="0"/>
+          <c:showBubbleSize val="0"/>
+        </c:dLbls>
+        <c:gapWidth val="80"/>
+        <c:overlap val="25"/>
+        <c:axId val="454834143"/>
+        <c:axId val="443027039"/>
+      </c:barChart>
+      <c:catAx>
+        <c:axId val="454834143"/>
+        <c:scaling>
+          <c:orientation val="minMax"/>
+        </c:scaling>
+        <c:delete val="0"/>
+        <c:axPos val="b"/>
+        <c:numFmt formatCode="General" sourceLinked="1"/>
+        <c:majorTickMark val="none"/>
+        <c:minorTickMark val="none"/>
+        <c:tickLblPos val="nextTo"/>
+        <c:spPr>
+          <a:noFill/>
+          <a:ln w="15875" cap="flat" cmpd="sng" algn="ctr">
+            <a:solidFill>
+              <a:schemeClr val="tx1">
+                <a:lumMod val="25000"/>
+                <a:lumOff val="75000"/>
+              </a:schemeClr>
+            </a:solidFill>
+            <a:round/>
+          </a:ln>
+          <a:effectLst/>
+        </c:spPr>
+        <c:txPr>
+          <a:bodyPr rot="-60000000" spcFirstLastPara="1" vertOverflow="ellipsis" vert="horz" wrap="square" anchor="ctr" anchorCtr="1"/>
+          <a:lstStyle/>
+          <a:p>
+            <a:pPr>
+              <a:defRPr sz="1197" b="0" i="0" u="none" strike="noStrike" kern="1200" cap="none" spc="20" normalizeH="0" baseline="0">
+                <a:solidFill>
+                  <a:schemeClr val="tx1">
+                    <a:lumMod val="65000"/>
+                    <a:lumOff val="35000"/>
+                  </a:schemeClr>
+                </a:solidFill>
+                <a:latin typeface="+mn-lt"/>
+                <a:ea typeface="+mn-ea"/>
+                <a:cs typeface="+mn-cs"/>
+              </a:defRPr>
+            </a:pPr>
+            <a:endParaRPr lang="en-US"/>
+          </a:p>
+        </c:txPr>
+        <c:crossAx val="443027039"/>
+        <c:crosses val="autoZero"/>
+        <c:auto val="1"/>
+        <c:lblAlgn val="ctr"/>
+        <c:lblOffset val="100"/>
+        <c:noMultiLvlLbl val="0"/>
+      </c:catAx>
+      <c:valAx>
+        <c:axId val="443027039"/>
+        <c:scaling>
+          <c:orientation val="minMax"/>
+        </c:scaling>
+        <c:delete val="0"/>
+        <c:axPos val="l"/>
+        <c:majorGridlines>
+          <c:spPr>
+            <a:ln w="9525" cap="flat" cmpd="sng" algn="ctr">
+              <a:solidFill>
+                <a:schemeClr val="tx1">
+                  <a:lumMod val="5000"/>
+                  <a:lumOff val="95000"/>
+                </a:schemeClr>
+              </a:solidFill>
+              <a:round/>
+            </a:ln>
+            <a:effectLst/>
+          </c:spPr>
+        </c:majorGridlines>
+        <c:title>
+          <c:tx>
+            <c:rich>
+              <a:bodyPr rot="-5400000" spcFirstLastPara="1" vertOverflow="ellipsis" vert="horz" wrap="square" anchor="ctr" anchorCtr="1"/>
+              <a:lstStyle/>
+              <a:p>
+                <a:pPr>
+                  <a:defRPr sz="1197" b="0" i="0" u="none" strike="noStrike" kern="1200" cap="all" baseline="0">
+                    <a:solidFill>
+                      <a:schemeClr val="tx1">
+                        <a:lumMod val="65000"/>
+                        <a:lumOff val="35000"/>
+                      </a:schemeClr>
+                    </a:solidFill>
+                    <a:latin typeface="+mn-lt"/>
+                    <a:ea typeface="+mn-ea"/>
+                    <a:cs typeface="+mn-cs"/>
+                  </a:defRPr>
+                </a:pPr>
+                <a:r>
+                  <a:rPr lang="en-US" dirty="0"/>
+                  <a:t>Number of turns</a:t>
+                </a:r>
+              </a:p>
+            </c:rich>
+          </c:tx>
+          <c:overlay val="0"/>
+          <c:spPr>
+            <a:noFill/>
+            <a:ln>
+              <a:noFill/>
+            </a:ln>
+            <a:effectLst/>
+          </c:spPr>
+          <c:txPr>
+            <a:bodyPr rot="-5400000" spcFirstLastPara="1" vertOverflow="ellipsis" vert="horz" wrap="square" anchor="ctr" anchorCtr="1"/>
+            <a:lstStyle/>
+            <a:p>
+              <a:pPr>
+                <a:defRPr sz="1197" b="0" i="0" u="none" strike="noStrike" kern="1200" cap="all" baseline="0">
+                  <a:solidFill>
+                    <a:schemeClr val="tx1">
+                      <a:lumMod val="65000"/>
+                      <a:lumOff val="35000"/>
+                    </a:schemeClr>
+                  </a:solidFill>
+                  <a:latin typeface="+mn-lt"/>
+                  <a:ea typeface="+mn-ea"/>
+                  <a:cs typeface="+mn-cs"/>
+                </a:defRPr>
+              </a:pPr>
+              <a:endParaRPr lang="en-US"/>
+            </a:p>
+          </c:txPr>
+        </c:title>
+        <c:numFmt formatCode="General" sourceLinked="1"/>
+        <c:majorTickMark val="none"/>
+        <c:minorTickMark val="none"/>
+        <c:tickLblPos val="nextTo"/>
+        <c:spPr>
+          <a:noFill/>
+          <a:ln>
+            <a:noFill/>
+          </a:ln>
+          <a:effectLst/>
+        </c:spPr>
+        <c:txPr>
+          <a:bodyPr rot="-60000000" spcFirstLastPara="1" vertOverflow="ellipsis" vert="horz" wrap="square" anchor="ctr" anchorCtr="1"/>
+          <a:lstStyle/>
+          <a:p>
+            <a:pPr>
+              <a:defRPr sz="1197" b="0" i="0" u="none" strike="noStrike" kern="1200" spc="20" baseline="0">
+                <a:solidFill>
+                  <a:schemeClr val="tx1">
+                    <a:lumMod val="65000"/>
+                    <a:lumOff val="35000"/>
+                  </a:schemeClr>
+                </a:solidFill>
+                <a:latin typeface="+mn-lt"/>
+                <a:ea typeface="+mn-ea"/>
+                <a:cs typeface="+mn-cs"/>
+              </a:defRPr>
+            </a:pPr>
+            <a:endParaRPr lang="en-US"/>
+          </a:p>
+        </c:txPr>
+        <c:crossAx val="454834143"/>
+        <c:crosses val="autoZero"/>
+        <c:crossBetween val="between"/>
+      </c:valAx>
+      <c:spPr>
+        <a:noFill/>
+        <a:ln>
+          <a:noFill/>
+        </a:ln>
+        <a:effectLst/>
+      </c:spPr>
+    </c:plotArea>
+    <c:plotVisOnly val="1"/>
+    <c:dispBlanksAs val="gap"/>
+    <c:extLst>
+      <c:ext xmlns:c16r3="http://schemas.microsoft.com/office/drawing/2017/03/chart" uri="{56B9EC1D-385E-4148-901F-78D8002777C0}">
+        <c16r3:dataDisplayOptions16>
+          <c16r3:dispNaAsBlank val="1"/>
+        </c16r3:dataDisplayOptions16>
+      </c:ext>
+    </c:extLst>
+    <c:showDLblsOverMax val="0"/>
+  </c:chart>
+  <c:spPr>
+    <a:noFill/>
+    <a:ln>
+      <a:noFill/>
+    </a:ln>
+    <a:effectLst/>
+  </c:spPr>
+  <c:txPr>
+    <a:bodyPr/>
+    <a:lstStyle/>
+    <a:p>
+      <a:pPr>
+        <a:defRPr/>
+      </a:pPr>
+      <a:endParaRPr lang="en-US"/>
+    </a:p>
+  </c:txPr>
+  <c:externalData r:id="rId3">
+    <c:autoUpdate val="0"/>
+  </c:externalData>
+</c:chartSpace>
+</file>
+
+<file path=ppt/charts/chart2.xml><?xml version="1.0" encoding="utf-8"?>
+<c:chartSpace xmlns:c="http://schemas.openxmlformats.org/drawingml/2006/chart" xmlns:a="http://schemas.openxmlformats.org/drawingml/2006/main" xmlns:r="http://schemas.openxmlformats.org/officeDocument/2006/relationships" xmlns:c16r2="http://schemas.microsoft.com/office/drawing/2015/06/chart">
+  <c:date1904 val="0"/>
+  <c:lang val="en-US"/>
+  <c:roundedCorners val="0"/>
+  <mc:AlternateContent xmlns:mc="http://schemas.openxmlformats.org/markup-compatibility/2006">
+    <mc:Choice xmlns:c14="http://schemas.microsoft.com/office/drawing/2007/8/2/chart" Requires="c14">
+      <c14:style val="102"/>
+    </mc:Choice>
+    <mc:Fallback>
+      <c:style val="2"/>
+    </mc:Fallback>
+  </mc:AlternateContent>
+  <c:chart>
+    <c:title>
+      <c:tx>
+        <c:rich>
+          <a:bodyPr rot="0" spcFirstLastPara="1" vertOverflow="ellipsis" vert="horz" wrap="square" anchor="ctr" anchorCtr="1"/>
+          <a:lstStyle/>
+          <a:p>
+            <a:pPr>
+              <a:defRPr sz="2128" b="0" i="0" u="none" strike="noStrike" kern="1200" cap="none" spc="50" normalizeH="0" baseline="0">
+                <a:solidFill>
+                  <a:schemeClr val="tx1">
+                    <a:lumMod val="65000"/>
+                    <a:lumOff val="35000"/>
+                  </a:schemeClr>
+                </a:solidFill>
+                <a:latin typeface="+mj-lt"/>
+                <a:ea typeface="+mj-ea"/>
+                <a:cs typeface="+mj-cs"/>
+              </a:defRPr>
+            </a:pPr>
+            <a:r>
+              <a:rPr lang="en-US"/>
+              <a:t>Average Number of Turns for AI Comparing Shot Placement</a:t>
+            </a:r>
+          </a:p>
+        </c:rich>
+      </c:tx>
+      <c:overlay val="0"/>
+      <c:spPr>
+        <a:noFill/>
+        <a:ln>
+          <a:noFill/>
+        </a:ln>
+        <a:effectLst/>
+      </c:spPr>
+      <c:txPr>
+        <a:bodyPr rot="0" spcFirstLastPara="1" vertOverflow="ellipsis" vert="horz" wrap="square" anchor="ctr" anchorCtr="1"/>
+        <a:lstStyle/>
+        <a:p>
+          <a:pPr>
+            <a:defRPr sz="2128" b="0" i="0" u="none" strike="noStrike" kern="1200" cap="none" spc="50" normalizeH="0" baseline="0">
+              <a:solidFill>
+                <a:schemeClr val="tx1">
+                  <a:lumMod val="65000"/>
+                  <a:lumOff val="35000"/>
+                </a:schemeClr>
+              </a:solidFill>
+              <a:latin typeface="+mj-lt"/>
+              <a:ea typeface="+mj-ea"/>
+              <a:cs typeface="+mj-cs"/>
+            </a:defRPr>
+          </a:pPr>
+          <a:endParaRPr lang="en-US"/>
+        </a:p>
+      </c:txPr>
+    </c:title>
+    <c:autoTitleDeleted val="0"/>
+    <c:plotArea>
+      <c:layout/>
+      <c:barChart>
+        <c:barDir val="col"/>
+        <c:grouping val="clustered"/>
+        <c:varyColors val="0"/>
+        <c:ser>
+          <c:idx val="0"/>
+          <c:order val="0"/>
+          <c:tx>
+            <c:strRef>
+              <c:f>Sheet1!$A$1004</c:f>
+              <c:strCache>
+                <c:ptCount val="1"/>
+                <c:pt idx="0">
+                  <c:v>Average:</c:v>
+                </c:pt>
+              </c:strCache>
+            </c:strRef>
+          </c:tx>
+          <c:spPr>
+            <a:solidFill>
+              <a:schemeClr val="accent1">
+                <a:alpha val="70000"/>
+              </a:schemeClr>
+            </a:solidFill>
+            <a:ln>
+              <a:noFill/>
+            </a:ln>
+            <a:effectLst/>
+          </c:spPr>
+          <c:invertIfNegative val="0"/>
+          <c:cat>
+            <c:strRef>
+              <c:f>Sheet1!$B$1003:$E$1003</c:f>
+              <c:strCache>
+                <c:ptCount val="4"/>
+                <c:pt idx="0">
+                  <c:v>Strafing + Cleanup</c:v>
+                </c:pt>
+                <c:pt idx="1">
+                  <c:v>Strafing</c:v>
+                </c:pt>
+                <c:pt idx="2">
+                  <c:v>Random + Parity</c:v>
+                </c:pt>
+                <c:pt idx="3">
+                  <c:v>Random</c:v>
+                </c:pt>
+              </c:strCache>
+            </c:strRef>
+          </c:cat>
+          <c:val>
+            <c:numRef>
+              <c:f>Sheet1!$B$1004:$E$1004</c:f>
+              <c:numCache>
+                <c:formatCode>General</c:formatCode>
+                <c:ptCount val="4"/>
+                <c:pt idx="0">
+                  <c:v>91.792000000000002</c:v>
+                </c:pt>
+                <c:pt idx="1">
+                  <c:v>92.495000000000005</c:v>
+                </c:pt>
+                <c:pt idx="2">
+                  <c:v>97.457999999999998</c:v>
+                </c:pt>
+                <c:pt idx="3">
+                  <c:v>107.24</c:v>
+                </c:pt>
+              </c:numCache>
+            </c:numRef>
+          </c:val>
+          <c:extLst>
+            <c:ext xmlns:c16="http://schemas.microsoft.com/office/drawing/2014/chart" uri="{C3380CC4-5D6E-409C-BE32-E72D297353CC}">
+              <c16:uniqueId val="{00000000-1B6A-4ED3-B2A9-1E1BD115221B}"/>
+            </c:ext>
+          </c:extLst>
+        </c:ser>
+        <c:dLbls>
+          <c:showLegendKey val="0"/>
+          <c:showVal val="0"/>
+          <c:showCatName val="0"/>
+          <c:showSerName val="0"/>
+          <c:showPercent val="0"/>
+          <c:showBubbleSize val="0"/>
+        </c:dLbls>
+        <c:gapWidth val="80"/>
+        <c:overlap val="25"/>
+        <c:axId val="1956303120"/>
+        <c:axId val="2010494464"/>
+      </c:barChart>
+      <c:catAx>
+        <c:axId val="1956303120"/>
+        <c:scaling>
+          <c:orientation val="minMax"/>
+        </c:scaling>
+        <c:delete val="0"/>
+        <c:axPos val="b"/>
+        <c:numFmt formatCode="General" sourceLinked="1"/>
+        <c:majorTickMark val="none"/>
+        <c:minorTickMark val="none"/>
+        <c:tickLblPos val="nextTo"/>
+        <c:spPr>
+          <a:noFill/>
+          <a:ln w="15875" cap="flat" cmpd="sng" algn="ctr">
+            <a:solidFill>
+              <a:schemeClr val="tx1">
+                <a:lumMod val="25000"/>
+                <a:lumOff val="75000"/>
+              </a:schemeClr>
+            </a:solidFill>
+            <a:round/>
+          </a:ln>
+          <a:effectLst/>
+        </c:spPr>
+        <c:txPr>
+          <a:bodyPr rot="-60000000" spcFirstLastPara="1" vertOverflow="ellipsis" vert="horz" wrap="square" anchor="ctr" anchorCtr="1"/>
+          <a:lstStyle/>
+          <a:p>
+            <a:pPr>
+              <a:defRPr sz="1197" b="0" i="0" u="none" strike="noStrike" kern="1200" cap="none" spc="20" normalizeH="0" baseline="0">
+                <a:solidFill>
+                  <a:schemeClr val="tx1">
+                    <a:lumMod val="65000"/>
+                    <a:lumOff val="35000"/>
+                  </a:schemeClr>
+                </a:solidFill>
+                <a:latin typeface="+mn-lt"/>
+                <a:ea typeface="+mn-ea"/>
+                <a:cs typeface="+mn-cs"/>
+              </a:defRPr>
+            </a:pPr>
+            <a:endParaRPr lang="en-US"/>
+          </a:p>
+        </c:txPr>
+        <c:crossAx val="2010494464"/>
+        <c:crosses val="autoZero"/>
+        <c:auto val="1"/>
+        <c:lblAlgn val="ctr"/>
+        <c:lblOffset val="100"/>
+        <c:noMultiLvlLbl val="0"/>
+      </c:catAx>
+      <c:valAx>
+        <c:axId val="2010494464"/>
+        <c:scaling>
+          <c:orientation val="minMax"/>
+        </c:scaling>
+        <c:delete val="0"/>
+        <c:axPos val="l"/>
+        <c:majorGridlines>
+          <c:spPr>
+            <a:ln w="9525" cap="flat" cmpd="sng" algn="ctr">
+              <a:solidFill>
+                <a:schemeClr val="tx1">
+                  <a:lumMod val="5000"/>
+                  <a:lumOff val="95000"/>
+                </a:schemeClr>
+              </a:solidFill>
+              <a:round/>
+            </a:ln>
+            <a:effectLst/>
+          </c:spPr>
+        </c:majorGridlines>
+        <c:title>
+          <c:tx>
+            <c:rich>
+              <a:bodyPr rot="-5400000" spcFirstLastPara="1" vertOverflow="ellipsis" vert="horz" wrap="square" anchor="ctr" anchorCtr="1"/>
+              <a:lstStyle/>
+              <a:p>
+                <a:pPr>
+                  <a:defRPr sz="1197" b="0" i="0" u="none" strike="noStrike" kern="1200" cap="all" baseline="0">
+                    <a:solidFill>
+                      <a:schemeClr val="tx1">
+                        <a:lumMod val="65000"/>
+                        <a:lumOff val="35000"/>
+                      </a:schemeClr>
+                    </a:solidFill>
+                    <a:latin typeface="+mn-lt"/>
+                    <a:ea typeface="+mn-ea"/>
+                    <a:cs typeface="+mn-cs"/>
+                  </a:defRPr>
+                </a:pPr>
+                <a:r>
+                  <a:rPr lang="en-US"/>
+                  <a:t>Number of turns</a:t>
+                </a:r>
+              </a:p>
+            </c:rich>
+          </c:tx>
+          <c:overlay val="0"/>
+          <c:spPr>
+            <a:noFill/>
+            <a:ln>
+              <a:noFill/>
+            </a:ln>
+            <a:effectLst/>
+          </c:spPr>
+          <c:txPr>
+            <a:bodyPr rot="-5400000" spcFirstLastPara="1" vertOverflow="ellipsis" vert="horz" wrap="square" anchor="ctr" anchorCtr="1"/>
+            <a:lstStyle/>
+            <a:p>
+              <a:pPr>
+                <a:defRPr sz="1197" b="0" i="0" u="none" strike="noStrike" kern="1200" cap="all" baseline="0">
+                  <a:solidFill>
+                    <a:schemeClr val="tx1">
+                      <a:lumMod val="65000"/>
+                      <a:lumOff val="35000"/>
+                    </a:schemeClr>
+                  </a:solidFill>
+                  <a:latin typeface="+mn-lt"/>
+                  <a:ea typeface="+mn-ea"/>
+                  <a:cs typeface="+mn-cs"/>
+                </a:defRPr>
+              </a:pPr>
+              <a:endParaRPr lang="en-US"/>
+            </a:p>
+          </c:txPr>
+        </c:title>
+        <c:numFmt formatCode="General" sourceLinked="1"/>
+        <c:majorTickMark val="none"/>
+        <c:minorTickMark val="none"/>
+        <c:tickLblPos val="nextTo"/>
+        <c:spPr>
+          <a:noFill/>
+          <a:ln>
+            <a:noFill/>
+          </a:ln>
+          <a:effectLst/>
+        </c:spPr>
+        <c:txPr>
+          <a:bodyPr rot="-60000000" spcFirstLastPara="1" vertOverflow="ellipsis" vert="horz" wrap="square" anchor="ctr" anchorCtr="1"/>
+          <a:lstStyle/>
+          <a:p>
+            <a:pPr>
+              <a:defRPr sz="1197" b="0" i="0" u="none" strike="noStrike" kern="1200" spc="20" baseline="0">
+                <a:solidFill>
+                  <a:schemeClr val="tx1">
+                    <a:lumMod val="65000"/>
+                    <a:lumOff val="35000"/>
+                  </a:schemeClr>
+                </a:solidFill>
+                <a:latin typeface="+mn-lt"/>
+                <a:ea typeface="+mn-ea"/>
+                <a:cs typeface="+mn-cs"/>
+              </a:defRPr>
+            </a:pPr>
+            <a:endParaRPr lang="en-US"/>
+          </a:p>
+        </c:txPr>
+        <c:crossAx val="1956303120"/>
+        <c:crosses val="autoZero"/>
+        <c:crossBetween val="between"/>
+      </c:valAx>
+      <c:spPr>
+        <a:noFill/>
+        <a:ln>
+          <a:noFill/>
+        </a:ln>
+        <a:effectLst/>
+      </c:spPr>
+    </c:plotArea>
+    <c:plotVisOnly val="1"/>
+    <c:dispBlanksAs val="gap"/>
+    <c:extLst>
+      <c:ext xmlns:c16r3="http://schemas.microsoft.com/office/drawing/2017/03/chart" uri="{56B9EC1D-385E-4148-901F-78D8002777C0}">
+        <c16r3:dataDisplayOptions16>
+          <c16r3:dispNaAsBlank val="1"/>
+        </c16r3:dataDisplayOptions16>
+      </c:ext>
+    </c:extLst>
+    <c:showDLblsOverMax val="0"/>
+  </c:chart>
+  <c:spPr>
+    <a:noFill/>
+    <a:ln>
+      <a:noFill/>
+    </a:ln>
+    <a:effectLst/>
+  </c:spPr>
+  <c:txPr>
+    <a:bodyPr/>
+    <a:lstStyle/>
+    <a:p>
+      <a:pPr>
+        <a:defRPr/>
+      </a:pPr>
+      <a:endParaRPr lang="en-US"/>
+    </a:p>
+  </c:txPr>
+  <c:externalData r:id="rId3">
+    <c:autoUpdate val="0"/>
+  </c:externalData>
+</c:chartSpace>
+</file>
+
+<file path=ppt/charts/chart3.xml><?xml version="1.0" encoding="utf-8"?>
+<c:chartSpace xmlns:c="http://schemas.openxmlformats.org/drawingml/2006/chart" xmlns:a="http://schemas.openxmlformats.org/drawingml/2006/main" xmlns:r="http://schemas.openxmlformats.org/officeDocument/2006/relationships" xmlns:c16r2="http://schemas.microsoft.com/office/drawing/2015/06/chart">
+  <c:date1904 val="0"/>
+  <c:lang val="en-US"/>
+  <c:roundedCorners val="0"/>
+  <mc:AlternateContent xmlns:mc="http://schemas.openxmlformats.org/markup-compatibility/2006">
+    <mc:Choice xmlns:c14="http://schemas.microsoft.com/office/drawing/2007/8/2/chart" Requires="c14">
+      <c14:style val="102"/>
+    </mc:Choice>
+    <mc:Fallback>
+      <c:style val="2"/>
+    </mc:Fallback>
+  </mc:AlternateContent>
+  <c:chart>
+    <c:title>
+      <c:tx>
+        <c:rich>
+          <a:bodyPr rot="0" spcFirstLastPara="1" vertOverflow="ellipsis" vert="horz" wrap="square" anchor="ctr" anchorCtr="1"/>
+          <a:lstStyle/>
+          <a:p>
+            <a:pPr>
+              <a:defRPr sz="1862" b="0" i="0" u="none" strike="noStrike" kern="1200" cap="none" spc="20" baseline="0">
+                <a:solidFill>
+                  <a:schemeClr val="tx1">
+                    <a:lumMod val="50000"/>
+                    <a:lumOff val="50000"/>
+                  </a:schemeClr>
+                </a:solidFill>
+                <a:latin typeface="+mn-lt"/>
+                <a:ea typeface="+mn-ea"/>
+                <a:cs typeface="+mn-cs"/>
+              </a:defRPr>
+            </a:pPr>
+            <a:r>
+              <a:rPr lang="en-US"/>
+              <a:t>Average Number of Turns Comparing AI Logical Capabilities</a:t>
+            </a:r>
+          </a:p>
+        </c:rich>
+      </c:tx>
+      <c:overlay val="0"/>
+      <c:spPr>
+        <a:noFill/>
+        <a:ln>
+          <a:noFill/>
+        </a:ln>
+        <a:effectLst/>
+      </c:spPr>
+      <c:txPr>
+        <a:bodyPr rot="0" spcFirstLastPara="1" vertOverflow="ellipsis" vert="horz" wrap="square" anchor="ctr" anchorCtr="1"/>
+        <a:lstStyle/>
+        <a:p>
+          <a:pPr>
+            <a:defRPr sz="1862" b="0" i="0" u="none" strike="noStrike" kern="1200" cap="none" spc="20" baseline="0">
+              <a:solidFill>
+                <a:schemeClr val="tx1">
+                  <a:lumMod val="50000"/>
+                  <a:lumOff val="50000"/>
+                </a:schemeClr>
+              </a:solidFill>
+              <a:latin typeface="+mn-lt"/>
+              <a:ea typeface="+mn-ea"/>
+              <a:cs typeface="+mn-cs"/>
+            </a:defRPr>
+          </a:pPr>
+          <a:endParaRPr lang="en-US"/>
+        </a:p>
+      </c:txPr>
+    </c:title>
+    <c:autoTitleDeleted val="0"/>
+    <c:plotArea>
+      <c:layout/>
+      <c:barChart>
+        <c:barDir val="col"/>
+        <c:grouping val="clustered"/>
+        <c:varyColors val="0"/>
+        <c:ser>
+          <c:idx val="0"/>
+          <c:order val="0"/>
+          <c:spPr>
+            <a:gradFill rotWithShape="1">
+              <a:gsLst>
+                <a:gs pos="0">
+                  <a:schemeClr val="accent1">
+                    <a:lumMod val="110000"/>
+                    <a:satMod val="105000"/>
+                    <a:tint val="67000"/>
+                  </a:schemeClr>
+                </a:gs>
+                <a:gs pos="50000">
+                  <a:schemeClr val="accent1">
+                    <a:lumMod val="105000"/>
+                    <a:satMod val="103000"/>
+                    <a:tint val="73000"/>
+                  </a:schemeClr>
+                </a:gs>
+                <a:gs pos="100000">
+                  <a:schemeClr val="accent1">
+                    <a:lumMod val="105000"/>
+                    <a:satMod val="109000"/>
+                    <a:tint val="81000"/>
+                  </a:schemeClr>
+                </a:gs>
+              </a:gsLst>
+              <a:lin ang="5400000" scaled="0"/>
+            </a:gradFill>
+            <a:ln w="9525" cap="flat" cmpd="sng" algn="ctr">
+              <a:solidFill>
+                <a:schemeClr val="accent1">
+                  <a:shade val="95000"/>
+                </a:schemeClr>
+              </a:solidFill>
+              <a:round/>
+            </a:ln>
+            <a:effectLst/>
+          </c:spPr>
+          <c:invertIfNegative val="0"/>
+          <c:cat>
+            <c:strRef>
+              <c:f>Sheet1!$K$1018:$M$1018</c:f>
+              <c:strCache>
+                <c:ptCount val="3"/>
+                <c:pt idx="0">
+                  <c:v>Revisiting Suspicious Areas</c:v>
+                </c:pt>
+                <c:pt idx="1">
+                  <c:v>Not Revisiting Suspicious Areas</c:v>
+                </c:pt>
+                <c:pt idx="2">
+                  <c:v>Not Hopping Over Previous Hits</c:v>
+                </c:pt>
+              </c:strCache>
+            </c:strRef>
+          </c:cat>
+          <c:val>
+            <c:numRef>
+              <c:f>Sheet1!$K$1019:$M$1019</c:f>
+              <c:numCache>
+                <c:formatCode>General</c:formatCode>
+                <c:ptCount val="3"/>
+                <c:pt idx="0">
+                  <c:v>125.27654</c:v>
+                </c:pt>
+                <c:pt idx="1">
+                  <c:v>130.83655999999999</c:v>
+                </c:pt>
+                <c:pt idx="2">
+                  <c:v>137.99258</c:v>
+                </c:pt>
+              </c:numCache>
+            </c:numRef>
+          </c:val>
+          <c:extLst>
+            <c:ext xmlns:c16="http://schemas.microsoft.com/office/drawing/2014/chart" uri="{C3380CC4-5D6E-409C-BE32-E72D297353CC}">
+              <c16:uniqueId val="{00000000-4194-4DF9-95C8-9E995A85344E}"/>
+            </c:ext>
+          </c:extLst>
+        </c:ser>
+        <c:dLbls>
+          <c:showLegendKey val="0"/>
+          <c:showVal val="0"/>
+          <c:showCatName val="0"/>
+          <c:showSerName val="0"/>
+          <c:showPercent val="0"/>
+          <c:showBubbleSize val="0"/>
+        </c:dLbls>
+        <c:gapWidth val="100"/>
+        <c:overlap val="-24"/>
+        <c:axId val="38424447"/>
+        <c:axId val="317081855"/>
+      </c:barChart>
+      <c:catAx>
+        <c:axId val="38424447"/>
+        <c:scaling>
+          <c:orientation val="minMax"/>
+        </c:scaling>
+        <c:delete val="0"/>
+        <c:axPos val="b"/>
+        <c:numFmt formatCode="General" sourceLinked="1"/>
+        <c:majorTickMark val="none"/>
+        <c:minorTickMark val="none"/>
+        <c:tickLblPos val="nextTo"/>
+        <c:spPr>
+          <a:noFill/>
+          <a:ln w="9525" cap="flat" cmpd="sng" algn="ctr">
+            <a:solidFill>
+              <a:schemeClr val="tx1">
+                <a:lumMod val="15000"/>
+                <a:lumOff val="85000"/>
+              </a:schemeClr>
+            </a:solidFill>
+            <a:round/>
+          </a:ln>
+          <a:effectLst/>
+        </c:spPr>
+        <c:txPr>
+          <a:bodyPr rot="-60000000" spcFirstLastPara="1" vertOverflow="ellipsis" vert="horz" wrap="square" anchor="ctr" anchorCtr="1"/>
+          <a:lstStyle/>
+          <a:p>
+            <a:pPr>
+              <a:defRPr sz="1197" b="0" i="0" u="none" strike="noStrike" kern="1200" baseline="0">
+                <a:solidFill>
+                  <a:schemeClr val="tx1">
+                    <a:lumMod val="50000"/>
+                    <a:lumOff val="50000"/>
+                  </a:schemeClr>
+                </a:solidFill>
+                <a:latin typeface="+mn-lt"/>
+                <a:ea typeface="+mn-ea"/>
+                <a:cs typeface="+mn-cs"/>
+              </a:defRPr>
+            </a:pPr>
+            <a:endParaRPr lang="en-US"/>
+          </a:p>
+        </c:txPr>
+        <c:crossAx val="317081855"/>
+        <c:crosses val="autoZero"/>
+        <c:auto val="1"/>
+        <c:lblAlgn val="ctr"/>
+        <c:lblOffset val="100"/>
+        <c:noMultiLvlLbl val="0"/>
+      </c:catAx>
+      <c:valAx>
+        <c:axId val="317081855"/>
+        <c:scaling>
+          <c:orientation val="minMax"/>
+        </c:scaling>
+        <c:delete val="0"/>
+        <c:axPos val="l"/>
+        <c:majorGridlines>
+          <c:spPr>
+            <a:ln w="9525" cap="flat" cmpd="sng" algn="ctr">
+              <a:solidFill>
+                <a:schemeClr val="tx1">
+                  <a:lumMod val="15000"/>
+                  <a:lumOff val="85000"/>
+                </a:schemeClr>
+              </a:solidFill>
+              <a:round/>
+            </a:ln>
+            <a:effectLst/>
+          </c:spPr>
+        </c:majorGridlines>
+        <c:title>
+          <c:tx>
+            <c:rich>
+              <a:bodyPr rot="-5400000" spcFirstLastPara="1" vertOverflow="ellipsis" vert="horz" wrap="square" anchor="ctr" anchorCtr="1"/>
+              <a:lstStyle/>
+              <a:p>
+                <a:pPr>
+                  <a:defRPr sz="1197" b="0" i="0" u="none" strike="noStrike" kern="1200" cap="all" baseline="0">
+                    <a:solidFill>
+                      <a:schemeClr val="tx1">
+                        <a:lumMod val="50000"/>
+                        <a:lumOff val="50000"/>
+                      </a:schemeClr>
+                    </a:solidFill>
+                    <a:latin typeface="+mn-lt"/>
+                    <a:ea typeface="+mn-ea"/>
+                    <a:cs typeface="+mn-cs"/>
+                  </a:defRPr>
+                </a:pPr>
+                <a:r>
+                  <a:rPr lang="en-US"/>
+                  <a:t>Number of turns</a:t>
+                </a:r>
+              </a:p>
+            </c:rich>
+          </c:tx>
+          <c:overlay val="0"/>
+          <c:spPr>
+            <a:noFill/>
+            <a:ln>
+              <a:noFill/>
+            </a:ln>
+            <a:effectLst/>
+          </c:spPr>
+          <c:txPr>
+            <a:bodyPr rot="-5400000" spcFirstLastPara="1" vertOverflow="ellipsis" vert="horz" wrap="square" anchor="ctr" anchorCtr="1"/>
+            <a:lstStyle/>
+            <a:p>
+              <a:pPr>
+                <a:defRPr sz="1197" b="0" i="0" u="none" strike="noStrike" kern="1200" cap="all" baseline="0">
+                  <a:solidFill>
+                    <a:schemeClr val="tx1">
+                      <a:lumMod val="50000"/>
+                      <a:lumOff val="50000"/>
+                    </a:schemeClr>
+                  </a:solidFill>
+                  <a:latin typeface="+mn-lt"/>
+                  <a:ea typeface="+mn-ea"/>
+                  <a:cs typeface="+mn-cs"/>
+                </a:defRPr>
+              </a:pPr>
+              <a:endParaRPr lang="en-US"/>
+            </a:p>
+          </c:txPr>
+        </c:title>
+        <c:numFmt formatCode="General" sourceLinked="1"/>
+        <c:majorTickMark val="none"/>
+        <c:minorTickMark val="none"/>
+        <c:tickLblPos val="nextTo"/>
+        <c:spPr>
+          <a:noFill/>
+          <a:ln>
+            <a:noFill/>
+          </a:ln>
+          <a:effectLst/>
+        </c:spPr>
+        <c:txPr>
+          <a:bodyPr rot="-60000000" spcFirstLastPara="1" vertOverflow="ellipsis" vert="horz" wrap="square" anchor="ctr" anchorCtr="1"/>
+          <a:lstStyle/>
+          <a:p>
+            <a:pPr>
+              <a:defRPr sz="1197" b="0" i="0" u="none" strike="noStrike" kern="1200" baseline="0">
+                <a:solidFill>
+                  <a:schemeClr val="tx1">
+                    <a:lumMod val="50000"/>
+                    <a:lumOff val="50000"/>
+                  </a:schemeClr>
+                </a:solidFill>
+                <a:latin typeface="+mn-lt"/>
+                <a:ea typeface="+mn-ea"/>
+                <a:cs typeface="+mn-cs"/>
+              </a:defRPr>
+            </a:pPr>
+            <a:endParaRPr lang="en-US"/>
+          </a:p>
+        </c:txPr>
+        <c:crossAx val="38424447"/>
+        <c:crosses val="autoZero"/>
+        <c:crossBetween val="between"/>
+      </c:valAx>
+      <c:spPr>
+        <a:noFill/>
+        <a:ln>
+          <a:noFill/>
+        </a:ln>
+        <a:effectLst/>
+      </c:spPr>
+    </c:plotArea>
+    <c:plotVisOnly val="1"/>
+    <c:dispBlanksAs val="gap"/>
+    <c:extLst>
+      <c:ext xmlns:c16r3="http://schemas.microsoft.com/office/drawing/2017/03/chart" uri="{56B9EC1D-385E-4148-901F-78D8002777C0}">
+        <c16r3:dataDisplayOptions16>
+          <c16r3:dispNaAsBlank val="1"/>
+        </c16r3:dataDisplayOptions16>
+      </c:ext>
+    </c:extLst>
+    <c:showDLblsOverMax val="0"/>
+  </c:chart>
+  <c:spPr>
+    <a:noFill/>
+    <a:ln>
+      <a:noFill/>
+    </a:ln>
+    <a:effectLst/>
+  </c:spPr>
+  <c:txPr>
+    <a:bodyPr/>
+    <a:lstStyle/>
+    <a:p>
+      <a:pPr>
+        <a:defRPr/>
+      </a:pPr>
+      <a:endParaRPr lang="en-US"/>
+    </a:p>
+  </c:txPr>
+  <c:externalData r:id="rId3">
+    <c:autoUpdate val="0"/>
+  </c:externalData>
+</c:chartSpace>
+</file>
+
+<file path=ppt/charts/colors1.xml><?xml version="1.0" encoding="utf-8"?>
+<cs:colorStyle xmlns:cs="http://schemas.microsoft.com/office/drawing/2012/chartStyle" xmlns:a="http://schemas.openxmlformats.org/drawingml/2006/main" meth="cycle" id="10">
+  <a:schemeClr val="accent1"/>
+  <a:schemeClr val="accent2"/>
+  <a:schemeClr val="accent3"/>
+  <a:schemeClr val="accent4"/>
+  <a:schemeClr val="accent5"/>
+  <a:schemeClr val="accent6"/>
+  <cs:variation/>
+  <cs:variation>
+    <a:lumMod val="60000"/>
+  </cs:variation>
+  <cs:variation>
+    <a:lumMod val="80000"/>
+    <a:lumOff val="20000"/>
+  </cs:variation>
+  <cs:variation>
+    <a:lumMod val="80000"/>
+  </cs:variation>
+  <cs:variation>
+    <a:lumMod val="60000"/>
+    <a:lumOff val="40000"/>
+  </cs:variation>
+  <cs:variation>
+    <a:lumMod val="50000"/>
+  </cs:variation>
+  <cs:variation>
+    <a:lumMod val="70000"/>
+    <a:lumOff val="30000"/>
+  </cs:variation>
+  <cs:variation>
+    <a:lumMod val="70000"/>
+  </cs:variation>
+  <cs:variation>
+    <a:lumMod val="50000"/>
+    <a:lumOff val="50000"/>
+  </cs:variation>
+</cs:colorStyle>
+</file>
+
+<file path=ppt/charts/colors2.xml><?xml version="1.0" encoding="utf-8"?>
+<cs:colorStyle xmlns:cs="http://schemas.microsoft.com/office/drawing/2012/chartStyle" xmlns:a="http://schemas.openxmlformats.org/drawingml/2006/main" meth="cycle" id="10">
+  <a:schemeClr val="accent1"/>
+  <a:schemeClr val="accent2"/>
+  <a:schemeClr val="accent3"/>
+  <a:schemeClr val="accent4"/>
+  <a:schemeClr val="accent5"/>
+  <a:schemeClr val="accent6"/>
+  <cs:variation/>
+  <cs:variation>
+    <a:lumMod val="60000"/>
+  </cs:variation>
+  <cs:variation>
+    <a:lumMod val="80000"/>
+    <a:lumOff val="20000"/>
+  </cs:variation>
+  <cs:variation>
+    <a:lumMod val="80000"/>
+  </cs:variation>
+  <cs:variation>
+    <a:lumMod val="60000"/>
+    <a:lumOff val="40000"/>
+  </cs:variation>
+  <cs:variation>
+    <a:lumMod val="50000"/>
+  </cs:variation>
+  <cs:variation>
+    <a:lumMod val="70000"/>
+    <a:lumOff val="30000"/>
+  </cs:variation>
+  <cs:variation>
+    <a:lumMod val="70000"/>
+  </cs:variation>
+  <cs:variation>
+    <a:lumMod val="50000"/>
+    <a:lumOff val="50000"/>
+  </cs:variation>
+</cs:colorStyle>
+</file>
+
+<file path=ppt/charts/colors3.xml><?xml version="1.0" encoding="utf-8"?>
+<cs:colorStyle xmlns:cs="http://schemas.microsoft.com/office/drawing/2012/chartStyle" xmlns:a="http://schemas.openxmlformats.org/drawingml/2006/main" meth="cycle" id="10">
+  <a:schemeClr val="accent1"/>
+  <a:schemeClr val="accent2"/>
+  <a:schemeClr val="accent3"/>
+  <a:schemeClr val="accent4"/>
+  <a:schemeClr val="accent5"/>
+  <a:schemeClr val="accent6"/>
+  <cs:variation/>
+  <cs:variation>
+    <a:lumMod val="60000"/>
+  </cs:variation>
+  <cs:variation>
+    <a:lumMod val="80000"/>
+    <a:lumOff val="20000"/>
+  </cs:variation>
+  <cs:variation>
+    <a:lumMod val="80000"/>
+  </cs:variation>
+  <cs:variation>
+    <a:lumMod val="60000"/>
+    <a:lumOff val="40000"/>
+  </cs:variation>
+  <cs:variation>
+    <a:lumMod val="50000"/>
+  </cs:variation>
+  <cs:variation>
+    <a:lumMod val="70000"/>
+    <a:lumOff val="30000"/>
+  </cs:variation>
+  <cs:variation>
+    <a:lumMod val="70000"/>
+  </cs:variation>
+  <cs:variation>
+    <a:lumMod val="50000"/>
+    <a:lumOff val="50000"/>
+  </cs:variation>
+</cs:colorStyle>
+</file>
+
+<file path=ppt/charts/style1.xml><?xml version="1.0" encoding="utf-8"?>
+<cs:chartStyle xmlns:cs="http://schemas.microsoft.com/office/drawing/2012/chartStyle" xmlns:a="http://schemas.openxmlformats.org/drawingml/2006/main" id="215">
+  <cs:axisTitle>
+    <cs:lnRef idx="0"/>
+    <cs:fillRef idx="0"/>
+    <cs:effectRef idx="0"/>
+    <cs:fontRef idx="minor">
+      <a:schemeClr val="tx1">
+        <a:lumMod val="65000"/>
+        <a:lumOff val="35000"/>
+      </a:schemeClr>
+    </cs:fontRef>
+    <cs:defRPr sz="1197" kern="1200" cap="all"/>
+  </cs:axisTitle>
+  <cs:categoryAxis>
+    <cs:lnRef idx="0"/>
+    <cs:fillRef idx="0"/>
+    <cs:effectRef idx="0"/>
+    <cs:fontRef idx="minor">
+      <a:schemeClr val="tx1">
+        <a:lumMod val="65000"/>
+        <a:lumOff val="35000"/>
+      </a:schemeClr>
+    </cs:fontRef>
+    <cs:spPr>
+      <a:ln w="15875" cap="flat" cmpd="sng" algn="ctr">
+        <a:solidFill>
+          <a:schemeClr val="tx1">
+            <a:lumMod val="25000"/>
+            <a:lumOff val="75000"/>
+          </a:schemeClr>
+        </a:solidFill>
+        <a:round/>
+      </a:ln>
+    </cs:spPr>
+    <cs:defRPr sz="1197" kern="1200" cap="none" spc="20" normalizeH="0" baseline="0"/>
+  </cs:categoryAxis>
+  <cs:chartArea mods="allowNoFillOverride allowNoLineOverride">
+    <cs:lnRef idx="0"/>
+    <cs:fillRef idx="0"/>
+    <cs:effectRef idx="0"/>
+    <cs:fontRef idx="minor">
+      <a:schemeClr val="dk1"/>
+    </cs:fontRef>
+    <cs:spPr>
+      <a:solidFill>
+        <a:schemeClr val="lt1"/>
+      </a:solidFill>
+      <a:ln w="9525" cap="flat" cmpd="sng" algn="ctr">
+        <a:solidFill>
+          <a:schemeClr val="tx1">
+            <a:lumMod val="15000"/>
+            <a:lumOff val="85000"/>
+          </a:schemeClr>
+        </a:solidFill>
+        <a:round/>
+      </a:ln>
+    </cs:spPr>
+    <cs:defRPr sz="1197" kern="1200"/>
+  </cs:chartArea>
+  <cs:dataLabel>
+    <cs:lnRef idx="0"/>
+    <cs:fillRef idx="0"/>
+    <cs:effectRef idx="0"/>
+    <cs:fontRef idx="minor">
+      <a:schemeClr val="tx1">
+        <a:lumMod val="75000"/>
+        <a:lumOff val="25000"/>
+      </a:schemeClr>
+    </cs:fontRef>
+    <cs:defRPr sz="1197" kern="1200"/>
+  </cs:dataLabel>
+  <cs:dataLabelCallout>
+    <cs:lnRef idx="0"/>
+    <cs:fillRef idx="0"/>
+    <cs:effectRef idx="0"/>
+    <cs:fontRef idx="minor">
+      <a:schemeClr val="bg1"/>
+    </cs:fontRef>
+    <cs:spPr>
+      <a:solidFill>
+        <a:schemeClr val="tx1">
+          <a:lumMod val="50000"/>
+          <a:lumOff val="50000"/>
+        </a:schemeClr>
+      </a:solidFill>
+    </cs:spPr>
+    <cs:defRPr sz="1197" kern="1200"/>
+    <cs:bodyPr rot="0" spcFirstLastPara="1" vertOverflow="clip" horzOverflow="clip" vert="horz" wrap="square" lIns="36576" tIns="18288" rIns="36576" bIns="18288" anchor="ctr" anchorCtr="1">
+      <a:spAutoFit/>
+    </cs:bodyPr>
+  </cs:dataLabelCallout>
+  <cs:dataPoint>
+    <cs:lnRef idx="0"/>
+    <cs:fillRef idx="0">
+      <cs:styleClr val="auto"/>
+    </cs:fillRef>
+    <cs:effectRef idx="0"/>
+    <cs:fontRef idx="minor">
+      <a:schemeClr val="dk1"/>
+    </cs:fontRef>
+    <cs:spPr>
+      <a:solidFill>
+        <a:schemeClr val="phClr">
+          <a:alpha val="70000"/>
+        </a:schemeClr>
+      </a:solidFill>
+    </cs:spPr>
+  </cs:dataPoint>
+  <cs:dataPoint3D>
+    <cs:lnRef idx="0"/>
+    <cs:fillRef idx="0">
+      <cs:styleClr val="auto"/>
+    </cs:fillRef>
+    <cs:effectRef idx="0"/>
+    <cs:fontRef idx="minor">
+      <a:schemeClr val="dk1"/>
+    </cs:fontRef>
+    <cs:spPr>
+      <a:solidFill>
+        <a:schemeClr val="phClr">
+          <a:alpha val="70000"/>
+        </a:schemeClr>
+      </a:solidFill>
+    </cs:spPr>
+  </cs:dataPoint3D>
+  <cs:dataPointLine>
+    <cs:lnRef idx="0">
+      <cs:styleClr val="auto"/>
+    </cs:lnRef>
+    <cs:fillRef idx="0"/>
+    <cs:effectRef idx="0"/>
+    <cs:fontRef idx="minor">
+      <a:schemeClr val="dk1"/>
+    </cs:fontRef>
+    <cs:spPr>
+      <a:ln w="28575" cap="rnd">
+        <a:solidFill>
+          <a:schemeClr val="phClr">
+            <a:alpha val="70000"/>
+          </a:schemeClr>
+        </a:solidFill>
+        <a:round/>
+      </a:ln>
+    </cs:spPr>
+  </cs:dataPointLine>
+  <cs:dataPointMarker>
+    <cs:lnRef idx="0"/>
+    <cs:fillRef idx="0">
+      <cs:styleClr val="auto"/>
+    </cs:fillRef>
+    <cs:effectRef idx="0"/>
+    <cs:fontRef idx="minor">
+      <a:schemeClr val="dk1"/>
+    </cs:fontRef>
+    <cs:spPr>
+      <a:solidFill>
+        <a:schemeClr val="phClr">
+          <a:alpha val="70000"/>
+        </a:schemeClr>
+      </a:solidFill>
+    </cs:spPr>
+  </cs:dataPointMarker>
+  <cs:dataPointMarkerLayout symbol="circle" size="6"/>
+  <cs:dataPointWireframe>
+    <cs:lnRef idx="0">
+      <cs:styleClr val="auto"/>
+    </cs:lnRef>
+    <cs:fillRef idx="0"/>
+    <cs:effectRef idx="0"/>
+    <cs:fontRef idx="minor">
+      <a:schemeClr val="dk1"/>
+    </cs:fontRef>
+    <cs:spPr>
+      <a:ln w="9525" cap="rnd">
+        <a:solidFill>
+          <a:schemeClr val="phClr"/>
+        </a:solidFill>
+        <a:round/>
+      </a:ln>
+    </cs:spPr>
+  </cs:dataPointWireframe>
+  <cs:dataTable>
+    <cs:lnRef idx="0"/>
+    <cs:fillRef idx="0"/>
+    <cs:effectRef idx="0"/>
+    <cs:fontRef idx="minor">
+      <a:schemeClr val="tx1">
+        <a:lumMod val="65000"/>
+        <a:lumOff val="35000"/>
+      </a:schemeClr>
+    </cs:fontRef>
+    <cs:spPr>
+      <a:ln w="9525">
+        <a:solidFill>
+          <a:schemeClr val="tx1">
+            <a:lumMod val="15000"/>
+            <a:lumOff val="85000"/>
+          </a:schemeClr>
+        </a:solidFill>
+      </a:ln>
+    </cs:spPr>
+    <cs:defRPr sz="1197" kern="1200"/>
+  </cs:dataTable>
+  <cs:downBar>
+    <cs:lnRef idx="0"/>
+    <cs:fillRef idx="0"/>
+    <cs:effectRef idx="0"/>
+    <cs:fontRef idx="minor">
+      <a:schemeClr val="dk1"/>
+    </cs:fontRef>
+    <cs:spPr>
+      <a:solidFill>
+        <a:schemeClr val="dk1">
+          <a:lumMod val="75000"/>
+          <a:lumOff val="25000"/>
+        </a:schemeClr>
+      </a:solidFill>
+      <a:ln w="9525">
+        <a:solidFill>
+          <a:schemeClr val="tx1">
+            <a:lumMod val="65000"/>
+            <a:lumOff val="35000"/>
+          </a:schemeClr>
+        </a:solidFill>
+      </a:ln>
+    </cs:spPr>
+  </cs:downBar>
+  <cs:dropLine>
+    <cs:lnRef idx="0"/>
+    <cs:fillRef idx="0"/>
+    <cs:effectRef idx="0"/>
+    <cs:fontRef idx="minor">
+      <a:schemeClr val="dk1"/>
+    </cs:fontRef>
+    <cs:spPr>
+      <a:ln w="9525">
+        <a:solidFill>
+          <a:schemeClr val="tx1">
+            <a:lumMod val="35000"/>
+            <a:lumOff val="65000"/>
+          </a:schemeClr>
+        </a:solidFill>
+        <a:round/>
+      </a:ln>
+    </cs:spPr>
+  </cs:dropLine>
+  <cs:errorBar>
+    <cs:lnRef idx="0"/>
+    <cs:fillRef idx="0"/>
+    <cs:effectRef idx="0"/>
+    <cs:fontRef idx="minor">
+      <a:schemeClr val="dk1"/>
+    </cs:fontRef>
+    <cs:spPr>
+      <a:ln w="9525">
+        <a:solidFill>
+          <a:schemeClr val="tx1">
+            <a:lumMod val="65000"/>
+            <a:lumOff val="35000"/>
+          </a:schemeClr>
+        </a:solidFill>
+        <a:round/>
+      </a:ln>
+    </cs:spPr>
+  </cs:errorBar>
+  <cs:floor>
+    <cs:lnRef idx="0"/>
+    <cs:fillRef idx="0"/>
+    <cs:effectRef idx="0"/>
+    <cs:fontRef idx="minor">
+      <a:schemeClr val="dk1"/>
+    </cs:fontRef>
+  </cs:floor>
+  <cs:gridlineMajor>
+    <cs:lnRef idx="0"/>
+    <cs:fillRef idx="0"/>
+    <cs:effectRef idx="0"/>
+    <cs:fontRef idx="minor">
+      <a:schemeClr val="dk1"/>
+    </cs:fontRef>
+    <cs:spPr>
+      <a:ln w="9525" cap="flat" cmpd="sng" algn="ctr">
+        <a:solidFill>
+          <a:schemeClr val="tx1">
+            <a:lumMod val="5000"/>
+            <a:lumOff val="95000"/>
+          </a:schemeClr>
+        </a:solidFill>
+        <a:round/>
+      </a:ln>
+    </cs:spPr>
+  </cs:gridlineMajor>
+  <cs:gridlineMinor>
+    <cs:lnRef idx="0"/>
+    <cs:fillRef idx="0"/>
+    <cs:effectRef idx="0"/>
+    <cs:fontRef idx="minor">
+      <a:schemeClr val="dk1"/>
+    </cs:fontRef>
+    <cs:spPr>
+      <a:ln>
+        <a:solidFill>
+          <a:schemeClr val="tx1">
+            <a:lumMod val="5000"/>
+            <a:lumOff val="95000"/>
+          </a:schemeClr>
+        </a:solidFill>
+      </a:ln>
+    </cs:spPr>
+  </cs:gridlineMinor>
+  <cs:hiLoLine>
+    <cs:lnRef idx="0"/>
+    <cs:fillRef idx="0"/>
+    <cs:effectRef idx="0"/>
+    <cs:fontRef idx="minor">
+      <a:schemeClr val="dk1"/>
+    </cs:fontRef>
+    <cs:spPr>
+      <a:ln w="9525">
+        <a:solidFill>
+          <a:schemeClr val="tx1">
+            <a:lumMod val="35000"/>
+            <a:lumOff val="65000"/>
+          </a:schemeClr>
+        </a:solidFill>
+        <a:round/>
+      </a:ln>
+    </cs:spPr>
+  </cs:hiLoLine>
+  <cs:leaderLine>
+    <cs:lnRef idx="0"/>
+    <cs:fillRef idx="0"/>
+    <cs:effectRef idx="0"/>
+    <cs:fontRef idx="minor">
+      <a:schemeClr val="dk1"/>
+    </cs:fontRef>
+    <cs:spPr>
+      <a:ln w="9525">
+        <a:solidFill>
+          <a:schemeClr val="tx1">
+            <a:lumMod val="35000"/>
+            <a:lumOff val="65000"/>
+          </a:schemeClr>
+        </a:solidFill>
+      </a:ln>
+    </cs:spPr>
+  </cs:leaderLine>
+  <cs:legend>
+    <cs:lnRef idx="0"/>
+    <cs:fillRef idx="0"/>
+    <cs:effectRef idx="0"/>
+    <cs:fontRef idx="minor">
+      <a:schemeClr val="tx1">
+        <a:lumMod val="65000"/>
+        <a:lumOff val="35000"/>
+      </a:schemeClr>
+    </cs:fontRef>
+    <cs:defRPr sz="1197" kern="1200" baseline="0"/>
+  </cs:legend>
+  <cs:plotArea mods="allowNoFillOverride allowNoLineOverride">
+    <cs:lnRef idx="0"/>
+    <cs:fillRef idx="0"/>
+    <cs:effectRef idx="0"/>
+    <cs:fontRef idx="minor">
+      <a:schemeClr val="dk1"/>
+    </cs:fontRef>
+  </cs:plotArea>
+  <cs:plotArea3D mods="allowNoFillOverride allowNoLineOverride">
+    <cs:lnRef idx="0"/>
+    <cs:fillRef idx="0"/>
+    <cs:effectRef idx="0"/>
+    <cs:fontRef idx="minor">
+      <a:schemeClr val="dk1"/>
+    </cs:fontRef>
+  </cs:plotArea3D>
+  <cs:seriesAxis>
+    <cs:lnRef idx="0"/>
+    <cs:fillRef idx="0"/>
+    <cs:effectRef idx="0"/>
+    <cs:fontRef idx="minor">
+      <a:schemeClr val="tx1">
+        <a:lumMod val="65000"/>
+        <a:lumOff val="35000"/>
+      </a:schemeClr>
+    </cs:fontRef>
+    <cs:defRPr sz="1197" kern="1200"/>
+  </cs:seriesAxis>
+  <cs:seriesLine>
+    <cs:lnRef idx="0"/>
+    <cs:fillRef idx="0"/>
+    <cs:effectRef idx="0"/>
+    <cs:fontRef idx="minor">
+      <a:schemeClr val="dk1"/>
+    </cs:fontRef>
+    <cs:spPr>
+      <a:ln w="9525">
+        <a:solidFill>
+          <a:schemeClr val="tx1">
+            <a:lumMod val="35000"/>
+            <a:lumOff val="65000"/>
+          </a:schemeClr>
+        </a:solidFill>
+        <a:round/>
+      </a:ln>
+    </cs:spPr>
+  </cs:seriesLine>
+  <cs:title>
+    <cs:lnRef idx="0"/>
+    <cs:fillRef idx="0"/>
+    <cs:effectRef idx="0"/>
+    <cs:fontRef idx="major">
+      <a:schemeClr val="tx1">
+        <a:lumMod val="65000"/>
+        <a:lumOff val="35000"/>
+      </a:schemeClr>
+    </cs:fontRef>
+    <cs:defRPr sz="2128" b="0" i="0" kern="1200" cap="none" spc="50" normalizeH="0" baseline="0"/>
+  </cs:title>
+  <cs:trendline>
+    <cs:lnRef idx="0">
+      <cs:styleClr val="auto"/>
+    </cs:lnRef>
+    <cs:fillRef idx="0"/>
+    <cs:effectRef idx="0"/>
+    <cs:fontRef idx="minor">
+      <a:schemeClr val="dk1"/>
+    </cs:fontRef>
+    <cs:spPr>
+      <a:ln w="15875" cap="rnd">
+        <a:solidFill>
+          <a:schemeClr val="phClr"/>
+        </a:solidFill>
+      </a:ln>
+    </cs:spPr>
+  </cs:trendline>
+  <cs:trendlineLabel>
+    <cs:lnRef idx="0"/>
+    <cs:fillRef idx="0"/>
+    <cs:effectRef idx="0"/>
+    <cs:fontRef idx="minor">
+      <a:schemeClr val="tx1">
+        <a:lumMod val="65000"/>
+        <a:lumOff val="35000"/>
+      </a:schemeClr>
+    </cs:fontRef>
+    <cs:defRPr sz="1197" kern="1200"/>
+  </cs:trendlineLabel>
+  <cs:upBar>
+    <cs:lnRef idx="0"/>
+    <cs:fillRef idx="0"/>
+    <cs:effectRef idx="0"/>
+    <cs:fontRef idx="minor">
+      <a:schemeClr val="dk1"/>
+    </cs:fontRef>
+    <cs:spPr>
+      <a:solidFill>
+        <a:schemeClr val="lt1"/>
+      </a:solidFill>
+      <a:ln w="9525">
+        <a:solidFill>
+          <a:schemeClr val="tx1">
+            <a:lumMod val="65000"/>
+            <a:lumOff val="35000"/>
+          </a:schemeClr>
+        </a:solidFill>
+      </a:ln>
+    </cs:spPr>
+  </cs:upBar>
+  <cs:valueAxis>
+    <cs:lnRef idx="0"/>
+    <cs:fillRef idx="0"/>
+    <cs:effectRef idx="0"/>
+    <cs:fontRef idx="minor">
+      <a:schemeClr val="tx1">
+        <a:lumMod val="65000"/>
+        <a:lumOff val="35000"/>
+      </a:schemeClr>
+    </cs:fontRef>
+    <cs:defRPr sz="1197" kern="1200" spc="20" baseline="0"/>
+  </cs:valueAxis>
+  <cs:wall>
+    <cs:lnRef idx="0"/>
+    <cs:fillRef idx="0"/>
+    <cs:effectRef idx="0"/>
+    <cs:fontRef idx="minor">
+      <a:schemeClr val="dk1"/>
+    </cs:fontRef>
+  </cs:wall>
+</cs:chartStyle>
+</file>
+
+<file path=ppt/charts/style2.xml><?xml version="1.0" encoding="utf-8"?>
+<cs:chartStyle xmlns:cs="http://schemas.microsoft.com/office/drawing/2012/chartStyle" xmlns:a="http://schemas.openxmlformats.org/drawingml/2006/main" id="215">
+  <cs:axisTitle>
+    <cs:lnRef idx="0"/>
+    <cs:fillRef idx="0"/>
+    <cs:effectRef idx="0"/>
+    <cs:fontRef idx="minor">
+      <a:schemeClr val="tx1">
+        <a:lumMod val="65000"/>
+        <a:lumOff val="35000"/>
+      </a:schemeClr>
+    </cs:fontRef>
+    <cs:defRPr sz="1197" kern="1200" cap="all"/>
+  </cs:axisTitle>
+  <cs:categoryAxis>
+    <cs:lnRef idx="0"/>
+    <cs:fillRef idx="0"/>
+    <cs:effectRef idx="0"/>
+    <cs:fontRef idx="minor">
+      <a:schemeClr val="tx1">
+        <a:lumMod val="65000"/>
+        <a:lumOff val="35000"/>
+      </a:schemeClr>
+    </cs:fontRef>
+    <cs:spPr>
+      <a:ln w="15875" cap="flat" cmpd="sng" algn="ctr">
+        <a:solidFill>
+          <a:schemeClr val="tx1">
+            <a:lumMod val="25000"/>
+            <a:lumOff val="75000"/>
+          </a:schemeClr>
+        </a:solidFill>
+        <a:round/>
+      </a:ln>
+    </cs:spPr>
+    <cs:defRPr sz="1197" kern="1200" cap="none" spc="20" normalizeH="0" baseline="0"/>
+  </cs:categoryAxis>
+  <cs:chartArea mods="allowNoFillOverride allowNoLineOverride">
+    <cs:lnRef idx="0"/>
+    <cs:fillRef idx="0"/>
+    <cs:effectRef idx="0"/>
+    <cs:fontRef idx="minor">
+      <a:schemeClr val="dk1"/>
+    </cs:fontRef>
+    <cs:spPr>
+      <a:solidFill>
+        <a:schemeClr val="lt1"/>
+      </a:solidFill>
+      <a:ln w="9525" cap="flat" cmpd="sng" algn="ctr">
+        <a:solidFill>
+          <a:schemeClr val="tx1">
+            <a:lumMod val="15000"/>
+            <a:lumOff val="85000"/>
+          </a:schemeClr>
+        </a:solidFill>
+        <a:round/>
+      </a:ln>
+    </cs:spPr>
+    <cs:defRPr sz="1197" kern="1200"/>
+  </cs:chartArea>
+  <cs:dataLabel>
+    <cs:lnRef idx="0"/>
+    <cs:fillRef idx="0"/>
+    <cs:effectRef idx="0"/>
+    <cs:fontRef idx="minor">
+      <a:schemeClr val="tx1">
+        <a:lumMod val="75000"/>
+        <a:lumOff val="25000"/>
+      </a:schemeClr>
+    </cs:fontRef>
+    <cs:defRPr sz="1197" kern="1200"/>
+  </cs:dataLabel>
+  <cs:dataLabelCallout>
+    <cs:lnRef idx="0"/>
+    <cs:fillRef idx="0"/>
+    <cs:effectRef idx="0"/>
+    <cs:fontRef idx="minor">
+      <a:schemeClr val="bg1"/>
+    </cs:fontRef>
+    <cs:spPr>
+      <a:solidFill>
+        <a:schemeClr val="tx1">
+          <a:lumMod val="50000"/>
+          <a:lumOff val="50000"/>
+        </a:schemeClr>
+      </a:solidFill>
+    </cs:spPr>
+    <cs:defRPr sz="1197" kern="1200"/>
+    <cs:bodyPr rot="0" spcFirstLastPara="1" vertOverflow="clip" horzOverflow="clip" vert="horz" wrap="square" lIns="36576" tIns="18288" rIns="36576" bIns="18288" anchor="ctr" anchorCtr="1">
+      <a:spAutoFit/>
+    </cs:bodyPr>
+  </cs:dataLabelCallout>
+  <cs:dataPoint>
+    <cs:lnRef idx="0"/>
+    <cs:fillRef idx="0">
+      <cs:styleClr val="auto"/>
+    </cs:fillRef>
+    <cs:effectRef idx="0"/>
+    <cs:fontRef idx="minor">
+      <a:schemeClr val="dk1"/>
+    </cs:fontRef>
+    <cs:spPr>
+      <a:solidFill>
+        <a:schemeClr val="phClr">
+          <a:alpha val="70000"/>
+        </a:schemeClr>
+      </a:solidFill>
+    </cs:spPr>
+  </cs:dataPoint>
+  <cs:dataPoint3D>
+    <cs:lnRef idx="0"/>
+    <cs:fillRef idx="0">
+      <cs:styleClr val="auto"/>
+    </cs:fillRef>
+    <cs:effectRef idx="0"/>
+    <cs:fontRef idx="minor">
+      <a:schemeClr val="dk1"/>
+    </cs:fontRef>
+    <cs:spPr>
+      <a:solidFill>
+        <a:schemeClr val="phClr">
+          <a:alpha val="70000"/>
+        </a:schemeClr>
+      </a:solidFill>
+    </cs:spPr>
+  </cs:dataPoint3D>
+  <cs:dataPointLine>
+    <cs:lnRef idx="0">
+      <cs:styleClr val="auto"/>
+    </cs:lnRef>
+    <cs:fillRef idx="0"/>
+    <cs:effectRef idx="0"/>
+    <cs:fontRef idx="minor">
+      <a:schemeClr val="dk1"/>
+    </cs:fontRef>
+    <cs:spPr>
+      <a:ln w="28575" cap="rnd">
+        <a:solidFill>
+          <a:schemeClr val="phClr">
+            <a:alpha val="70000"/>
+          </a:schemeClr>
+        </a:solidFill>
+        <a:round/>
+      </a:ln>
+    </cs:spPr>
+  </cs:dataPointLine>
+  <cs:dataPointMarker>
+    <cs:lnRef idx="0"/>
+    <cs:fillRef idx="0">
+      <cs:styleClr val="auto"/>
+    </cs:fillRef>
+    <cs:effectRef idx="0"/>
+    <cs:fontRef idx="minor">
+      <a:schemeClr val="dk1"/>
+    </cs:fontRef>
+    <cs:spPr>
+      <a:solidFill>
+        <a:schemeClr val="phClr">
+          <a:alpha val="70000"/>
+        </a:schemeClr>
+      </a:solidFill>
+    </cs:spPr>
+  </cs:dataPointMarker>
+  <cs:dataPointMarkerLayout symbol="circle" size="6"/>
+  <cs:dataPointWireframe>
+    <cs:lnRef idx="0">
+      <cs:styleClr val="auto"/>
+    </cs:lnRef>
+    <cs:fillRef idx="0"/>
+    <cs:effectRef idx="0"/>
+    <cs:fontRef idx="minor">
+      <a:schemeClr val="dk1"/>
+    </cs:fontRef>
+    <cs:spPr>
+      <a:ln w="9525" cap="rnd">
+        <a:solidFill>
+          <a:schemeClr val="phClr"/>
+        </a:solidFill>
+        <a:round/>
+      </a:ln>
+    </cs:spPr>
+  </cs:dataPointWireframe>
+  <cs:dataTable>
+    <cs:lnRef idx="0"/>
+    <cs:fillRef idx="0"/>
+    <cs:effectRef idx="0"/>
+    <cs:fontRef idx="minor">
+      <a:schemeClr val="tx1">
+        <a:lumMod val="65000"/>
+        <a:lumOff val="35000"/>
+      </a:schemeClr>
+    </cs:fontRef>
+    <cs:spPr>
+      <a:ln w="9525">
+        <a:solidFill>
+          <a:schemeClr val="tx1">
+            <a:lumMod val="15000"/>
+            <a:lumOff val="85000"/>
+          </a:schemeClr>
+        </a:solidFill>
+      </a:ln>
+    </cs:spPr>
+    <cs:defRPr sz="1197" kern="1200"/>
+  </cs:dataTable>
+  <cs:downBar>
+    <cs:lnRef idx="0"/>
+    <cs:fillRef idx="0"/>
+    <cs:effectRef idx="0"/>
+    <cs:fontRef idx="minor">
+      <a:schemeClr val="dk1"/>
+    </cs:fontRef>
+    <cs:spPr>
+      <a:solidFill>
+        <a:schemeClr val="dk1">
+          <a:lumMod val="75000"/>
+          <a:lumOff val="25000"/>
+        </a:schemeClr>
+      </a:solidFill>
+      <a:ln w="9525">
+        <a:solidFill>
+          <a:schemeClr val="tx1">
+            <a:lumMod val="65000"/>
+            <a:lumOff val="35000"/>
+          </a:schemeClr>
+        </a:solidFill>
+      </a:ln>
+    </cs:spPr>
+  </cs:downBar>
+  <cs:dropLine>
+    <cs:lnRef idx="0"/>
+    <cs:fillRef idx="0"/>
+    <cs:effectRef idx="0"/>
+    <cs:fontRef idx="minor">
+      <a:schemeClr val="dk1"/>
+    </cs:fontRef>
+    <cs:spPr>
+      <a:ln w="9525">
+        <a:solidFill>
+          <a:schemeClr val="tx1">
+            <a:lumMod val="35000"/>
+            <a:lumOff val="65000"/>
+          </a:schemeClr>
+        </a:solidFill>
+        <a:round/>
+      </a:ln>
+    </cs:spPr>
+  </cs:dropLine>
+  <cs:errorBar>
+    <cs:lnRef idx="0"/>
+    <cs:fillRef idx="0"/>
+    <cs:effectRef idx="0"/>
+    <cs:fontRef idx="minor">
+      <a:schemeClr val="dk1"/>
+    </cs:fontRef>
+    <cs:spPr>
+      <a:ln w="9525">
+        <a:solidFill>
+          <a:schemeClr val="tx1">
+            <a:lumMod val="65000"/>
+            <a:lumOff val="35000"/>
+          </a:schemeClr>
+        </a:solidFill>
+        <a:round/>
+      </a:ln>
+    </cs:spPr>
+  </cs:errorBar>
+  <cs:floor>
+    <cs:lnRef idx="0"/>
+    <cs:fillRef idx="0"/>
+    <cs:effectRef idx="0"/>
+    <cs:fontRef idx="minor">
+      <a:schemeClr val="dk1"/>
+    </cs:fontRef>
+  </cs:floor>
+  <cs:gridlineMajor>
+    <cs:lnRef idx="0"/>
+    <cs:fillRef idx="0"/>
+    <cs:effectRef idx="0"/>
+    <cs:fontRef idx="minor">
+      <a:schemeClr val="dk1"/>
+    </cs:fontRef>
+    <cs:spPr>
+      <a:ln w="9525" cap="flat" cmpd="sng" algn="ctr">
+        <a:solidFill>
+          <a:schemeClr val="tx1">
+            <a:lumMod val="5000"/>
+            <a:lumOff val="95000"/>
+          </a:schemeClr>
+        </a:solidFill>
+        <a:round/>
+      </a:ln>
+    </cs:spPr>
+  </cs:gridlineMajor>
+  <cs:gridlineMinor>
+    <cs:lnRef idx="0"/>
+    <cs:fillRef idx="0"/>
+    <cs:effectRef idx="0"/>
+    <cs:fontRef idx="minor">
+      <a:schemeClr val="dk1"/>
+    </cs:fontRef>
+    <cs:spPr>
+      <a:ln>
+        <a:solidFill>
+          <a:schemeClr val="tx1">
+            <a:lumMod val="5000"/>
+            <a:lumOff val="95000"/>
+          </a:schemeClr>
+        </a:solidFill>
+      </a:ln>
+    </cs:spPr>
+  </cs:gridlineMinor>
+  <cs:hiLoLine>
+    <cs:lnRef idx="0"/>
+    <cs:fillRef idx="0"/>
+    <cs:effectRef idx="0"/>
+    <cs:fontRef idx="minor">
+      <a:schemeClr val="dk1"/>
+    </cs:fontRef>
+    <cs:spPr>
+      <a:ln w="9525">
+        <a:solidFill>
+          <a:schemeClr val="tx1">
+            <a:lumMod val="35000"/>
+            <a:lumOff val="65000"/>
+          </a:schemeClr>
+        </a:solidFill>
+        <a:round/>
+      </a:ln>
+    </cs:spPr>
+  </cs:hiLoLine>
+  <cs:leaderLine>
+    <cs:lnRef idx="0"/>
+    <cs:fillRef idx="0"/>
+    <cs:effectRef idx="0"/>
+    <cs:fontRef idx="minor">
+      <a:schemeClr val="dk1"/>
+    </cs:fontRef>
+    <cs:spPr>
+      <a:ln w="9525">
+        <a:solidFill>
+          <a:schemeClr val="tx1">
+            <a:lumMod val="35000"/>
+            <a:lumOff val="65000"/>
+          </a:schemeClr>
+        </a:solidFill>
+      </a:ln>
+    </cs:spPr>
+  </cs:leaderLine>
+  <cs:legend>
+    <cs:lnRef idx="0"/>
+    <cs:fillRef idx="0"/>
+    <cs:effectRef idx="0"/>
+    <cs:fontRef idx="minor">
+      <a:schemeClr val="tx1">
+        <a:lumMod val="65000"/>
+        <a:lumOff val="35000"/>
+      </a:schemeClr>
+    </cs:fontRef>
+    <cs:defRPr sz="1197" kern="1200" baseline="0"/>
+  </cs:legend>
+  <cs:plotArea mods="allowNoFillOverride allowNoLineOverride">
+    <cs:lnRef idx="0"/>
+    <cs:fillRef idx="0"/>
+    <cs:effectRef idx="0"/>
+    <cs:fontRef idx="minor">
+      <a:schemeClr val="dk1"/>
+    </cs:fontRef>
+  </cs:plotArea>
+  <cs:plotArea3D mods="allowNoFillOverride allowNoLineOverride">
+    <cs:lnRef idx="0"/>
+    <cs:fillRef idx="0"/>
+    <cs:effectRef idx="0"/>
+    <cs:fontRef idx="minor">
+      <a:schemeClr val="dk1"/>
+    </cs:fontRef>
+  </cs:plotArea3D>
+  <cs:seriesAxis>
+    <cs:lnRef idx="0"/>
+    <cs:fillRef idx="0"/>
+    <cs:effectRef idx="0"/>
+    <cs:fontRef idx="minor">
+      <a:schemeClr val="tx1">
+        <a:lumMod val="65000"/>
+        <a:lumOff val="35000"/>
+      </a:schemeClr>
+    </cs:fontRef>
+    <cs:defRPr sz="1197" kern="1200"/>
+  </cs:seriesAxis>
+  <cs:seriesLine>
+    <cs:lnRef idx="0"/>
+    <cs:fillRef idx="0"/>
+    <cs:effectRef idx="0"/>
+    <cs:fontRef idx="minor">
+      <a:schemeClr val="dk1"/>
+    </cs:fontRef>
+    <cs:spPr>
+      <a:ln w="9525">
+        <a:solidFill>
+          <a:schemeClr val="tx1">
+            <a:lumMod val="35000"/>
+            <a:lumOff val="65000"/>
+          </a:schemeClr>
+        </a:solidFill>
+        <a:round/>
+      </a:ln>
+    </cs:spPr>
+  </cs:seriesLine>
+  <cs:title>
+    <cs:lnRef idx="0"/>
+    <cs:fillRef idx="0"/>
+    <cs:effectRef idx="0"/>
+    <cs:fontRef idx="major">
+      <a:schemeClr val="tx1">
+        <a:lumMod val="65000"/>
+        <a:lumOff val="35000"/>
+      </a:schemeClr>
+    </cs:fontRef>
+    <cs:defRPr sz="2128" b="0" i="0" kern="1200" cap="none" spc="50" normalizeH="0" baseline="0"/>
+  </cs:title>
+  <cs:trendline>
+    <cs:lnRef idx="0">
+      <cs:styleClr val="auto"/>
+    </cs:lnRef>
+    <cs:fillRef idx="0"/>
+    <cs:effectRef idx="0"/>
+    <cs:fontRef idx="minor">
+      <a:schemeClr val="dk1"/>
+    </cs:fontRef>
+    <cs:spPr>
+      <a:ln w="15875" cap="rnd">
+        <a:solidFill>
+          <a:schemeClr val="phClr"/>
+        </a:solidFill>
+      </a:ln>
+    </cs:spPr>
+  </cs:trendline>
+  <cs:trendlineLabel>
+    <cs:lnRef idx="0"/>
+    <cs:fillRef idx="0"/>
+    <cs:effectRef idx="0"/>
+    <cs:fontRef idx="minor">
+      <a:schemeClr val="tx1">
+        <a:lumMod val="65000"/>
+        <a:lumOff val="35000"/>
+      </a:schemeClr>
+    </cs:fontRef>
+    <cs:defRPr sz="1197" kern="1200"/>
+  </cs:trendlineLabel>
+  <cs:upBar>
+    <cs:lnRef idx="0"/>
+    <cs:fillRef idx="0"/>
+    <cs:effectRef idx="0"/>
+    <cs:fontRef idx="minor">
+      <a:schemeClr val="dk1"/>
+    </cs:fontRef>
+    <cs:spPr>
+      <a:solidFill>
+        <a:schemeClr val="lt1"/>
+      </a:solidFill>
+      <a:ln w="9525">
+        <a:solidFill>
+          <a:schemeClr val="tx1">
+            <a:lumMod val="65000"/>
+            <a:lumOff val="35000"/>
+          </a:schemeClr>
+        </a:solidFill>
+      </a:ln>
+    </cs:spPr>
+  </cs:upBar>
+  <cs:valueAxis>
+    <cs:lnRef idx="0"/>
+    <cs:fillRef idx="0"/>
+    <cs:effectRef idx="0"/>
+    <cs:fontRef idx="minor">
+      <a:schemeClr val="tx1">
+        <a:lumMod val="65000"/>
+        <a:lumOff val="35000"/>
+      </a:schemeClr>
+    </cs:fontRef>
+    <cs:defRPr sz="1197" kern="1200" spc="20" baseline="0"/>
+  </cs:valueAxis>
+  <cs:wall>
+    <cs:lnRef idx="0"/>
+    <cs:fillRef idx="0"/>
+    <cs:effectRef idx="0"/>
+    <cs:fontRef idx="minor">
+      <a:schemeClr val="dk1"/>
+    </cs:fontRef>
+  </cs:wall>
+</cs:chartStyle>
+</file>
+
+<file path=ppt/charts/style3.xml><?xml version="1.0" encoding="utf-8"?>
+<cs:chartStyle xmlns:cs="http://schemas.microsoft.com/office/drawing/2012/chartStyle" xmlns:a="http://schemas.openxmlformats.org/drawingml/2006/main" id="206">
+  <cs:axisTitle>
+    <cs:lnRef idx="0"/>
+    <cs:fillRef idx="0"/>
+    <cs:effectRef idx="0"/>
+    <cs:fontRef idx="minor">
+      <a:schemeClr val="tx1">
+        <a:lumMod val="50000"/>
+        <a:lumOff val="50000"/>
+      </a:schemeClr>
+    </cs:fontRef>
+    <cs:defRPr sz="1197" kern="1200" cap="all"/>
+  </cs:axisTitle>
+  <cs:categoryAxis>
+    <cs:lnRef idx="0"/>
+    <cs:fillRef idx="0"/>
+    <cs:effectRef idx="0"/>
+    <cs:fontRef idx="minor">
+      <a:schemeClr val="tx1">
+        <a:lumMod val="50000"/>
+        <a:lumOff val="50000"/>
+      </a:schemeClr>
+    </cs:fontRef>
+    <cs:spPr>
+      <a:ln w="9525" cap="flat" cmpd="sng" algn="ctr">
+        <a:solidFill>
+          <a:schemeClr val="tx1">
+            <a:lumMod val="15000"/>
+            <a:lumOff val="85000"/>
+          </a:schemeClr>
+        </a:solidFill>
+        <a:round/>
+      </a:ln>
+    </cs:spPr>
+    <cs:defRPr sz="1197" kern="1200"/>
+  </cs:categoryAxis>
+  <cs:chartArea mods="allowNoFillOverride allowNoLineOverride">
+    <cs:lnRef idx="0"/>
+    <cs:fillRef idx="0"/>
+    <cs:effectRef idx="0"/>
+    <cs:fontRef idx="minor">
+      <a:schemeClr val="dk1"/>
+    </cs:fontRef>
+    <cs:spPr>
+      <a:solidFill>
+        <a:schemeClr val="bg1"/>
+      </a:solidFill>
+      <a:ln w="9525" cap="flat" cmpd="sng" algn="ctr">
+        <a:solidFill>
+          <a:schemeClr val="tx1">
+            <a:lumMod val="15000"/>
+            <a:lumOff val="85000"/>
+          </a:schemeClr>
+        </a:solidFill>
+        <a:round/>
+      </a:ln>
+    </cs:spPr>
+    <cs:defRPr sz="1197" kern="1200"/>
+  </cs:chartArea>
+  <cs:dataLabel>
+    <cs:lnRef idx="0"/>
+    <cs:fillRef idx="0"/>
+    <cs:effectRef idx="0"/>
+    <cs:fontRef idx="minor">
+      <a:schemeClr val="tx1">
+        <a:lumMod val="50000"/>
+        <a:lumOff val="50000"/>
+      </a:schemeClr>
+    </cs:fontRef>
+    <cs:defRPr sz="1197" kern="1200"/>
+  </cs:dataLabel>
+  <cs:dataLabelCallout>
+    <cs:lnRef idx="0"/>
+    <cs:fillRef idx="0"/>
+    <cs:effectRef idx="0"/>
+    <cs:fontRef idx="minor">
+      <a:schemeClr val="dk1">
+        <a:lumMod val="65000"/>
+        <a:lumOff val="35000"/>
+      </a:schemeClr>
+    </cs:fontRef>
+    <cs:spPr>
+      <a:solidFill>
+        <a:schemeClr val="lt1"/>
+      </a:solidFill>
+      <a:ln>
+        <a:solidFill>
+          <a:schemeClr val="dk1">
+            <a:lumMod val="25000"/>
+            <a:lumOff val="75000"/>
+          </a:schemeClr>
+        </a:solidFill>
+      </a:ln>
+    </cs:spPr>
+    <cs:defRPr sz="1197" kern="1200"/>
+    <cs:bodyPr rot="0" spcFirstLastPara="1" vertOverflow="clip" horzOverflow="clip" vert="horz" wrap="square" lIns="36576" tIns="18288" rIns="36576" bIns="18288" anchor="ctr" anchorCtr="1">
+      <a:spAutoFit/>
+    </cs:bodyPr>
+  </cs:dataLabelCallout>
+  <cs:dataPoint>
+    <cs:lnRef idx="0">
+      <cs:styleClr val="auto"/>
+    </cs:lnRef>
+    <cs:fillRef idx="2">
+      <cs:styleClr val="auto"/>
+    </cs:fillRef>
+    <cs:effectRef idx="1"/>
+    <cs:fontRef idx="minor">
+      <a:schemeClr val="dk1"/>
+    </cs:fontRef>
+    <cs:spPr>
+      <a:ln w="9525" cap="flat" cmpd="sng" algn="ctr">
+        <a:solidFill>
+          <a:schemeClr val="phClr">
+            <a:shade val="95000"/>
+          </a:schemeClr>
+        </a:solidFill>
+        <a:round/>
+      </a:ln>
+    </cs:spPr>
+  </cs:dataPoint>
+  <cs:dataPoint3D>
+    <cs:lnRef idx="0">
+      <cs:styleClr val="auto"/>
+    </cs:lnRef>
+    <cs:fillRef idx="2">
+      <cs:styleClr val="auto"/>
+    </cs:fillRef>
+    <cs:effectRef idx="1"/>
+    <cs:fontRef idx="minor">
+      <a:schemeClr val="dk1"/>
+    </cs:fontRef>
+    <cs:spPr>
+      <a:ln w="9525" cap="flat" cmpd="sng" algn="ctr">
+        <a:solidFill>
+          <a:schemeClr val="phClr">
+            <a:shade val="95000"/>
+          </a:schemeClr>
+        </a:solidFill>
+        <a:round/>
+      </a:ln>
+    </cs:spPr>
+  </cs:dataPoint3D>
+  <cs:dataPointLine>
+    <cs:lnRef idx="0">
+      <cs:styleClr val="auto"/>
+    </cs:lnRef>
+    <cs:fillRef idx="2">
+      <cs:styleClr val="auto"/>
+    </cs:fillRef>
+    <cs:effectRef idx="1"/>
+    <cs:fontRef idx="minor">
+      <a:schemeClr val="dk1"/>
+    </cs:fontRef>
+    <cs:spPr>
+      <a:ln w="15875" cap="rnd">
+        <a:solidFill>
+          <a:schemeClr val="phClr"/>
+        </a:solidFill>
+        <a:round/>
+      </a:ln>
+    </cs:spPr>
+  </cs:dataPointLine>
+  <cs:dataPointMarker>
+    <cs:lnRef idx="0">
+      <cs:styleClr val="auto"/>
+    </cs:lnRef>
+    <cs:fillRef idx="2">
+      <cs:styleClr val="auto"/>
+    </cs:fillRef>
+    <cs:effectRef idx="1"/>
+    <cs:fontRef idx="minor">
+      <a:schemeClr val="dk1"/>
+    </cs:fontRef>
+    <cs:spPr>
+      <a:ln w="9525" cap="flat" cmpd="sng" algn="ctr">
+        <a:solidFill>
+          <a:schemeClr val="phClr">
+            <a:shade val="95000"/>
+          </a:schemeClr>
+        </a:solidFill>
+        <a:round/>
+      </a:ln>
+    </cs:spPr>
+  </cs:dataPointMarker>
+  <cs:dataPointMarkerLayout symbol="circle" size="4"/>
+  <cs:dataPointWireframe>
+    <cs:lnRef idx="0">
+      <cs:styleClr val="auto"/>
+    </cs:lnRef>
+    <cs:fillRef idx="2"/>
+    <cs:effectRef idx="0"/>
+    <cs:fontRef idx="minor">
+      <a:schemeClr val="dk1"/>
+    </cs:fontRef>
+    <cs:spPr>
+      <a:ln w="9525" cap="rnd">
+        <a:solidFill>
+          <a:schemeClr val="phClr"/>
+        </a:solidFill>
+        <a:round/>
+      </a:ln>
+    </cs:spPr>
+  </cs:dataPointWireframe>
+  <cs:dataTable>
+    <cs:lnRef idx="0"/>
+    <cs:fillRef idx="0"/>
+    <cs:effectRef idx="0"/>
+    <cs:fontRef idx="minor">
+      <a:schemeClr val="tx1">
+        <a:lumMod val="50000"/>
+        <a:lumOff val="50000"/>
+      </a:schemeClr>
+    </cs:fontRef>
+    <cs:spPr>
+      <a:ln w="9525">
+        <a:solidFill>
+          <a:schemeClr val="tx1">
+            <a:lumMod val="15000"/>
+            <a:lumOff val="85000"/>
+          </a:schemeClr>
+        </a:solidFill>
+      </a:ln>
+    </cs:spPr>
+    <cs:defRPr sz="1197" kern="1200"/>
+  </cs:dataTable>
+  <cs:downBar>
+    <cs:lnRef idx="0"/>
+    <cs:fillRef idx="0"/>
+    <cs:effectRef idx="0"/>
+    <cs:fontRef idx="minor">
+      <a:schemeClr val="dk1"/>
+    </cs:fontRef>
+    <cs:spPr>
+      <a:solidFill>
+        <a:schemeClr val="dk1">
+          <a:lumMod val="75000"/>
+          <a:lumOff val="25000"/>
+        </a:schemeClr>
+      </a:solidFill>
+      <a:ln w="9525">
+        <a:solidFill>
+          <a:schemeClr val="tx1">
+            <a:lumMod val="50000"/>
+            <a:lumOff val="50000"/>
+          </a:schemeClr>
+        </a:solidFill>
+      </a:ln>
+    </cs:spPr>
+  </cs:downBar>
+  <cs:dropLine>
+    <cs:lnRef idx="0"/>
+    <cs:fillRef idx="0"/>
+    <cs:effectRef idx="0"/>
+    <cs:fontRef idx="minor">
+      <a:schemeClr val="dk1"/>
+    </cs:fontRef>
+    <cs:spPr>
+      <a:ln w="9525">
+        <a:solidFill>
+          <a:schemeClr val="tx1">
+            <a:lumMod val="35000"/>
+            <a:lumOff val="65000"/>
+          </a:schemeClr>
+        </a:solidFill>
+        <a:prstDash val="dash"/>
+      </a:ln>
+    </cs:spPr>
+  </cs:dropLine>
+  <cs:errorBar>
+    <cs:lnRef idx="0"/>
+    <cs:fillRef idx="0"/>
+    <cs:effectRef idx="0"/>
+    <cs:fontRef idx="minor">
+      <a:schemeClr val="dk1"/>
+    </cs:fontRef>
+    <cs:spPr>
+      <a:ln w="9525">
+        <a:solidFill>
+          <a:schemeClr val="tx1">
+            <a:lumMod val="50000"/>
+            <a:lumOff val="50000"/>
+          </a:schemeClr>
+        </a:solidFill>
+      </a:ln>
+    </cs:spPr>
+  </cs:errorBar>
+  <cs:floor>
+    <cs:lnRef idx="0"/>
+    <cs:fillRef idx="0"/>
+    <cs:effectRef idx="0"/>
+    <cs:fontRef idx="minor">
+      <a:schemeClr val="dk1"/>
+    </cs:fontRef>
+  </cs:floor>
+  <cs:gridlineMajor>
+    <cs:lnRef idx="0"/>
+    <cs:fillRef idx="0"/>
+    <cs:effectRef idx="0"/>
+    <cs:fontRef idx="minor">
+      <a:schemeClr val="dk1"/>
+    </cs:fontRef>
+    <cs:spPr>
+      <a:ln w="9525" cap="flat" cmpd="sng" algn="ctr">
+        <a:solidFill>
+          <a:schemeClr val="tx1">
+            <a:lumMod val="15000"/>
+            <a:lumOff val="85000"/>
+          </a:schemeClr>
+        </a:solidFill>
+        <a:round/>
+      </a:ln>
+    </cs:spPr>
+  </cs:gridlineMajor>
+  <cs:gridlineMinor>
+    <cs:lnRef idx="0"/>
+    <cs:fillRef idx="0"/>
+    <cs:effectRef idx="0"/>
+    <cs:fontRef idx="minor">
+      <a:schemeClr val="dk1"/>
+    </cs:fontRef>
+    <cs:spPr>
+      <a:ln>
+        <a:solidFill>
+          <a:schemeClr val="tx1">
+            <a:lumMod val="5000"/>
+            <a:lumOff val="95000"/>
+          </a:schemeClr>
+        </a:solidFill>
+      </a:ln>
+    </cs:spPr>
+  </cs:gridlineMinor>
+  <cs:hiLoLine>
+    <cs:lnRef idx="0"/>
+    <cs:fillRef idx="0"/>
+    <cs:effectRef idx="0"/>
+    <cs:fontRef idx="minor">
+      <a:schemeClr val="dk1"/>
+    </cs:fontRef>
+    <cs:spPr>
+      <a:ln w="9525">
+        <a:solidFill>
+          <a:schemeClr val="tx1">
+            <a:lumMod val="50000"/>
+            <a:lumOff val="50000"/>
+          </a:schemeClr>
+        </a:solidFill>
+        <a:prstDash val="dash"/>
+      </a:ln>
+    </cs:spPr>
+  </cs:hiLoLine>
+  <cs:leaderLine>
+    <cs:lnRef idx="0"/>
+    <cs:fillRef idx="0"/>
+    <cs:effectRef idx="0"/>
+    <cs:fontRef idx="minor">
+      <a:schemeClr val="dk1"/>
+    </cs:fontRef>
+    <cs:spPr>
+      <a:ln w="9525">
+        <a:solidFill>
+          <a:schemeClr val="tx1">
+            <a:lumMod val="35000"/>
+            <a:lumOff val="65000"/>
+          </a:schemeClr>
+        </a:solidFill>
+      </a:ln>
+    </cs:spPr>
+  </cs:leaderLine>
+  <cs:legend>
+    <cs:lnRef idx="0"/>
+    <cs:fillRef idx="0"/>
+    <cs:effectRef idx="0"/>
+    <cs:fontRef idx="minor">
+      <a:schemeClr val="tx1">
+        <a:lumMod val="50000"/>
+        <a:lumOff val="50000"/>
+      </a:schemeClr>
+    </cs:fontRef>
+    <cs:defRPr sz="1197" kern="1200"/>
+  </cs:legend>
+  <cs:plotArea mods="allowNoFillOverride allowNoLineOverride">
+    <cs:lnRef idx="0"/>
+    <cs:fillRef idx="0"/>
+    <cs:effectRef idx="0"/>
+    <cs:fontRef idx="minor">
+      <a:schemeClr val="dk1"/>
+    </cs:fontRef>
+  </cs:plotArea>
+  <cs:plotArea3D mods="allowNoFillOverride allowNoLineOverride">
+    <cs:lnRef idx="0"/>
+    <cs:fillRef idx="0"/>
+    <cs:effectRef idx="0"/>
+    <cs:fontRef idx="minor">
+      <a:schemeClr val="dk1"/>
+    </cs:fontRef>
+  </cs:plotArea3D>
+  <cs:seriesAxis>
+    <cs:lnRef idx="0"/>
+    <cs:fillRef idx="0"/>
+    <cs:effectRef idx="0"/>
+    <cs:fontRef idx="minor">
+      <a:schemeClr val="tx1">
+        <a:lumMod val="50000"/>
+        <a:lumOff val="50000"/>
+      </a:schemeClr>
+    </cs:fontRef>
+    <cs:spPr>
+      <a:ln w="9525" cap="flat" cmpd="sng" algn="ctr">
+        <a:solidFill>
+          <a:schemeClr val="tx1">
+            <a:lumMod val="15000"/>
+            <a:lumOff val="85000"/>
+          </a:schemeClr>
+        </a:solidFill>
+        <a:round/>
+      </a:ln>
+    </cs:spPr>
+    <cs:defRPr sz="1197" kern="1200"/>
+  </cs:seriesAxis>
+  <cs:seriesLine>
+    <cs:lnRef idx="0"/>
+    <cs:fillRef idx="0"/>
+    <cs:effectRef idx="0"/>
+    <cs:fontRef idx="minor">
+      <a:schemeClr val="dk1"/>
+    </cs:fontRef>
+    <cs:spPr>
+      <a:ln w="9525">
+        <a:solidFill>
+          <a:schemeClr val="tx1">
+            <a:lumMod val="35000"/>
+            <a:lumOff val="65000"/>
+          </a:schemeClr>
+        </a:solidFill>
+        <a:prstDash val="dash"/>
+      </a:ln>
+    </cs:spPr>
+  </cs:seriesLine>
+  <cs:title>
+    <cs:lnRef idx="0"/>
+    <cs:fillRef idx="0"/>
+    <cs:effectRef idx="0"/>
+    <cs:fontRef idx="minor">
+      <a:schemeClr val="tx1">
+        <a:lumMod val="50000"/>
+        <a:lumOff val="50000"/>
+      </a:schemeClr>
+    </cs:fontRef>
+    <cs:defRPr sz="1862" kern="1200" cap="none" spc="20" baseline="0"/>
+  </cs:title>
+  <cs:trendline>
+    <cs:lnRef idx="0">
+      <cs:styleClr val="auto"/>
+    </cs:lnRef>
+    <cs:fillRef idx="2"/>
+    <cs:effectRef idx="0"/>
+    <cs:fontRef idx="minor">
+      <a:schemeClr val="dk1"/>
+    </cs:fontRef>
+    <cs:spPr>
+      <a:ln w="9525" cap="rnd">
+        <a:solidFill>
+          <a:schemeClr val="phClr"/>
+        </a:solidFill>
+      </a:ln>
+    </cs:spPr>
+  </cs:trendline>
+  <cs:trendlineLabel>
+    <cs:lnRef idx="0"/>
+    <cs:fillRef idx="0"/>
+    <cs:effectRef idx="0"/>
+    <cs:fontRef idx="minor">
+      <a:schemeClr val="tx1">
+        <a:lumMod val="50000"/>
+        <a:lumOff val="50000"/>
+      </a:schemeClr>
+    </cs:fontRef>
+    <cs:defRPr sz="1197" kern="1200"/>
+  </cs:trendlineLabel>
+  <cs:upBar>
+    <cs:lnRef idx="0"/>
+    <cs:fillRef idx="0"/>
+    <cs:effectRef idx="0"/>
+    <cs:fontRef idx="minor">
+      <a:schemeClr val="dk1"/>
+    </cs:fontRef>
+    <cs:spPr>
+      <a:solidFill>
+        <a:schemeClr val="lt1"/>
+      </a:solidFill>
+      <a:ln w="9525">
+        <a:solidFill>
+          <a:schemeClr val="tx1">
+            <a:lumMod val="50000"/>
+            <a:lumOff val="50000"/>
+          </a:schemeClr>
+        </a:solidFill>
+      </a:ln>
+    </cs:spPr>
+  </cs:upBar>
+  <cs:valueAxis>
+    <cs:lnRef idx="0"/>
+    <cs:fillRef idx="0"/>
+    <cs:effectRef idx="0"/>
+    <cs:fontRef idx="minor">
+      <a:schemeClr val="tx1">
+        <a:lumMod val="50000"/>
+        <a:lumOff val="50000"/>
+      </a:schemeClr>
+    </cs:fontRef>
+    <cs:defRPr sz="1197" kern="1200"/>
+  </cs:valueAxis>
+  <cs:wall>
+    <cs:lnRef idx="0"/>
+    <cs:fillRef idx="0"/>
+    <cs:effectRef idx="0"/>
+    <cs:fontRef idx="minor">
+      <a:schemeClr val="dk1"/>
+    </cs:fontRef>
+  </cs:wall>
+</cs:chartStyle>
 </file>
 
 <file path=ppt/slideLayouts/slideLayout1.xml><?xml version="1.0" encoding="utf-8"?>
@@ -149,10 +2884,9 @@
           </a:lstStyle>
           <a:p>
             <a:r>
-              <a:rPr lang="en-US" smtClean="0"/>
+              <a:rPr lang="en-US"/>
               <a:t>Click to edit Master title style</a:t>
             </a:r>
-            <a:endParaRPr lang="en-US"/>
           </a:p>
         </p:txBody>
       </p:sp>
@@ -214,10 +2948,9 @@
           </a:lstStyle>
           <a:p>
             <a:r>
-              <a:rPr lang="en-US" smtClean="0"/>
+              <a:rPr lang="en-US"/>
               <a:t>Click to edit Master subtitle style</a:t>
             </a:r>
-            <a:endParaRPr lang="en-US"/>
           </a:p>
         </p:txBody>
       </p:sp>
@@ -238,7 +2971,7 @@
           <a:p>
             <a:fld id="{63A1C593-65D0-4073-BCC9-577B9352EA97}" type="datetimeFigureOut">
               <a:rPr lang="en-US" smtClean="0"/>
-              <a:t>11/27/2015</a:t>
+              <a:t>4/24/2019</a:t>
             </a:fld>
             <a:endParaRPr lang="en-US"/>
           </a:p>
@@ -332,10 +3065,9 @@
           <a:lstStyle/>
           <a:p>
             <a:r>
-              <a:rPr lang="en-US" smtClean="0"/>
+              <a:rPr lang="en-US"/>
               <a:t>Click to edit Master title style</a:t>
             </a:r>
-            <a:endParaRPr lang="en-US"/>
           </a:p>
         </p:txBody>
       </p:sp>
@@ -356,38 +3088,37 @@
           <a:p>
             <a:pPr lvl="0"/>
             <a:r>
-              <a:rPr lang="en-US" smtClean="0"/>
+              <a:rPr lang="en-US"/>
               <a:t>Click to edit Master text styles</a:t>
             </a:r>
           </a:p>
           <a:p>
             <a:pPr lvl="1"/>
             <a:r>
-              <a:rPr lang="en-US" smtClean="0"/>
+              <a:rPr lang="en-US"/>
               <a:t>Second level</a:t>
             </a:r>
           </a:p>
           <a:p>
             <a:pPr lvl="2"/>
             <a:r>
-              <a:rPr lang="en-US" smtClean="0"/>
+              <a:rPr lang="en-US"/>
               <a:t>Third level</a:t>
             </a:r>
           </a:p>
           <a:p>
             <a:pPr lvl="3"/>
             <a:r>
-              <a:rPr lang="en-US" smtClean="0"/>
+              <a:rPr lang="en-US"/>
               <a:t>Fourth level</a:t>
             </a:r>
           </a:p>
           <a:p>
             <a:pPr lvl="4"/>
             <a:r>
-              <a:rPr lang="en-US" smtClean="0"/>
+              <a:rPr lang="en-US"/>
               <a:t>Fifth level</a:t>
             </a:r>
-            <a:endParaRPr lang="en-US"/>
           </a:p>
         </p:txBody>
       </p:sp>
@@ -408,7 +3139,7 @@
           <a:p>
             <a:fld id="{63A1C593-65D0-4073-BCC9-577B9352EA97}" type="datetimeFigureOut">
               <a:rPr lang="en-US" smtClean="0"/>
-              <a:t>11/27/2015</a:t>
+              <a:t>4/24/2019</a:t>
             </a:fld>
             <a:endParaRPr lang="en-US"/>
           </a:p>
@@ -507,10 +3238,9 @@
           <a:lstStyle/>
           <a:p>
             <a:r>
-              <a:rPr lang="en-US" smtClean="0"/>
+              <a:rPr lang="en-US"/>
               <a:t>Click to edit Master title style</a:t>
             </a:r>
-            <a:endParaRPr lang="en-US"/>
           </a:p>
         </p:txBody>
       </p:sp>
@@ -536,38 +3266,37 @@
           <a:p>
             <a:pPr lvl="0"/>
             <a:r>
-              <a:rPr lang="en-US" smtClean="0"/>
+              <a:rPr lang="en-US"/>
               <a:t>Click to edit Master text styles</a:t>
             </a:r>
           </a:p>
           <a:p>
             <a:pPr lvl="1"/>
             <a:r>
-              <a:rPr lang="en-US" smtClean="0"/>
+              <a:rPr lang="en-US"/>
               <a:t>Second level</a:t>
             </a:r>
           </a:p>
           <a:p>
             <a:pPr lvl="2"/>
             <a:r>
-              <a:rPr lang="en-US" smtClean="0"/>
+              <a:rPr lang="en-US"/>
               <a:t>Third level</a:t>
             </a:r>
           </a:p>
           <a:p>
             <a:pPr lvl="3"/>
             <a:r>
-              <a:rPr lang="en-US" smtClean="0"/>
+              <a:rPr lang="en-US"/>
               <a:t>Fourth level</a:t>
             </a:r>
           </a:p>
           <a:p>
             <a:pPr lvl="4"/>
             <a:r>
-              <a:rPr lang="en-US" smtClean="0"/>
+              <a:rPr lang="en-US"/>
               <a:t>Fifth level</a:t>
             </a:r>
-            <a:endParaRPr lang="en-US"/>
           </a:p>
         </p:txBody>
       </p:sp>
@@ -588,7 +3317,7 @@
           <a:p>
             <a:fld id="{63A1C593-65D0-4073-BCC9-577B9352EA97}" type="datetimeFigureOut">
               <a:rPr lang="en-US" smtClean="0"/>
-              <a:t>11/27/2015</a:t>
+              <a:t>4/24/2019</a:t>
             </a:fld>
             <a:endParaRPr lang="en-US"/>
           </a:p>
@@ -682,10 +3411,9 @@
           <a:lstStyle/>
           <a:p>
             <a:r>
-              <a:rPr lang="en-US" smtClean="0"/>
+              <a:rPr lang="en-US"/>
               <a:t>Click to edit Master title style</a:t>
             </a:r>
-            <a:endParaRPr lang="en-US"/>
           </a:p>
         </p:txBody>
       </p:sp>
@@ -706,38 +3434,37 @@
           <a:p>
             <a:pPr lvl="0"/>
             <a:r>
-              <a:rPr lang="en-US" smtClean="0"/>
+              <a:rPr lang="en-US"/>
               <a:t>Click to edit Master text styles</a:t>
             </a:r>
           </a:p>
           <a:p>
             <a:pPr lvl="1"/>
             <a:r>
-              <a:rPr lang="en-US" smtClean="0"/>
+              <a:rPr lang="en-US"/>
               <a:t>Second level</a:t>
             </a:r>
           </a:p>
           <a:p>
             <a:pPr lvl="2"/>
             <a:r>
-              <a:rPr lang="en-US" smtClean="0"/>
+              <a:rPr lang="en-US"/>
               <a:t>Third level</a:t>
             </a:r>
           </a:p>
           <a:p>
             <a:pPr lvl="3"/>
             <a:r>
-              <a:rPr lang="en-US" smtClean="0"/>
+              <a:rPr lang="en-US"/>
               <a:t>Fourth level</a:t>
             </a:r>
           </a:p>
           <a:p>
             <a:pPr lvl="4"/>
             <a:r>
-              <a:rPr lang="en-US" smtClean="0"/>
+              <a:rPr lang="en-US"/>
               <a:t>Fifth level</a:t>
             </a:r>
-            <a:endParaRPr lang="en-US"/>
           </a:p>
         </p:txBody>
       </p:sp>
@@ -758,7 +3485,7 @@
           <a:p>
             <a:fld id="{63A1C593-65D0-4073-BCC9-577B9352EA97}" type="datetimeFigureOut">
               <a:rPr lang="en-US" smtClean="0"/>
-              <a:t>11/27/2015</a:t>
+              <a:t>4/24/2019</a:t>
             </a:fld>
             <a:endParaRPr lang="en-US"/>
           </a:p>
@@ -861,10 +3588,9 @@
           </a:lstStyle>
           <a:p>
             <a:r>
-              <a:rPr lang="en-US" smtClean="0"/>
+              <a:rPr lang="en-US"/>
               <a:t>Click to edit Master title style</a:t>
             </a:r>
-            <a:endParaRPr lang="en-US"/>
           </a:p>
         </p:txBody>
       </p:sp>
@@ -981,7 +3707,7 @@
           <a:p>
             <a:pPr lvl="0"/>
             <a:r>
-              <a:rPr lang="en-US" smtClean="0"/>
+              <a:rPr lang="en-US"/>
               <a:t>Click to edit Master text styles</a:t>
             </a:r>
           </a:p>
@@ -1004,7 +3730,7 @@
           <a:p>
             <a:fld id="{63A1C593-65D0-4073-BCC9-577B9352EA97}" type="datetimeFigureOut">
               <a:rPr lang="en-US" smtClean="0"/>
-              <a:t>11/27/2015</a:t>
+              <a:t>4/24/2019</a:t>
             </a:fld>
             <a:endParaRPr lang="en-US"/>
           </a:p>
@@ -1098,10 +3824,9 @@
           <a:lstStyle/>
           <a:p>
             <a:r>
-              <a:rPr lang="en-US" smtClean="0"/>
+              <a:rPr lang="en-US"/>
               <a:t>Click to edit Master title style</a:t>
             </a:r>
-            <a:endParaRPr lang="en-US"/>
           </a:p>
         </p:txBody>
       </p:sp>
@@ -1127,38 +3852,37 @@
           <a:p>
             <a:pPr lvl="0"/>
             <a:r>
-              <a:rPr lang="en-US" smtClean="0"/>
+              <a:rPr lang="en-US"/>
               <a:t>Click to edit Master text styles</a:t>
             </a:r>
           </a:p>
           <a:p>
             <a:pPr lvl="1"/>
             <a:r>
-              <a:rPr lang="en-US" smtClean="0"/>
+              <a:rPr lang="en-US"/>
               <a:t>Second level</a:t>
             </a:r>
           </a:p>
           <a:p>
             <a:pPr lvl="2"/>
             <a:r>
-              <a:rPr lang="en-US" smtClean="0"/>
+              <a:rPr lang="en-US"/>
               <a:t>Third level</a:t>
             </a:r>
           </a:p>
           <a:p>
             <a:pPr lvl="3"/>
             <a:r>
-              <a:rPr lang="en-US" smtClean="0"/>
+              <a:rPr lang="en-US"/>
               <a:t>Fourth level</a:t>
             </a:r>
           </a:p>
           <a:p>
             <a:pPr lvl="4"/>
             <a:r>
-              <a:rPr lang="en-US" smtClean="0"/>
+              <a:rPr lang="en-US"/>
               <a:t>Fifth level</a:t>
             </a:r>
-            <a:endParaRPr lang="en-US"/>
           </a:p>
         </p:txBody>
       </p:sp>
@@ -1184,38 +3908,37 @@
           <a:p>
             <a:pPr lvl="0"/>
             <a:r>
-              <a:rPr lang="en-US" smtClean="0"/>
+              <a:rPr lang="en-US"/>
               <a:t>Click to edit Master text styles</a:t>
             </a:r>
           </a:p>
           <a:p>
             <a:pPr lvl="1"/>
             <a:r>
-              <a:rPr lang="en-US" smtClean="0"/>
+              <a:rPr lang="en-US"/>
               <a:t>Second level</a:t>
             </a:r>
           </a:p>
           <a:p>
             <a:pPr lvl="2"/>
             <a:r>
-              <a:rPr lang="en-US" smtClean="0"/>
+              <a:rPr lang="en-US"/>
               <a:t>Third level</a:t>
             </a:r>
           </a:p>
           <a:p>
             <a:pPr lvl="3"/>
             <a:r>
-              <a:rPr lang="en-US" smtClean="0"/>
+              <a:rPr lang="en-US"/>
               <a:t>Fourth level</a:t>
             </a:r>
           </a:p>
           <a:p>
             <a:pPr lvl="4"/>
             <a:r>
-              <a:rPr lang="en-US" smtClean="0"/>
+              <a:rPr lang="en-US"/>
               <a:t>Fifth level</a:t>
             </a:r>
-            <a:endParaRPr lang="en-US"/>
           </a:p>
         </p:txBody>
       </p:sp>
@@ -1236,7 +3959,7 @@
           <a:p>
             <a:fld id="{63A1C593-65D0-4073-BCC9-577B9352EA97}" type="datetimeFigureOut">
               <a:rPr lang="en-US" smtClean="0"/>
-              <a:t>11/27/2015</a:t>
+              <a:t>4/24/2019</a:t>
             </a:fld>
             <a:endParaRPr lang="en-US"/>
           </a:p>
@@ -1335,10 +4058,9 @@
           <a:lstStyle/>
           <a:p>
             <a:r>
-              <a:rPr lang="en-US" smtClean="0"/>
+              <a:rPr lang="en-US"/>
               <a:t>Click to edit Master title style</a:t>
             </a:r>
-            <a:endParaRPr lang="en-US"/>
           </a:p>
         </p:txBody>
       </p:sp>
@@ -1401,7 +4123,7 @@
           <a:p>
             <a:pPr lvl="0"/>
             <a:r>
-              <a:rPr lang="en-US" smtClean="0"/>
+              <a:rPr lang="en-US"/>
               <a:t>Click to edit Master text styles</a:t>
             </a:r>
           </a:p>
@@ -1429,38 +4151,37 @@
           <a:p>
             <a:pPr lvl="0"/>
             <a:r>
-              <a:rPr lang="en-US" smtClean="0"/>
+              <a:rPr lang="en-US"/>
               <a:t>Click to edit Master text styles</a:t>
             </a:r>
           </a:p>
           <a:p>
             <a:pPr lvl="1"/>
             <a:r>
-              <a:rPr lang="en-US" smtClean="0"/>
+              <a:rPr lang="en-US"/>
               <a:t>Second level</a:t>
             </a:r>
           </a:p>
           <a:p>
             <a:pPr lvl="2"/>
             <a:r>
-              <a:rPr lang="en-US" smtClean="0"/>
+              <a:rPr lang="en-US"/>
               <a:t>Third level</a:t>
             </a:r>
           </a:p>
           <a:p>
             <a:pPr lvl="3"/>
             <a:r>
-              <a:rPr lang="en-US" smtClean="0"/>
+              <a:rPr lang="en-US"/>
               <a:t>Fourth level</a:t>
             </a:r>
           </a:p>
           <a:p>
             <a:pPr lvl="4"/>
             <a:r>
-              <a:rPr lang="en-US" smtClean="0"/>
+              <a:rPr lang="en-US"/>
               <a:t>Fifth level</a:t>
             </a:r>
-            <a:endParaRPr lang="en-US"/>
           </a:p>
         </p:txBody>
       </p:sp>
@@ -1523,7 +4244,7 @@
           <a:p>
             <a:pPr lvl="0"/>
             <a:r>
-              <a:rPr lang="en-US" smtClean="0"/>
+              <a:rPr lang="en-US"/>
               <a:t>Click to edit Master text styles</a:t>
             </a:r>
           </a:p>
@@ -1551,38 +4272,37 @@
           <a:p>
             <a:pPr lvl="0"/>
             <a:r>
-              <a:rPr lang="en-US" smtClean="0"/>
+              <a:rPr lang="en-US"/>
               <a:t>Click to edit Master text styles</a:t>
             </a:r>
           </a:p>
           <a:p>
             <a:pPr lvl="1"/>
             <a:r>
-              <a:rPr lang="en-US" smtClean="0"/>
+              <a:rPr lang="en-US"/>
               <a:t>Second level</a:t>
             </a:r>
           </a:p>
           <a:p>
             <a:pPr lvl="2"/>
             <a:r>
-              <a:rPr lang="en-US" smtClean="0"/>
+              <a:rPr lang="en-US"/>
               <a:t>Third level</a:t>
             </a:r>
           </a:p>
           <a:p>
             <a:pPr lvl="3"/>
             <a:r>
-              <a:rPr lang="en-US" smtClean="0"/>
+              <a:rPr lang="en-US"/>
               <a:t>Fourth level</a:t>
             </a:r>
           </a:p>
           <a:p>
             <a:pPr lvl="4"/>
             <a:r>
-              <a:rPr lang="en-US" smtClean="0"/>
+              <a:rPr lang="en-US"/>
               <a:t>Fifth level</a:t>
             </a:r>
-            <a:endParaRPr lang="en-US"/>
           </a:p>
         </p:txBody>
       </p:sp>
@@ -1603,7 +4323,7 @@
           <a:p>
             <a:fld id="{63A1C593-65D0-4073-BCC9-577B9352EA97}" type="datetimeFigureOut">
               <a:rPr lang="en-US" smtClean="0"/>
-              <a:t>11/27/2015</a:t>
+              <a:t>4/24/2019</a:t>
             </a:fld>
             <a:endParaRPr lang="en-US"/>
           </a:p>
@@ -1697,10 +4417,9 @@
           <a:lstStyle/>
           <a:p>
             <a:r>
-              <a:rPr lang="en-US" smtClean="0"/>
+              <a:rPr lang="en-US"/>
               <a:t>Click to edit Master title style</a:t>
             </a:r>
-            <a:endParaRPr lang="en-US"/>
           </a:p>
         </p:txBody>
       </p:sp>
@@ -1721,7 +4440,7 @@
           <a:p>
             <a:fld id="{63A1C593-65D0-4073-BCC9-577B9352EA97}" type="datetimeFigureOut">
               <a:rPr lang="en-US" smtClean="0"/>
-              <a:t>11/27/2015</a:t>
+              <a:t>4/24/2019</a:t>
             </a:fld>
             <a:endParaRPr lang="en-US"/>
           </a:p>
@@ -1816,7 +4535,7 @@
           <a:p>
             <a:fld id="{63A1C593-65D0-4073-BCC9-577B9352EA97}" type="datetimeFigureOut">
               <a:rPr lang="en-US" smtClean="0"/>
-              <a:t>11/27/2015</a:t>
+              <a:t>4/24/2019</a:t>
             </a:fld>
             <a:endParaRPr lang="en-US"/>
           </a:p>
@@ -1919,10 +4638,9 @@
           </a:lstStyle>
           <a:p>
             <a:r>
-              <a:rPr lang="en-US" smtClean="0"/>
+              <a:rPr lang="en-US"/>
               <a:t>Click to edit Master title style</a:t>
             </a:r>
-            <a:endParaRPr lang="en-US"/>
           </a:p>
         </p:txBody>
       </p:sp>
@@ -1976,38 +4694,37 @@
           <a:p>
             <a:pPr lvl="0"/>
             <a:r>
-              <a:rPr lang="en-US" smtClean="0"/>
+              <a:rPr lang="en-US"/>
               <a:t>Click to edit Master text styles</a:t>
             </a:r>
           </a:p>
           <a:p>
             <a:pPr lvl="1"/>
             <a:r>
-              <a:rPr lang="en-US" smtClean="0"/>
+              <a:rPr lang="en-US"/>
               <a:t>Second level</a:t>
             </a:r>
           </a:p>
           <a:p>
             <a:pPr lvl="2"/>
             <a:r>
-              <a:rPr lang="en-US" smtClean="0"/>
+              <a:rPr lang="en-US"/>
               <a:t>Third level</a:t>
             </a:r>
           </a:p>
           <a:p>
             <a:pPr lvl="3"/>
             <a:r>
-              <a:rPr lang="en-US" smtClean="0"/>
+              <a:rPr lang="en-US"/>
               <a:t>Fourth level</a:t>
             </a:r>
           </a:p>
           <a:p>
             <a:pPr lvl="4"/>
             <a:r>
-              <a:rPr lang="en-US" smtClean="0"/>
+              <a:rPr lang="en-US"/>
               <a:t>Fifth level</a:t>
             </a:r>
-            <a:endParaRPr lang="en-US"/>
           </a:p>
         </p:txBody>
       </p:sp>
@@ -2070,7 +4787,7 @@
           <a:p>
             <a:pPr lvl="0"/>
             <a:r>
-              <a:rPr lang="en-US" smtClean="0"/>
+              <a:rPr lang="en-US"/>
               <a:t>Click to edit Master text styles</a:t>
             </a:r>
           </a:p>
@@ -2093,7 +4810,7 @@
           <a:p>
             <a:fld id="{63A1C593-65D0-4073-BCC9-577B9352EA97}" type="datetimeFigureOut">
               <a:rPr lang="en-US" smtClean="0"/>
-              <a:t>11/27/2015</a:t>
+              <a:t>4/24/2019</a:t>
             </a:fld>
             <a:endParaRPr lang="en-US"/>
           </a:p>
@@ -2196,10 +4913,9 @@
           </a:lstStyle>
           <a:p>
             <a:r>
-              <a:rPr lang="en-US" smtClean="0"/>
+              <a:rPr lang="en-US"/>
               <a:t>Click to edit Master title style</a:t>
             </a:r>
-            <a:endParaRPr lang="en-US"/>
           </a:p>
         </p:txBody>
       </p:sp>
@@ -2323,7 +5039,7 @@
           <a:p>
             <a:pPr lvl="0"/>
             <a:r>
-              <a:rPr lang="en-US" smtClean="0"/>
+              <a:rPr lang="en-US"/>
               <a:t>Click to edit Master text styles</a:t>
             </a:r>
           </a:p>
@@ -2346,7 +5062,7 @@
           <a:p>
             <a:fld id="{63A1C593-65D0-4073-BCC9-577B9352EA97}" type="datetimeFigureOut">
               <a:rPr lang="en-US" smtClean="0"/>
-              <a:t>11/27/2015</a:t>
+              <a:t>4/24/2019</a:t>
             </a:fld>
             <a:endParaRPr lang="en-US"/>
           </a:p>
@@ -2455,10 +5171,9 @@
           <a:lstStyle/>
           <a:p>
             <a:r>
-              <a:rPr lang="en-US" smtClean="0"/>
+              <a:rPr lang="en-US"/>
               <a:t>Click to edit Master title style</a:t>
             </a:r>
-            <a:endParaRPr lang="en-US"/>
           </a:p>
         </p:txBody>
       </p:sp>
@@ -2489,38 +5204,37 @@
           <a:p>
             <a:pPr lvl="0"/>
             <a:r>
-              <a:rPr lang="en-US" smtClean="0"/>
+              <a:rPr lang="en-US"/>
               <a:t>Click to edit Master text styles</a:t>
             </a:r>
           </a:p>
           <a:p>
             <a:pPr lvl="1"/>
             <a:r>
-              <a:rPr lang="en-US" smtClean="0"/>
+              <a:rPr lang="en-US"/>
               <a:t>Second level</a:t>
             </a:r>
           </a:p>
           <a:p>
             <a:pPr lvl="2"/>
             <a:r>
-              <a:rPr lang="en-US" smtClean="0"/>
+              <a:rPr lang="en-US"/>
               <a:t>Third level</a:t>
             </a:r>
           </a:p>
           <a:p>
             <a:pPr lvl="3"/>
             <a:r>
-              <a:rPr lang="en-US" smtClean="0"/>
+              <a:rPr lang="en-US"/>
               <a:t>Fourth level</a:t>
             </a:r>
           </a:p>
           <a:p>
             <a:pPr lvl="4"/>
             <a:r>
-              <a:rPr lang="en-US" smtClean="0"/>
+              <a:rPr lang="en-US"/>
               <a:t>Fifth level</a:t>
             </a:r>
-            <a:endParaRPr lang="en-US"/>
           </a:p>
         </p:txBody>
       </p:sp>
@@ -2559,7 +5273,7 @@
           <a:p>
             <a:fld id="{63A1C593-65D0-4073-BCC9-577B9352EA97}" type="datetimeFigureOut">
               <a:rPr lang="en-US" smtClean="0"/>
-              <a:t>11/27/2015</a:t>
+              <a:t>4/24/2019</a:t>
             </a:fld>
             <a:endParaRPr lang="en-US"/>
           </a:p>
@@ -2979,7 +5693,10 @@
           <a:bodyPr/>
           <a:lstStyle/>
           <a:p>
-            <a:endParaRPr lang="en-US" dirty="0"/>
+            <a:r>
+              <a:rPr lang="en-US" dirty="0"/>
+              <a:t>Strategy for Minimizing Shots in Battleship</a:t>
+            </a:r>
           </a:p>
         </p:txBody>
       </p:sp>
@@ -2998,7 +5715,10 @@
           <a:bodyPr/>
           <a:lstStyle/>
           <a:p>
-            <a:endParaRPr lang="en-US"/>
+            <a:r>
+              <a:rPr lang="en-US" dirty="0"/>
+              <a:t>Nicholas Winter and John Paul Depew</a:t>
+            </a:r>
           </a:p>
         </p:txBody>
       </p:sp>
@@ -3006,6 +5726,890 @@
     <p:extLst>
       <p:ext uri="{BB962C8B-B14F-4D97-AF65-F5344CB8AC3E}">
         <p14:creationId xmlns:p14="http://schemas.microsoft.com/office/powerpoint/2010/main" val="3072013332"/>
+      </p:ext>
+    </p:extLst>
+  </p:cSld>
+  <p:clrMapOvr>
+    <a:masterClrMapping/>
+  </p:clrMapOvr>
+</p:sld>
+</file>
+
+<file path=ppt/slides/slide2.xml><?xml version="1.0" encoding="utf-8"?>
+<p:sld xmlns:a="http://schemas.openxmlformats.org/drawingml/2006/main" xmlns:r="http://schemas.openxmlformats.org/officeDocument/2006/relationships" xmlns:p="http://schemas.openxmlformats.org/presentationml/2006/main">
+  <p:cSld>
+    <p:spTree>
+      <p:nvGrpSpPr>
+        <p:cNvPr id="1" name=""/>
+        <p:cNvGrpSpPr/>
+        <p:nvPr/>
+      </p:nvGrpSpPr>
+      <p:grpSpPr>
+        <a:xfrm>
+          <a:off x="0" y="0"/>
+          <a:ext cx="0" cy="0"/>
+          <a:chOff x="0" y="0"/>
+          <a:chExt cx="0" cy="0"/>
+        </a:xfrm>
+      </p:grpSpPr>
+      <p:sp>
+        <p:nvSpPr>
+          <p:cNvPr id="2" name="Title 1">
+            <a:extLst>
+              <a:ext uri="{FF2B5EF4-FFF2-40B4-BE49-F238E27FC236}">
+                <a16:creationId xmlns:a16="http://schemas.microsoft.com/office/drawing/2014/main" id="{160FB6F0-836D-417A-AEAD-EDF950201FE3}"/>
+              </a:ext>
+            </a:extLst>
+          </p:cNvPr>
+          <p:cNvSpPr>
+            <a:spLocks noGrp="1"/>
+          </p:cNvSpPr>
+          <p:nvPr>
+            <p:ph type="title"/>
+          </p:nvPr>
+        </p:nvSpPr>
+        <p:spPr/>
+        <p:txBody>
+          <a:bodyPr/>
+          <a:lstStyle/>
+          <a:p>
+            <a:r>
+              <a:rPr lang="en-US" dirty="0"/>
+              <a:t>Targeting Strategies</a:t>
+            </a:r>
+          </a:p>
+        </p:txBody>
+      </p:sp>
+      <p:sp>
+        <p:nvSpPr>
+          <p:cNvPr id="3" name="Content Placeholder 2">
+            <a:extLst>
+              <a:ext uri="{FF2B5EF4-FFF2-40B4-BE49-F238E27FC236}">
+                <a16:creationId xmlns:a16="http://schemas.microsoft.com/office/drawing/2014/main" id="{FF855F5E-69FE-41D7-A39D-8294E2DC9D09}"/>
+              </a:ext>
+            </a:extLst>
+          </p:cNvPr>
+          <p:cNvSpPr>
+            <a:spLocks noGrp="1"/>
+          </p:cNvSpPr>
+          <p:nvPr>
+            <p:ph idx="1"/>
+          </p:nvPr>
+        </p:nvSpPr>
+        <p:spPr/>
+        <p:txBody>
+          <a:bodyPr/>
+          <a:lstStyle/>
+          <a:p>
+            <a:r>
+              <a:rPr lang="en-US" dirty="0"/>
+              <a:t>Heatmap – based on surrounding misses and hits</a:t>
+            </a:r>
+          </a:p>
+          <a:p>
+            <a:endParaRPr lang="en-US" dirty="0"/>
+          </a:p>
+          <a:p>
+            <a:r>
+              <a:rPr lang="en-US" dirty="0"/>
+              <a:t>Strafing – minimizing initial shots by using a pattern to cover 1/3 of the board</a:t>
+            </a:r>
+          </a:p>
+          <a:p>
+            <a:endParaRPr lang="en-US" dirty="0"/>
+          </a:p>
+          <a:p>
+            <a:r>
+              <a:rPr lang="en-US" dirty="0"/>
+              <a:t>Clustering Detection – using logic to detect possible clustering</a:t>
+            </a:r>
+          </a:p>
+        </p:txBody>
+      </p:sp>
+    </p:spTree>
+    <p:extLst>
+      <p:ext uri="{BB962C8B-B14F-4D97-AF65-F5344CB8AC3E}">
+        <p14:creationId xmlns:p14="http://schemas.microsoft.com/office/powerpoint/2010/main" val="717596073"/>
+      </p:ext>
+    </p:extLst>
+  </p:cSld>
+  <p:clrMapOvr>
+    <a:masterClrMapping/>
+  </p:clrMapOvr>
+</p:sld>
+</file>
+
+<file path=ppt/slides/slide3.xml><?xml version="1.0" encoding="utf-8"?>
+<p:sld xmlns:a="http://schemas.openxmlformats.org/drawingml/2006/main" xmlns:r="http://schemas.openxmlformats.org/officeDocument/2006/relationships" xmlns:p="http://schemas.openxmlformats.org/presentationml/2006/main">
+  <p:cSld>
+    <p:spTree>
+      <p:nvGrpSpPr>
+        <p:cNvPr id="1" name=""/>
+        <p:cNvGrpSpPr/>
+        <p:nvPr/>
+      </p:nvGrpSpPr>
+      <p:grpSpPr>
+        <a:xfrm>
+          <a:off x="0" y="0"/>
+          <a:ext cx="0" cy="0"/>
+          <a:chOff x="0" y="0"/>
+          <a:chExt cx="0" cy="0"/>
+        </a:xfrm>
+      </p:grpSpPr>
+      <p:sp>
+        <p:nvSpPr>
+          <p:cNvPr id="2" name="Title 1">
+            <a:extLst>
+              <a:ext uri="{FF2B5EF4-FFF2-40B4-BE49-F238E27FC236}">
+                <a16:creationId xmlns:a16="http://schemas.microsoft.com/office/drawing/2014/main" id="{8D80338F-2339-4B0B-B122-2FCFD70493E9}"/>
+              </a:ext>
+            </a:extLst>
+          </p:cNvPr>
+          <p:cNvSpPr>
+            <a:spLocks noGrp="1"/>
+          </p:cNvSpPr>
+          <p:nvPr>
+            <p:ph type="title"/>
+          </p:nvPr>
+        </p:nvSpPr>
+        <p:spPr/>
+        <p:txBody>
+          <a:bodyPr/>
+          <a:lstStyle/>
+          <a:p>
+            <a:r>
+              <a:rPr lang="en-US" dirty="0"/>
+              <a:t>Predictions and Test Strategy</a:t>
+            </a:r>
+          </a:p>
+        </p:txBody>
+      </p:sp>
+      <p:sp>
+        <p:nvSpPr>
+          <p:cNvPr id="3" name="Content Placeholder 2">
+            <a:extLst>
+              <a:ext uri="{FF2B5EF4-FFF2-40B4-BE49-F238E27FC236}">
+                <a16:creationId xmlns:a16="http://schemas.microsoft.com/office/drawing/2014/main" id="{25271BF0-34C1-4EC8-8006-D5E12B6874B4}"/>
+              </a:ext>
+            </a:extLst>
+          </p:cNvPr>
+          <p:cNvSpPr>
+            <a:spLocks noGrp="1"/>
+          </p:cNvSpPr>
+          <p:nvPr>
+            <p:ph idx="1"/>
+          </p:nvPr>
+        </p:nvSpPr>
+        <p:spPr/>
+        <p:txBody>
+          <a:bodyPr/>
+          <a:lstStyle/>
+          <a:p>
+            <a:r>
+              <a:rPr lang="en-US" dirty="0"/>
+              <a:t>Each of these strategies will reduce number of turns on average for AI to finish games.</a:t>
+            </a:r>
+          </a:p>
+          <a:p>
+            <a:endParaRPr lang="en-US" dirty="0"/>
+          </a:p>
+          <a:p>
+            <a:r>
+              <a:rPr lang="en-US" dirty="0"/>
+              <a:t>Each strategy tested separately so that one will not interfere with other’s results</a:t>
+            </a:r>
+          </a:p>
+        </p:txBody>
+      </p:sp>
+    </p:spTree>
+    <p:extLst>
+      <p:ext uri="{BB962C8B-B14F-4D97-AF65-F5344CB8AC3E}">
+        <p14:creationId xmlns:p14="http://schemas.microsoft.com/office/powerpoint/2010/main" val="1504822876"/>
+      </p:ext>
+    </p:extLst>
+  </p:cSld>
+  <p:clrMapOvr>
+    <a:masterClrMapping/>
+  </p:clrMapOvr>
+</p:sld>
+</file>
+
+<file path=ppt/slides/slide4.xml><?xml version="1.0" encoding="utf-8"?>
+<p:sld xmlns:a="http://schemas.openxmlformats.org/drawingml/2006/main" xmlns:r="http://schemas.openxmlformats.org/officeDocument/2006/relationships" xmlns:p="http://schemas.openxmlformats.org/presentationml/2006/main">
+  <p:cSld>
+    <p:bg>
+      <p:bgPr>
+        <a:solidFill>
+          <a:schemeClr val="bg1"/>
+        </a:solidFill>
+        <a:effectLst/>
+      </p:bgPr>
+    </p:bg>
+    <p:spTree>
+      <p:nvGrpSpPr>
+        <p:cNvPr id="1" name=""/>
+        <p:cNvGrpSpPr/>
+        <p:nvPr/>
+      </p:nvGrpSpPr>
+      <p:grpSpPr>
+        <a:xfrm>
+          <a:off x="0" y="0"/>
+          <a:ext cx="0" cy="0"/>
+          <a:chOff x="0" y="0"/>
+          <a:chExt cx="0" cy="0"/>
+        </a:xfrm>
+      </p:grpSpPr>
+      <p:sp>
+        <p:nvSpPr>
+          <p:cNvPr id="11" name="Rectangle 8">
+            <a:extLst>
+              <a:ext uri="{FF2B5EF4-FFF2-40B4-BE49-F238E27FC236}">
+                <a16:creationId xmlns:a16="http://schemas.microsoft.com/office/drawing/2014/main" id="{867D4867-5BA7-4462-B2F6-A23F4A622AA7}"/>
+              </a:ext>
+              <a:ext uri="{C183D7F6-B498-43B3-948B-1728B52AA6E4}">
+                <adec:decorative xmlns:adec="http://schemas.microsoft.com/office/drawing/2017/decorative" val="1"/>
+              </a:ext>
+            </a:extLst>
+          </p:cNvPr>
+          <p:cNvSpPr>
+            <a:spLocks noGrp="1" noRot="1" noChangeAspect="1" noMove="1" noResize="1" noEditPoints="1" noAdjustHandles="1" noChangeArrowheads="1" noChangeShapeType="1" noTextEdit="1"/>
+          </p:cNvSpPr>
+          <p:nvPr>
+            <p:extLst>
+              <p:ext uri="{386F3935-93C4-4BCD-93E2-E3B085C9AB24}">
+                <p16:designElem xmlns:p16="http://schemas.microsoft.com/office/powerpoint/2015/main" val="1"/>
+              </p:ext>
+            </p:extLst>
+          </p:nvPr>
+        </p:nvSpPr>
+        <p:spPr>
+          <a:xfrm>
+            <a:off x="0" y="0"/>
+            <a:ext cx="4654296" cy="6858000"/>
+          </a:xfrm>
+          <a:prstGeom prst="rect">
+            <a:avLst/>
+          </a:prstGeom>
+          <a:solidFill>
+            <a:schemeClr val="tx1">
+              <a:lumMod val="75000"/>
+              <a:lumOff val="25000"/>
+            </a:schemeClr>
+          </a:solidFill>
+          <a:ln>
+            <a:noFill/>
+          </a:ln>
+        </p:spPr>
+        <p:style>
+          <a:lnRef idx="0">
+            <a:scrgbClr r="0" g="0" b="0"/>
+          </a:lnRef>
+          <a:fillRef idx="0">
+            <a:scrgbClr r="0" g="0" b="0"/>
+          </a:fillRef>
+          <a:effectRef idx="0">
+            <a:scrgbClr r="0" g="0" b="0"/>
+          </a:effectRef>
+          <a:fontRef idx="minor">
+            <a:schemeClr val="lt1"/>
+          </a:fontRef>
+        </p:style>
+        <p:txBody>
+          <a:bodyPr rtlCol="0" anchor="ctr"/>
+          <a:lstStyle/>
+          <a:p>
+            <a:pPr algn="ctr"/>
+            <a:endParaRPr lang="en-US"/>
+          </a:p>
+        </p:txBody>
+      </p:sp>
+      <p:sp>
+        <p:nvSpPr>
+          <p:cNvPr id="2" name="Title 1">
+            <a:extLst>
+              <a:ext uri="{FF2B5EF4-FFF2-40B4-BE49-F238E27FC236}">
+                <a16:creationId xmlns:a16="http://schemas.microsoft.com/office/drawing/2014/main" id="{43E2FE7B-2476-4537-9A85-39EF900ACB90}"/>
+              </a:ext>
+            </a:extLst>
+          </p:cNvPr>
+          <p:cNvSpPr>
+            <a:spLocks noGrp="1"/>
+          </p:cNvSpPr>
+          <p:nvPr>
+            <p:ph type="title"/>
+          </p:nvPr>
+        </p:nvSpPr>
+        <p:spPr>
+          <a:xfrm>
+            <a:off x="643467" y="643467"/>
+            <a:ext cx="3363974" cy="1597315"/>
+          </a:xfrm>
+          <a:noFill/>
+          <a:ln w="19050">
+            <a:solidFill>
+              <a:schemeClr val="bg1"/>
+            </a:solidFill>
+          </a:ln>
+        </p:spPr>
+        <p:txBody>
+          <a:bodyPr wrap="square">
+            <a:normAutofit/>
+          </a:bodyPr>
+          <a:lstStyle/>
+          <a:p>
+            <a:pPr algn="ctr"/>
+            <a:r>
+              <a:rPr lang="en-US" sz="2800">
+                <a:solidFill>
+                  <a:schemeClr val="bg1"/>
+                </a:solidFill>
+              </a:rPr>
+              <a:t>Heatmap</a:t>
+            </a:r>
+          </a:p>
+        </p:txBody>
+      </p:sp>
+      <p:sp>
+        <p:nvSpPr>
+          <p:cNvPr id="3" name="Content Placeholder 2">
+            <a:extLst>
+              <a:ext uri="{FF2B5EF4-FFF2-40B4-BE49-F238E27FC236}">
+                <a16:creationId xmlns:a16="http://schemas.microsoft.com/office/drawing/2014/main" id="{10ED26BF-7DC2-497B-BED7-1FE0E40ECD5D}"/>
+              </a:ext>
+            </a:extLst>
+          </p:cNvPr>
+          <p:cNvSpPr>
+            <a:spLocks noGrp="1"/>
+          </p:cNvSpPr>
+          <p:nvPr>
+            <p:ph idx="1"/>
+          </p:nvPr>
+        </p:nvSpPr>
+        <p:spPr>
+          <a:xfrm>
+            <a:off x="643468" y="2638044"/>
+            <a:ext cx="3363974" cy="3415622"/>
+          </a:xfrm>
+        </p:spPr>
+        <p:txBody>
+          <a:bodyPr>
+            <a:normAutofit/>
+          </a:bodyPr>
+          <a:lstStyle/>
+          <a:p>
+            <a:r>
+              <a:rPr lang="en-US" sz="2000" dirty="0">
+                <a:solidFill>
+                  <a:schemeClr val="bg1"/>
+                </a:solidFill>
+              </a:rPr>
+              <a:t>Description: For each cell, counted number of surrounding cells up to largest ship length and gave a higher value to that cell for more open surrounding cells. Nearby hits also increased the value.</a:t>
+            </a:r>
+          </a:p>
+          <a:p>
+            <a:r>
+              <a:rPr lang="en-US" sz="2000" dirty="0">
+                <a:solidFill>
+                  <a:schemeClr val="bg1"/>
+                </a:solidFill>
+              </a:rPr>
+              <a:t>Disappointing results. Only a 0.2 difference over about 20000 games.</a:t>
+            </a:r>
+          </a:p>
+        </p:txBody>
+      </p:sp>
+      <p:graphicFrame>
+        <p:nvGraphicFramePr>
+          <p:cNvPr id="4" name="Chart 3">
+            <a:extLst>
+              <a:ext uri="{FF2B5EF4-FFF2-40B4-BE49-F238E27FC236}">
+                <a16:creationId xmlns:a16="http://schemas.microsoft.com/office/drawing/2014/main" id="{75DF130B-1D69-4828-9E7B-E81B3121AFB6}"/>
+              </a:ext>
+            </a:extLst>
+          </p:cNvPr>
+          <p:cNvGraphicFramePr/>
+          <p:nvPr>
+            <p:extLst>
+              <p:ext uri="{D42A27DB-BD31-4B8C-83A1-F6EECF244321}">
+                <p14:modId xmlns:p14="http://schemas.microsoft.com/office/powerpoint/2010/main" val="3381615599"/>
+              </p:ext>
+            </p:extLst>
+          </p:nvPr>
+        </p:nvGraphicFramePr>
+        <p:xfrm>
+          <a:off x="5297763" y="643467"/>
+          <a:ext cx="6250769" cy="5410199"/>
+        </p:xfrm>
+        <a:graphic>
+          <a:graphicData uri="http://schemas.openxmlformats.org/drawingml/2006/chart">
+            <c:chart xmlns:c="http://schemas.openxmlformats.org/drawingml/2006/chart" xmlns:r="http://schemas.openxmlformats.org/officeDocument/2006/relationships" r:id="rId2"/>
+          </a:graphicData>
+        </a:graphic>
+      </p:graphicFrame>
+    </p:spTree>
+    <p:extLst>
+      <p:ext uri="{BB962C8B-B14F-4D97-AF65-F5344CB8AC3E}">
+        <p14:creationId xmlns:p14="http://schemas.microsoft.com/office/powerpoint/2010/main" val="3238206883"/>
+      </p:ext>
+    </p:extLst>
+  </p:cSld>
+  <p:clrMapOvr>
+    <a:masterClrMapping/>
+  </p:clrMapOvr>
+</p:sld>
+</file>
+
+<file path=ppt/slides/slide5.xml><?xml version="1.0" encoding="utf-8"?>
+<p:sld xmlns:a="http://schemas.openxmlformats.org/drawingml/2006/main" xmlns:r="http://schemas.openxmlformats.org/officeDocument/2006/relationships" xmlns:p="http://schemas.openxmlformats.org/presentationml/2006/main">
+  <p:cSld>
+    <p:bg>
+      <p:bgPr>
+        <a:solidFill>
+          <a:schemeClr val="bg1"/>
+        </a:solidFill>
+        <a:effectLst/>
+      </p:bgPr>
+    </p:bg>
+    <p:spTree>
+      <p:nvGrpSpPr>
+        <p:cNvPr id="1" name=""/>
+        <p:cNvGrpSpPr/>
+        <p:nvPr/>
+      </p:nvGrpSpPr>
+      <p:grpSpPr>
+        <a:xfrm>
+          <a:off x="0" y="0"/>
+          <a:ext cx="0" cy="0"/>
+          <a:chOff x="0" y="0"/>
+          <a:chExt cx="0" cy="0"/>
+        </a:xfrm>
+      </p:grpSpPr>
+      <p:sp>
+        <p:nvSpPr>
+          <p:cNvPr id="16" name="Rectangle 15">
+            <a:extLst>
+              <a:ext uri="{FF2B5EF4-FFF2-40B4-BE49-F238E27FC236}">
+                <a16:creationId xmlns:a16="http://schemas.microsoft.com/office/drawing/2014/main" id="{867D4867-5BA7-4462-B2F6-A23F4A622AA7}"/>
+              </a:ext>
+              <a:ext uri="{C183D7F6-B498-43B3-948B-1728B52AA6E4}">
+                <adec:decorative xmlns:adec="http://schemas.microsoft.com/office/drawing/2017/decorative" val="1"/>
+              </a:ext>
+            </a:extLst>
+          </p:cNvPr>
+          <p:cNvSpPr>
+            <a:spLocks noGrp="1" noRot="1" noChangeAspect="1" noMove="1" noResize="1" noEditPoints="1" noAdjustHandles="1" noChangeArrowheads="1" noChangeShapeType="1" noTextEdit="1"/>
+          </p:cNvSpPr>
+          <p:nvPr>
+            <p:extLst>
+              <p:ext uri="{386F3935-93C4-4BCD-93E2-E3B085C9AB24}">
+                <p16:designElem xmlns:p16="http://schemas.microsoft.com/office/powerpoint/2015/main" val="1"/>
+              </p:ext>
+            </p:extLst>
+          </p:nvPr>
+        </p:nvSpPr>
+        <p:spPr>
+          <a:xfrm>
+            <a:off x="0" y="0"/>
+            <a:ext cx="4654296" cy="6858000"/>
+          </a:xfrm>
+          <a:prstGeom prst="rect">
+            <a:avLst/>
+          </a:prstGeom>
+          <a:solidFill>
+            <a:schemeClr val="tx1">
+              <a:lumMod val="75000"/>
+              <a:lumOff val="25000"/>
+            </a:schemeClr>
+          </a:solidFill>
+          <a:ln>
+            <a:noFill/>
+          </a:ln>
+        </p:spPr>
+        <p:style>
+          <a:lnRef idx="0">
+            <a:scrgbClr r="0" g="0" b="0"/>
+          </a:lnRef>
+          <a:fillRef idx="0">
+            <a:scrgbClr r="0" g="0" b="0"/>
+          </a:fillRef>
+          <a:effectRef idx="0">
+            <a:scrgbClr r="0" g="0" b="0"/>
+          </a:effectRef>
+          <a:fontRef idx="minor">
+            <a:schemeClr val="lt1"/>
+          </a:fontRef>
+        </p:style>
+        <p:txBody>
+          <a:bodyPr rtlCol="0" anchor="ctr"/>
+          <a:lstStyle/>
+          <a:p>
+            <a:pPr algn="ctr"/>
+            <a:endParaRPr lang="en-US"/>
+          </a:p>
+        </p:txBody>
+      </p:sp>
+      <p:sp>
+        <p:nvSpPr>
+          <p:cNvPr id="2" name="Title 1">
+            <a:extLst>
+              <a:ext uri="{FF2B5EF4-FFF2-40B4-BE49-F238E27FC236}">
+                <a16:creationId xmlns:a16="http://schemas.microsoft.com/office/drawing/2014/main" id="{43E2FE7B-2476-4537-9A85-39EF900ACB90}"/>
+              </a:ext>
+            </a:extLst>
+          </p:cNvPr>
+          <p:cNvSpPr>
+            <a:spLocks noGrp="1"/>
+          </p:cNvSpPr>
+          <p:nvPr>
+            <p:ph type="title"/>
+          </p:nvPr>
+        </p:nvSpPr>
+        <p:spPr>
+          <a:xfrm>
+            <a:off x="643467" y="643467"/>
+            <a:ext cx="3363974" cy="1597315"/>
+          </a:xfrm>
+          <a:noFill/>
+          <a:ln w="19050">
+            <a:solidFill>
+              <a:schemeClr val="bg1"/>
+            </a:solidFill>
+          </a:ln>
+        </p:spPr>
+        <p:txBody>
+          <a:bodyPr wrap="square">
+            <a:normAutofit/>
+          </a:bodyPr>
+          <a:lstStyle/>
+          <a:p>
+            <a:pPr algn="ctr"/>
+            <a:r>
+              <a:rPr lang="en-US" sz="2800" dirty="0">
+                <a:solidFill>
+                  <a:schemeClr val="bg1"/>
+                </a:solidFill>
+              </a:rPr>
+              <a:t>Strafing</a:t>
+            </a:r>
+          </a:p>
+        </p:txBody>
+      </p:sp>
+      <p:sp>
+        <p:nvSpPr>
+          <p:cNvPr id="3" name="Content Placeholder 2">
+            <a:extLst>
+              <a:ext uri="{FF2B5EF4-FFF2-40B4-BE49-F238E27FC236}">
+                <a16:creationId xmlns:a16="http://schemas.microsoft.com/office/drawing/2014/main" id="{10ED26BF-7DC2-497B-BED7-1FE0E40ECD5D}"/>
+              </a:ext>
+            </a:extLst>
+          </p:cNvPr>
+          <p:cNvSpPr>
+            <a:spLocks noGrp="1"/>
+          </p:cNvSpPr>
+          <p:nvPr>
+            <p:ph idx="1"/>
+          </p:nvPr>
+        </p:nvSpPr>
+        <p:spPr>
+          <a:xfrm>
+            <a:off x="643468" y="2638044"/>
+            <a:ext cx="3363974" cy="3415622"/>
+          </a:xfrm>
+        </p:spPr>
+        <p:txBody>
+          <a:bodyPr>
+            <a:normAutofit/>
+          </a:bodyPr>
+          <a:lstStyle/>
+          <a:p>
+            <a:r>
+              <a:rPr lang="en-US" sz="2000" dirty="0">
+                <a:solidFill>
+                  <a:schemeClr val="bg1"/>
+                </a:solidFill>
+              </a:rPr>
+              <a:t>Description: Initially shooting at certain points on the board covering 1/3. Guaranteed to hit all ships except ship of length 2.</a:t>
+            </a:r>
+          </a:p>
+          <a:p>
+            <a:r>
+              <a:rPr lang="en-US" sz="2000" dirty="0">
+                <a:solidFill>
+                  <a:schemeClr val="bg1"/>
+                </a:solidFill>
+              </a:rPr>
+              <a:t>Notable results. Strafing resulted in about 6 fewer turns than only targeting even or odd cells, and about 15 fewer turns than random shooting.</a:t>
+            </a:r>
+          </a:p>
+        </p:txBody>
+      </p:sp>
+      <p:graphicFrame>
+        <p:nvGraphicFramePr>
+          <p:cNvPr id="6" name="Chart 5">
+            <a:extLst>
+              <a:ext uri="{FF2B5EF4-FFF2-40B4-BE49-F238E27FC236}">
+                <a16:creationId xmlns:a16="http://schemas.microsoft.com/office/drawing/2014/main" id="{5579ECBC-9690-440F-9578-AB518027AE25}"/>
+              </a:ext>
+            </a:extLst>
+          </p:cNvPr>
+          <p:cNvGraphicFramePr/>
+          <p:nvPr>
+            <p:extLst>
+              <p:ext uri="{D42A27DB-BD31-4B8C-83A1-F6EECF244321}">
+                <p14:modId xmlns:p14="http://schemas.microsoft.com/office/powerpoint/2010/main" val="567552875"/>
+              </p:ext>
+            </p:extLst>
+          </p:nvPr>
+        </p:nvGraphicFramePr>
+        <p:xfrm>
+          <a:off x="5297763" y="643467"/>
+          <a:ext cx="6250769" cy="5410199"/>
+        </p:xfrm>
+        <a:graphic>
+          <a:graphicData uri="http://schemas.openxmlformats.org/drawingml/2006/chart">
+            <c:chart xmlns:c="http://schemas.openxmlformats.org/drawingml/2006/chart" xmlns:r="http://schemas.openxmlformats.org/officeDocument/2006/relationships" r:id="rId2"/>
+          </a:graphicData>
+        </a:graphic>
+      </p:graphicFrame>
+    </p:spTree>
+    <p:extLst>
+      <p:ext uri="{BB962C8B-B14F-4D97-AF65-F5344CB8AC3E}">
+        <p14:creationId xmlns:p14="http://schemas.microsoft.com/office/powerpoint/2010/main" val="518111725"/>
+      </p:ext>
+    </p:extLst>
+  </p:cSld>
+  <p:clrMapOvr>
+    <a:masterClrMapping/>
+  </p:clrMapOvr>
+</p:sld>
+</file>
+
+<file path=ppt/slides/slide6.xml><?xml version="1.0" encoding="utf-8"?>
+<p:sld xmlns:a="http://schemas.openxmlformats.org/drawingml/2006/main" xmlns:r="http://schemas.openxmlformats.org/officeDocument/2006/relationships" xmlns:p="http://schemas.openxmlformats.org/presentationml/2006/main">
+  <p:cSld>
+    <p:bg>
+      <p:bgPr>
+        <a:solidFill>
+          <a:schemeClr val="bg1"/>
+        </a:solidFill>
+        <a:effectLst/>
+      </p:bgPr>
+    </p:bg>
+    <p:spTree>
+      <p:nvGrpSpPr>
+        <p:cNvPr id="1" name=""/>
+        <p:cNvGrpSpPr/>
+        <p:nvPr/>
+      </p:nvGrpSpPr>
+      <p:grpSpPr>
+        <a:xfrm>
+          <a:off x="0" y="0"/>
+          <a:ext cx="0" cy="0"/>
+          <a:chOff x="0" y="0"/>
+          <a:chExt cx="0" cy="0"/>
+        </a:xfrm>
+      </p:grpSpPr>
+      <p:sp>
+        <p:nvSpPr>
+          <p:cNvPr id="21" name="Rectangle 20">
+            <a:extLst>
+              <a:ext uri="{FF2B5EF4-FFF2-40B4-BE49-F238E27FC236}">
+                <a16:creationId xmlns:a16="http://schemas.microsoft.com/office/drawing/2014/main" id="{867D4867-5BA7-4462-B2F6-A23F4A622AA7}"/>
+              </a:ext>
+              <a:ext uri="{C183D7F6-B498-43B3-948B-1728B52AA6E4}">
+                <adec:decorative xmlns:adec="http://schemas.microsoft.com/office/drawing/2017/decorative" val="1"/>
+              </a:ext>
+            </a:extLst>
+          </p:cNvPr>
+          <p:cNvSpPr>
+            <a:spLocks noGrp="1" noRot="1" noChangeAspect="1" noMove="1" noResize="1" noEditPoints="1" noAdjustHandles="1" noChangeArrowheads="1" noChangeShapeType="1" noTextEdit="1"/>
+          </p:cNvSpPr>
+          <p:nvPr>
+            <p:extLst>
+              <p:ext uri="{386F3935-93C4-4BCD-93E2-E3B085C9AB24}">
+                <p16:designElem xmlns:p16="http://schemas.microsoft.com/office/powerpoint/2015/main" val="1"/>
+              </p:ext>
+            </p:extLst>
+          </p:nvPr>
+        </p:nvSpPr>
+        <p:spPr>
+          <a:xfrm>
+            <a:off x="0" y="0"/>
+            <a:ext cx="4654296" cy="6858000"/>
+          </a:xfrm>
+          <a:prstGeom prst="rect">
+            <a:avLst/>
+          </a:prstGeom>
+          <a:solidFill>
+            <a:schemeClr val="tx1">
+              <a:lumMod val="75000"/>
+              <a:lumOff val="25000"/>
+            </a:schemeClr>
+          </a:solidFill>
+          <a:ln>
+            <a:noFill/>
+          </a:ln>
+        </p:spPr>
+        <p:style>
+          <a:lnRef idx="0">
+            <a:scrgbClr r="0" g="0" b="0"/>
+          </a:lnRef>
+          <a:fillRef idx="0">
+            <a:scrgbClr r="0" g="0" b="0"/>
+          </a:fillRef>
+          <a:effectRef idx="0">
+            <a:scrgbClr r="0" g="0" b="0"/>
+          </a:effectRef>
+          <a:fontRef idx="minor">
+            <a:schemeClr val="lt1"/>
+          </a:fontRef>
+        </p:style>
+        <p:txBody>
+          <a:bodyPr rtlCol="0" anchor="ctr"/>
+          <a:lstStyle/>
+          <a:p>
+            <a:pPr algn="ctr"/>
+            <a:endParaRPr lang="en-US"/>
+          </a:p>
+        </p:txBody>
+      </p:sp>
+      <p:sp>
+        <p:nvSpPr>
+          <p:cNvPr id="2" name="Title 1">
+            <a:extLst>
+              <a:ext uri="{FF2B5EF4-FFF2-40B4-BE49-F238E27FC236}">
+                <a16:creationId xmlns:a16="http://schemas.microsoft.com/office/drawing/2014/main" id="{43E2FE7B-2476-4537-9A85-39EF900ACB90}"/>
+              </a:ext>
+            </a:extLst>
+          </p:cNvPr>
+          <p:cNvSpPr>
+            <a:spLocks noGrp="1"/>
+          </p:cNvSpPr>
+          <p:nvPr>
+            <p:ph type="title"/>
+          </p:nvPr>
+        </p:nvSpPr>
+        <p:spPr>
+          <a:xfrm>
+            <a:off x="643467" y="643467"/>
+            <a:ext cx="3363974" cy="1597315"/>
+          </a:xfrm>
+          <a:noFill/>
+          <a:ln w="19050">
+            <a:solidFill>
+              <a:schemeClr val="bg1"/>
+            </a:solidFill>
+          </a:ln>
+        </p:spPr>
+        <p:txBody>
+          <a:bodyPr wrap="square">
+            <a:normAutofit/>
+          </a:bodyPr>
+          <a:lstStyle/>
+          <a:p>
+            <a:pPr algn="ctr"/>
+            <a:r>
+              <a:rPr lang="en-US" sz="2800" dirty="0">
+                <a:solidFill>
+                  <a:schemeClr val="bg1"/>
+                </a:solidFill>
+              </a:rPr>
+              <a:t>Clustering Logic</a:t>
+            </a:r>
+          </a:p>
+        </p:txBody>
+      </p:sp>
+      <p:sp>
+        <p:nvSpPr>
+          <p:cNvPr id="3" name="Content Placeholder 2">
+            <a:extLst>
+              <a:ext uri="{FF2B5EF4-FFF2-40B4-BE49-F238E27FC236}">
+                <a16:creationId xmlns:a16="http://schemas.microsoft.com/office/drawing/2014/main" id="{10ED26BF-7DC2-497B-BED7-1FE0E40ECD5D}"/>
+              </a:ext>
+            </a:extLst>
+          </p:cNvPr>
+          <p:cNvSpPr>
+            <a:spLocks noGrp="1"/>
+          </p:cNvSpPr>
+          <p:nvPr>
+            <p:ph idx="1"/>
+          </p:nvPr>
+        </p:nvSpPr>
+        <p:spPr>
+          <a:xfrm>
+            <a:off x="643468" y="2638044"/>
+            <a:ext cx="3363974" cy="3415622"/>
+          </a:xfrm>
+        </p:spPr>
+        <p:txBody>
+          <a:bodyPr>
+            <a:normAutofit fontScale="85000" lnSpcReduction="10000"/>
+          </a:bodyPr>
+          <a:lstStyle/>
+          <a:p>
+            <a:r>
+              <a:rPr lang="en-US" sz="2000" dirty="0">
+                <a:solidFill>
+                  <a:schemeClr val="bg1"/>
+                </a:solidFill>
+              </a:rPr>
+              <a:t>Revisiting areas: When a sunk ship took over 5 hits or hits were not aligned, check surrounding coordinates.</a:t>
+            </a:r>
+          </a:p>
+          <a:p>
+            <a:r>
+              <a:rPr lang="en-US" sz="2000" dirty="0">
+                <a:solidFill>
+                  <a:schemeClr val="bg1"/>
+                </a:solidFill>
+              </a:rPr>
+              <a:t>Hopping over previous hits: When attempting to sink a ship, add surrounding coordinates, including skipping over an area previously hit.</a:t>
+            </a:r>
+          </a:p>
+          <a:p>
+            <a:r>
+              <a:rPr lang="en-US" sz="2000" dirty="0">
+                <a:solidFill>
+                  <a:schemeClr val="bg1"/>
+                </a:solidFill>
+              </a:rPr>
+              <a:t>Notable results. Revisiting suspicious areas resulted in about 6 fewer turns, and skipping previously hit areas resulted in about 13 fewer turns.</a:t>
+            </a:r>
+          </a:p>
+        </p:txBody>
+      </p:sp>
+      <p:graphicFrame>
+        <p:nvGraphicFramePr>
+          <p:cNvPr id="7" name="Chart 6">
+            <a:extLst>
+              <a:ext uri="{FF2B5EF4-FFF2-40B4-BE49-F238E27FC236}">
+                <a16:creationId xmlns:a16="http://schemas.microsoft.com/office/drawing/2014/main" id="{AA6CD3CF-93EC-4044-B6A3-4849D028A51F}"/>
+              </a:ext>
+            </a:extLst>
+          </p:cNvPr>
+          <p:cNvGraphicFramePr/>
+          <p:nvPr>
+            <p:extLst>
+              <p:ext uri="{D42A27DB-BD31-4B8C-83A1-F6EECF244321}">
+                <p14:modId xmlns:p14="http://schemas.microsoft.com/office/powerpoint/2010/main" val="3039971109"/>
+              </p:ext>
+            </p:extLst>
+          </p:nvPr>
+        </p:nvGraphicFramePr>
+        <p:xfrm>
+          <a:off x="5297763" y="643467"/>
+          <a:ext cx="6250769" cy="5410199"/>
+        </p:xfrm>
+        <a:graphic>
+          <a:graphicData uri="http://schemas.openxmlformats.org/drawingml/2006/chart">
+            <c:chart xmlns:c="http://schemas.openxmlformats.org/drawingml/2006/chart" xmlns:r="http://schemas.openxmlformats.org/officeDocument/2006/relationships" r:id="rId2"/>
+          </a:graphicData>
+        </a:graphic>
+      </p:graphicFrame>
+    </p:spTree>
+    <p:extLst>
+      <p:ext uri="{BB962C8B-B14F-4D97-AF65-F5344CB8AC3E}">
+        <p14:creationId xmlns:p14="http://schemas.microsoft.com/office/powerpoint/2010/main" val="2306956037"/>
       </p:ext>
     </p:extLst>
   </p:cSld>

</xml_diff>

<commit_message>
A few updates to paper and presentation
</commit_message>
<xml_diff>
--- a/Presentation.pptx
+++ b/Presentation.pptx
@@ -11,8 +11,10 @@
     <p:sldId id="257" r:id="rId5"/>
     <p:sldId id="258" r:id="rId6"/>
     <p:sldId id="259" r:id="rId7"/>
-    <p:sldId id="261" r:id="rId8"/>
-    <p:sldId id="262" r:id="rId9"/>
+    <p:sldId id="264" r:id="rId8"/>
+    <p:sldId id="261" r:id="rId9"/>
+    <p:sldId id="262" r:id="rId10"/>
+    <p:sldId id="265" r:id="rId11"/>
   </p:sldIdLst>
   <p:sldSz cx="12192000" cy="6858000"/>
   <p:notesSz cx="6858000" cy="9144000"/>
@@ -475,6 +477,445 @@
 </file>
 
 <file path=ppt/charts/chart2.xml><?xml version="1.0" encoding="utf-8"?>
+<c:chartSpace xmlns:c="http://schemas.openxmlformats.org/drawingml/2006/chart" xmlns:a="http://schemas.openxmlformats.org/drawingml/2006/main" xmlns:r="http://schemas.openxmlformats.org/officeDocument/2006/relationships" xmlns:c16r2="http://schemas.microsoft.com/office/drawing/2015/06/chart">
+  <c:date1904 val="0"/>
+  <c:lang val="en-US"/>
+  <c:roundedCorners val="0"/>
+  <mc:AlternateContent xmlns:mc="http://schemas.openxmlformats.org/markup-compatibility/2006">
+    <mc:Choice xmlns:c14="http://schemas.microsoft.com/office/drawing/2007/8/2/chart" Requires="c14">
+      <c14:style val="102"/>
+    </mc:Choice>
+    <mc:Fallback>
+      <c:style val="2"/>
+    </mc:Fallback>
+  </mc:AlternateContent>
+  <c:chart>
+    <c:title>
+      <c:tx>
+        <c:rich>
+          <a:bodyPr rot="0" spcFirstLastPara="1" vertOverflow="ellipsis" vert="horz" wrap="square" anchor="ctr" anchorCtr="1"/>
+          <a:lstStyle/>
+          <a:p>
+            <a:pPr>
+              <a:defRPr sz="1400" b="0" i="0" u="none" strike="noStrike" kern="1200" spc="0" baseline="0">
+                <a:solidFill>
+                  <a:schemeClr val="tx1">
+                    <a:lumMod val="65000"/>
+                    <a:lumOff val="35000"/>
+                  </a:schemeClr>
+                </a:solidFill>
+                <a:latin typeface="+mn-lt"/>
+                <a:ea typeface="+mn-ea"/>
+                <a:cs typeface="+mn-cs"/>
+              </a:defRPr>
+            </a:pPr>
+            <a:r>
+              <a:rPr lang="en-US"/>
+              <a:t>Iterations for Heatmap by Board Size</a:t>
+            </a:r>
+          </a:p>
+        </c:rich>
+      </c:tx>
+      <c:overlay val="0"/>
+      <c:spPr>
+        <a:noFill/>
+        <a:ln>
+          <a:noFill/>
+        </a:ln>
+        <a:effectLst/>
+      </c:spPr>
+      <c:txPr>
+        <a:bodyPr rot="0" spcFirstLastPara="1" vertOverflow="ellipsis" vert="horz" wrap="square" anchor="ctr" anchorCtr="1"/>
+        <a:lstStyle/>
+        <a:p>
+          <a:pPr>
+            <a:defRPr sz="1400" b="0" i="0" u="none" strike="noStrike" kern="1200" spc="0" baseline="0">
+              <a:solidFill>
+                <a:schemeClr val="tx1">
+                  <a:lumMod val="65000"/>
+                  <a:lumOff val="35000"/>
+                </a:schemeClr>
+              </a:solidFill>
+              <a:latin typeface="+mn-lt"/>
+              <a:ea typeface="+mn-ea"/>
+              <a:cs typeface="+mn-cs"/>
+            </a:defRPr>
+          </a:pPr>
+          <a:endParaRPr lang="en-US"/>
+        </a:p>
+      </c:txPr>
+    </c:title>
+    <c:autoTitleDeleted val="0"/>
+    <c:plotArea>
+      <c:layout/>
+      <c:lineChart>
+        <c:grouping val="standard"/>
+        <c:varyColors val="0"/>
+        <c:ser>
+          <c:idx val="0"/>
+          <c:order val="0"/>
+          <c:tx>
+            <c:strRef>
+              <c:f>Sheet1!$O$980</c:f>
+              <c:strCache>
+                <c:ptCount val="1"/>
+                <c:pt idx="0">
+                  <c:v>Iterations</c:v>
+                </c:pt>
+              </c:strCache>
+            </c:strRef>
+          </c:tx>
+          <c:spPr>
+            <a:ln w="28575" cap="rnd">
+              <a:solidFill>
+                <a:schemeClr val="accent1"/>
+              </a:solidFill>
+              <a:round/>
+            </a:ln>
+            <a:effectLst/>
+          </c:spPr>
+          <c:marker>
+            <c:symbol val="none"/>
+          </c:marker>
+          <c:cat>
+            <c:numRef>
+              <c:f>Sheet1!$P$979:$V$979</c:f>
+              <c:numCache>
+                <c:formatCode>General</c:formatCode>
+                <c:ptCount val="7"/>
+                <c:pt idx="0">
+                  <c:v>10</c:v>
+                </c:pt>
+                <c:pt idx="1">
+                  <c:v>50</c:v>
+                </c:pt>
+                <c:pt idx="2">
+                  <c:v>100</c:v>
+                </c:pt>
+                <c:pt idx="3">
+                  <c:v>150</c:v>
+                </c:pt>
+                <c:pt idx="4">
+                  <c:v>200</c:v>
+                </c:pt>
+                <c:pt idx="5">
+                  <c:v>250</c:v>
+                </c:pt>
+                <c:pt idx="6">
+                  <c:v>300</c:v>
+                </c:pt>
+              </c:numCache>
+            </c:numRef>
+          </c:cat>
+          <c:val>
+            <c:numRef>
+              <c:f>Sheet1!$P$980:$V$980</c:f>
+              <c:numCache>
+                <c:formatCode>General</c:formatCode>
+                <c:ptCount val="7"/>
+                <c:pt idx="0">
+                  <c:v>2200</c:v>
+                </c:pt>
+                <c:pt idx="1">
+                  <c:v>255000</c:v>
+                </c:pt>
+                <c:pt idx="2">
+                  <c:v>2020000</c:v>
+                </c:pt>
+                <c:pt idx="3">
+                  <c:v>6795000</c:v>
+                </c:pt>
+                <c:pt idx="4">
+                  <c:v>16080000</c:v>
+                </c:pt>
+                <c:pt idx="5">
+                  <c:v>31375000</c:v>
+                </c:pt>
+                <c:pt idx="6">
+                  <c:v>54180000</c:v>
+                </c:pt>
+              </c:numCache>
+            </c:numRef>
+          </c:val>
+          <c:smooth val="0"/>
+          <c:extLst>
+            <c:ext xmlns:c16="http://schemas.microsoft.com/office/drawing/2014/chart" uri="{C3380CC4-5D6E-409C-BE32-E72D297353CC}">
+              <c16:uniqueId val="{00000000-E686-48A1-808D-5E6344B8EB5F}"/>
+            </c:ext>
+          </c:extLst>
+        </c:ser>
+        <c:dLbls>
+          <c:showLegendKey val="0"/>
+          <c:showVal val="0"/>
+          <c:showCatName val="0"/>
+          <c:showSerName val="0"/>
+          <c:showPercent val="0"/>
+          <c:showBubbleSize val="0"/>
+        </c:dLbls>
+        <c:smooth val="0"/>
+        <c:axId val="592756543"/>
+        <c:axId val="601587151"/>
+      </c:lineChart>
+      <c:catAx>
+        <c:axId val="592756543"/>
+        <c:scaling>
+          <c:orientation val="minMax"/>
+        </c:scaling>
+        <c:delete val="0"/>
+        <c:axPos val="b"/>
+        <c:title>
+          <c:tx>
+            <c:rich>
+              <a:bodyPr rot="0" spcFirstLastPara="1" vertOverflow="ellipsis" vert="horz" wrap="square" anchor="ctr" anchorCtr="1"/>
+              <a:lstStyle/>
+              <a:p>
+                <a:pPr>
+                  <a:defRPr sz="1000" b="0" i="0" u="none" strike="noStrike" kern="1200" baseline="0">
+                    <a:solidFill>
+                      <a:schemeClr val="tx1">
+                        <a:lumMod val="65000"/>
+                        <a:lumOff val="35000"/>
+                      </a:schemeClr>
+                    </a:solidFill>
+                    <a:latin typeface="+mn-lt"/>
+                    <a:ea typeface="+mn-ea"/>
+                    <a:cs typeface="+mn-cs"/>
+                  </a:defRPr>
+                </a:pPr>
+                <a:r>
+                  <a:rPr lang="en-US"/>
+                  <a:t>Board Size</a:t>
+                </a:r>
+              </a:p>
+            </c:rich>
+          </c:tx>
+          <c:overlay val="0"/>
+          <c:spPr>
+            <a:noFill/>
+            <a:ln>
+              <a:noFill/>
+            </a:ln>
+            <a:effectLst/>
+          </c:spPr>
+          <c:txPr>
+            <a:bodyPr rot="0" spcFirstLastPara="1" vertOverflow="ellipsis" vert="horz" wrap="square" anchor="ctr" anchorCtr="1"/>
+            <a:lstStyle/>
+            <a:p>
+              <a:pPr>
+                <a:defRPr sz="1000" b="0" i="0" u="none" strike="noStrike" kern="1200" baseline="0">
+                  <a:solidFill>
+                    <a:schemeClr val="tx1">
+                      <a:lumMod val="65000"/>
+                      <a:lumOff val="35000"/>
+                    </a:schemeClr>
+                  </a:solidFill>
+                  <a:latin typeface="+mn-lt"/>
+                  <a:ea typeface="+mn-ea"/>
+                  <a:cs typeface="+mn-cs"/>
+                </a:defRPr>
+              </a:pPr>
+              <a:endParaRPr lang="en-US"/>
+            </a:p>
+          </c:txPr>
+        </c:title>
+        <c:numFmt formatCode="General" sourceLinked="1"/>
+        <c:majorTickMark val="none"/>
+        <c:minorTickMark val="none"/>
+        <c:tickLblPos val="nextTo"/>
+        <c:spPr>
+          <a:noFill/>
+          <a:ln w="9525" cap="flat" cmpd="sng" algn="ctr">
+            <a:solidFill>
+              <a:schemeClr val="tx1">
+                <a:lumMod val="15000"/>
+                <a:lumOff val="85000"/>
+              </a:schemeClr>
+            </a:solidFill>
+            <a:round/>
+          </a:ln>
+          <a:effectLst/>
+        </c:spPr>
+        <c:txPr>
+          <a:bodyPr rot="-60000000" spcFirstLastPara="1" vertOverflow="ellipsis" vert="horz" wrap="square" anchor="ctr" anchorCtr="1"/>
+          <a:lstStyle/>
+          <a:p>
+            <a:pPr>
+              <a:defRPr sz="900" b="0" i="0" u="none" strike="noStrike" kern="1200" baseline="0">
+                <a:solidFill>
+                  <a:schemeClr val="tx1">
+                    <a:lumMod val="65000"/>
+                    <a:lumOff val="35000"/>
+                  </a:schemeClr>
+                </a:solidFill>
+                <a:latin typeface="+mn-lt"/>
+                <a:ea typeface="+mn-ea"/>
+                <a:cs typeface="+mn-cs"/>
+              </a:defRPr>
+            </a:pPr>
+            <a:endParaRPr lang="en-US"/>
+          </a:p>
+        </c:txPr>
+        <c:crossAx val="601587151"/>
+        <c:crosses val="autoZero"/>
+        <c:auto val="1"/>
+        <c:lblAlgn val="ctr"/>
+        <c:lblOffset val="100"/>
+        <c:noMultiLvlLbl val="0"/>
+      </c:catAx>
+      <c:valAx>
+        <c:axId val="601587151"/>
+        <c:scaling>
+          <c:orientation val="minMax"/>
+        </c:scaling>
+        <c:delete val="0"/>
+        <c:axPos val="l"/>
+        <c:majorGridlines>
+          <c:spPr>
+            <a:ln w="9525" cap="flat" cmpd="sng" algn="ctr">
+              <a:solidFill>
+                <a:schemeClr val="tx1">
+                  <a:lumMod val="15000"/>
+                  <a:lumOff val="85000"/>
+                </a:schemeClr>
+              </a:solidFill>
+              <a:round/>
+            </a:ln>
+            <a:effectLst/>
+          </c:spPr>
+        </c:majorGridlines>
+        <c:title>
+          <c:tx>
+            <c:rich>
+              <a:bodyPr rot="-5400000" spcFirstLastPara="1" vertOverflow="ellipsis" vert="horz" wrap="square" anchor="ctr" anchorCtr="1"/>
+              <a:lstStyle/>
+              <a:p>
+                <a:pPr>
+                  <a:defRPr sz="1000" b="0" i="0" u="none" strike="noStrike" kern="1200" baseline="0">
+                    <a:solidFill>
+                      <a:schemeClr val="tx1">
+                        <a:lumMod val="65000"/>
+                        <a:lumOff val="35000"/>
+                      </a:schemeClr>
+                    </a:solidFill>
+                    <a:latin typeface="+mn-lt"/>
+                    <a:ea typeface="+mn-ea"/>
+                    <a:cs typeface="+mn-cs"/>
+                  </a:defRPr>
+                </a:pPr>
+                <a:r>
+                  <a:rPr lang="en-US"/>
+                  <a:t>Number of Iterations</a:t>
+                </a:r>
+              </a:p>
+            </c:rich>
+          </c:tx>
+          <c:overlay val="0"/>
+          <c:spPr>
+            <a:noFill/>
+            <a:ln>
+              <a:noFill/>
+            </a:ln>
+            <a:effectLst/>
+          </c:spPr>
+          <c:txPr>
+            <a:bodyPr rot="-5400000" spcFirstLastPara="1" vertOverflow="ellipsis" vert="horz" wrap="square" anchor="ctr" anchorCtr="1"/>
+            <a:lstStyle/>
+            <a:p>
+              <a:pPr>
+                <a:defRPr sz="1000" b="0" i="0" u="none" strike="noStrike" kern="1200" baseline="0">
+                  <a:solidFill>
+                    <a:schemeClr val="tx1">
+                      <a:lumMod val="65000"/>
+                      <a:lumOff val="35000"/>
+                    </a:schemeClr>
+                  </a:solidFill>
+                  <a:latin typeface="+mn-lt"/>
+                  <a:ea typeface="+mn-ea"/>
+                  <a:cs typeface="+mn-cs"/>
+                </a:defRPr>
+              </a:pPr>
+              <a:endParaRPr lang="en-US"/>
+            </a:p>
+          </c:txPr>
+        </c:title>
+        <c:numFmt formatCode="General" sourceLinked="1"/>
+        <c:majorTickMark val="none"/>
+        <c:minorTickMark val="none"/>
+        <c:tickLblPos val="nextTo"/>
+        <c:spPr>
+          <a:noFill/>
+          <a:ln>
+            <a:noFill/>
+          </a:ln>
+          <a:effectLst/>
+        </c:spPr>
+        <c:txPr>
+          <a:bodyPr rot="-60000000" spcFirstLastPara="1" vertOverflow="ellipsis" vert="horz" wrap="square" anchor="ctr" anchorCtr="1"/>
+          <a:lstStyle/>
+          <a:p>
+            <a:pPr>
+              <a:defRPr sz="900" b="0" i="0" u="none" strike="noStrike" kern="1200" baseline="0">
+                <a:solidFill>
+                  <a:schemeClr val="tx1">
+                    <a:lumMod val="65000"/>
+                    <a:lumOff val="35000"/>
+                  </a:schemeClr>
+                </a:solidFill>
+                <a:latin typeface="+mn-lt"/>
+                <a:ea typeface="+mn-ea"/>
+                <a:cs typeface="+mn-cs"/>
+              </a:defRPr>
+            </a:pPr>
+            <a:endParaRPr lang="en-US"/>
+          </a:p>
+        </c:txPr>
+        <c:crossAx val="592756543"/>
+        <c:crosses val="autoZero"/>
+        <c:crossBetween val="between"/>
+      </c:valAx>
+      <c:spPr>
+        <a:noFill/>
+        <a:ln>
+          <a:noFill/>
+        </a:ln>
+        <a:effectLst/>
+      </c:spPr>
+    </c:plotArea>
+    <c:plotVisOnly val="1"/>
+    <c:dispBlanksAs val="gap"/>
+    <c:extLst>
+      <c:ext xmlns:c16r3="http://schemas.microsoft.com/office/drawing/2017/03/chart" uri="{56B9EC1D-385E-4148-901F-78D8002777C0}">
+        <c16r3:dataDisplayOptions16>
+          <c16r3:dispNaAsBlank val="1"/>
+        </c16r3:dataDisplayOptions16>
+      </c:ext>
+    </c:extLst>
+    <c:showDLblsOverMax val="0"/>
+  </c:chart>
+  <c:spPr>
+    <a:noFill/>
+    <a:ln>
+      <a:noFill/>
+    </a:ln>
+    <a:effectLst/>
+  </c:spPr>
+  <c:txPr>
+    <a:bodyPr/>
+    <a:lstStyle/>
+    <a:p>
+      <a:pPr>
+        <a:defRPr/>
+      </a:pPr>
+      <a:endParaRPr lang="en-US"/>
+    </a:p>
+  </c:txPr>
+  <c:externalData r:id="rId3">
+    <c:autoUpdate val="0"/>
+  </c:externalData>
+</c:chartSpace>
+</file>
+
+<file path=ppt/charts/chart3.xml><?xml version="1.0" encoding="utf-8"?>
 <c:chartSpace xmlns:c="http://schemas.openxmlformats.org/drawingml/2006/chart" xmlns:a="http://schemas.openxmlformats.org/drawingml/2006/main" xmlns:r="http://schemas.openxmlformats.org/officeDocument/2006/relationships" xmlns:c16r2="http://schemas.microsoft.com/office/drawing/2015/06/chart">
   <c:date1904 val="0"/>
   <c:lang val="en-US"/>
@@ -840,7 +1281,7 @@
 </c:chartSpace>
 </file>
 
-<file path=ppt/charts/chart3.xml><?xml version="1.0" encoding="utf-8"?>
+<file path=ppt/charts/chart4.xml><?xml version="1.0" encoding="utf-8"?>
 <c:chartSpace xmlns:c="http://schemas.openxmlformats.org/drawingml/2006/chart" xmlns:a="http://schemas.openxmlformats.org/drawingml/2006/main" xmlns:r="http://schemas.openxmlformats.org/officeDocument/2006/relationships" xmlns:c16r2="http://schemas.microsoft.com/office/drawing/2015/06/chart">
   <c:date1904 val="0"/>
   <c:lang val="en-US"/>
@@ -1296,6 +1737,46 @@
 </file>
 
 <file path=ppt/charts/colors3.xml><?xml version="1.0" encoding="utf-8"?>
+<cs:colorStyle xmlns:cs="http://schemas.microsoft.com/office/drawing/2012/chartStyle" xmlns:a="http://schemas.openxmlformats.org/drawingml/2006/main" meth="cycle" id="10">
+  <a:schemeClr val="accent1"/>
+  <a:schemeClr val="accent2"/>
+  <a:schemeClr val="accent3"/>
+  <a:schemeClr val="accent4"/>
+  <a:schemeClr val="accent5"/>
+  <a:schemeClr val="accent6"/>
+  <cs:variation/>
+  <cs:variation>
+    <a:lumMod val="60000"/>
+  </cs:variation>
+  <cs:variation>
+    <a:lumMod val="80000"/>
+    <a:lumOff val="20000"/>
+  </cs:variation>
+  <cs:variation>
+    <a:lumMod val="80000"/>
+  </cs:variation>
+  <cs:variation>
+    <a:lumMod val="60000"/>
+    <a:lumOff val="40000"/>
+  </cs:variation>
+  <cs:variation>
+    <a:lumMod val="50000"/>
+  </cs:variation>
+  <cs:variation>
+    <a:lumMod val="70000"/>
+    <a:lumOff val="30000"/>
+  </cs:variation>
+  <cs:variation>
+    <a:lumMod val="70000"/>
+  </cs:variation>
+  <cs:variation>
+    <a:lumMod val="50000"/>
+    <a:lumOff val="50000"/>
+  </cs:variation>
+</cs:colorStyle>
+</file>
+
+<file path=ppt/charts/colors4.xml><?xml version="1.0" encoding="utf-8"?>
 <cs:colorStyle xmlns:cs="http://schemas.microsoft.com/office/drawing/2012/chartStyle" xmlns:a="http://schemas.openxmlformats.org/drawingml/2006/main" meth="cycle" id="10">
   <a:schemeClr val="accent1"/>
   <a:schemeClr val="accent2"/>
@@ -1828,6 +2309,522 @@
 </file>
 
 <file path=ppt/charts/style2.xml><?xml version="1.0" encoding="utf-8"?>
+<cs:chartStyle xmlns:cs="http://schemas.microsoft.com/office/drawing/2012/chartStyle" xmlns:a="http://schemas.openxmlformats.org/drawingml/2006/main" id="227">
+  <cs:axisTitle>
+    <cs:lnRef idx="0"/>
+    <cs:fillRef idx="0"/>
+    <cs:effectRef idx="0"/>
+    <cs:fontRef idx="minor">
+      <a:schemeClr val="tx1">
+        <a:lumMod val="65000"/>
+        <a:lumOff val="35000"/>
+      </a:schemeClr>
+    </cs:fontRef>
+    <cs:defRPr sz="1000" kern="1200"/>
+  </cs:axisTitle>
+  <cs:categoryAxis>
+    <cs:lnRef idx="0"/>
+    <cs:fillRef idx="0"/>
+    <cs:effectRef idx="0"/>
+    <cs:fontRef idx="minor">
+      <a:schemeClr val="tx1">
+        <a:lumMod val="65000"/>
+        <a:lumOff val="35000"/>
+      </a:schemeClr>
+    </cs:fontRef>
+    <cs:spPr>
+      <a:ln w="9525" cap="flat" cmpd="sng" algn="ctr">
+        <a:solidFill>
+          <a:schemeClr val="tx1">
+            <a:lumMod val="15000"/>
+            <a:lumOff val="85000"/>
+          </a:schemeClr>
+        </a:solidFill>
+        <a:round/>
+      </a:ln>
+    </cs:spPr>
+    <cs:defRPr sz="900" kern="1200"/>
+  </cs:categoryAxis>
+  <cs:chartArea mods="allowNoFillOverride allowNoLineOverride">
+    <cs:lnRef idx="0"/>
+    <cs:fillRef idx="0"/>
+    <cs:effectRef idx="0"/>
+    <cs:fontRef idx="minor">
+      <a:schemeClr val="tx1"/>
+    </cs:fontRef>
+    <cs:spPr>
+      <a:solidFill>
+        <a:schemeClr val="bg1"/>
+      </a:solidFill>
+      <a:ln w="9525" cap="flat" cmpd="sng" algn="ctr">
+        <a:solidFill>
+          <a:schemeClr val="tx1">
+            <a:lumMod val="15000"/>
+            <a:lumOff val="85000"/>
+          </a:schemeClr>
+        </a:solidFill>
+        <a:round/>
+      </a:ln>
+    </cs:spPr>
+    <cs:defRPr sz="1000" kern="1200"/>
+  </cs:chartArea>
+  <cs:dataLabel>
+    <cs:lnRef idx="0"/>
+    <cs:fillRef idx="0"/>
+    <cs:effectRef idx="0"/>
+    <cs:fontRef idx="minor">
+      <a:schemeClr val="tx1">
+        <a:lumMod val="75000"/>
+        <a:lumOff val="25000"/>
+      </a:schemeClr>
+    </cs:fontRef>
+    <cs:defRPr sz="900" kern="1200"/>
+  </cs:dataLabel>
+  <cs:dataLabelCallout>
+    <cs:lnRef idx="0"/>
+    <cs:fillRef idx="0"/>
+    <cs:effectRef idx="0"/>
+    <cs:fontRef idx="minor">
+      <a:schemeClr val="dk1">
+        <a:lumMod val="65000"/>
+        <a:lumOff val="35000"/>
+      </a:schemeClr>
+    </cs:fontRef>
+    <cs:spPr>
+      <a:solidFill>
+        <a:schemeClr val="lt1"/>
+      </a:solidFill>
+      <a:ln>
+        <a:solidFill>
+          <a:schemeClr val="dk1">
+            <a:lumMod val="25000"/>
+            <a:lumOff val="75000"/>
+          </a:schemeClr>
+        </a:solidFill>
+      </a:ln>
+    </cs:spPr>
+    <cs:defRPr sz="900" kern="1200"/>
+    <cs:bodyPr rot="0" spcFirstLastPara="1" vertOverflow="clip" horzOverflow="clip" vert="horz" wrap="square" lIns="36576" tIns="18288" rIns="36576" bIns="18288" anchor="ctr" anchorCtr="1">
+      <a:spAutoFit/>
+    </cs:bodyPr>
+  </cs:dataLabelCallout>
+  <cs:dataPoint>
+    <cs:lnRef idx="0"/>
+    <cs:fillRef idx="1">
+      <cs:styleClr val="auto"/>
+    </cs:fillRef>
+    <cs:effectRef idx="0"/>
+    <cs:fontRef idx="minor">
+      <a:schemeClr val="tx1"/>
+    </cs:fontRef>
+    <cs:spPr>
+      <a:solidFill>
+        <a:schemeClr val="phClr"/>
+      </a:solidFill>
+    </cs:spPr>
+  </cs:dataPoint>
+  <cs:dataPoint3D>
+    <cs:lnRef idx="0"/>
+    <cs:fillRef idx="1">
+      <cs:styleClr val="auto"/>
+    </cs:fillRef>
+    <cs:effectRef idx="0"/>
+    <cs:fontRef idx="minor">
+      <a:schemeClr val="tx1"/>
+    </cs:fontRef>
+    <cs:spPr>
+      <a:solidFill>
+        <a:schemeClr val="phClr"/>
+      </a:solidFill>
+    </cs:spPr>
+  </cs:dataPoint3D>
+  <cs:dataPointLine>
+    <cs:lnRef idx="0">
+      <cs:styleClr val="auto"/>
+    </cs:lnRef>
+    <cs:fillRef idx="1"/>
+    <cs:effectRef idx="0"/>
+    <cs:fontRef idx="minor">
+      <a:schemeClr val="tx1"/>
+    </cs:fontRef>
+    <cs:spPr>
+      <a:ln w="28575" cap="rnd">
+        <a:solidFill>
+          <a:schemeClr val="phClr"/>
+        </a:solidFill>
+        <a:round/>
+      </a:ln>
+    </cs:spPr>
+  </cs:dataPointLine>
+  <cs:dataPointMarker>
+    <cs:lnRef idx="0">
+      <cs:styleClr val="auto"/>
+    </cs:lnRef>
+    <cs:fillRef idx="1">
+      <cs:styleClr val="auto"/>
+    </cs:fillRef>
+    <cs:effectRef idx="0"/>
+    <cs:fontRef idx="minor">
+      <a:schemeClr val="tx1"/>
+    </cs:fontRef>
+    <cs:spPr>
+      <a:solidFill>
+        <a:schemeClr val="phClr"/>
+      </a:solidFill>
+      <a:ln w="9525">
+        <a:solidFill>
+          <a:schemeClr val="phClr"/>
+        </a:solidFill>
+      </a:ln>
+    </cs:spPr>
+  </cs:dataPointMarker>
+  <cs:dataPointMarkerLayout symbol="circle" size="5"/>
+  <cs:dataPointWireframe>
+    <cs:lnRef idx="0">
+      <cs:styleClr val="auto"/>
+    </cs:lnRef>
+    <cs:fillRef idx="1"/>
+    <cs:effectRef idx="0"/>
+    <cs:fontRef idx="minor">
+      <a:schemeClr val="tx1"/>
+    </cs:fontRef>
+    <cs:spPr>
+      <a:ln w="9525" cap="rnd">
+        <a:solidFill>
+          <a:schemeClr val="phClr"/>
+        </a:solidFill>
+        <a:round/>
+      </a:ln>
+    </cs:spPr>
+  </cs:dataPointWireframe>
+  <cs:dataTable>
+    <cs:lnRef idx="0"/>
+    <cs:fillRef idx="0"/>
+    <cs:effectRef idx="0"/>
+    <cs:fontRef idx="minor">
+      <a:schemeClr val="tx1">
+        <a:lumMod val="65000"/>
+        <a:lumOff val="35000"/>
+      </a:schemeClr>
+    </cs:fontRef>
+    <cs:spPr>
+      <a:noFill/>
+      <a:ln w="9525" cap="flat" cmpd="sng" algn="ctr">
+        <a:solidFill>
+          <a:schemeClr val="tx1">
+            <a:lumMod val="15000"/>
+            <a:lumOff val="85000"/>
+          </a:schemeClr>
+        </a:solidFill>
+        <a:round/>
+      </a:ln>
+    </cs:spPr>
+    <cs:defRPr sz="900" kern="1200"/>
+  </cs:dataTable>
+  <cs:downBar>
+    <cs:lnRef idx="0"/>
+    <cs:fillRef idx="0"/>
+    <cs:effectRef idx="0"/>
+    <cs:fontRef idx="minor">
+      <a:schemeClr val="dk1"/>
+    </cs:fontRef>
+    <cs:spPr>
+      <a:solidFill>
+        <a:schemeClr val="dk1">
+          <a:lumMod val="65000"/>
+          <a:lumOff val="35000"/>
+        </a:schemeClr>
+      </a:solidFill>
+      <a:ln w="9525">
+        <a:solidFill>
+          <a:schemeClr val="tx1">
+            <a:lumMod val="65000"/>
+            <a:lumOff val="35000"/>
+          </a:schemeClr>
+        </a:solidFill>
+      </a:ln>
+    </cs:spPr>
+  </cs:downBar>
+  <cs:dropLine>
+    <cs:lnRef idx="0"/>
+    <cs:fillRef idx="0"/>
+    <cs:effectRef idx="0"/>
+    <cs:fontRef idx="minor">
+      <a:schemeClr val="tx1"/>
+    </cs:fontRef>
+    <cs:spPr>
+      <a:ln w="9525" cap="flat" cmpd="sng" algn="ctr">
+        <a:solidFill>
+          <a:schemeClr val="tx1">
+            <a:lumMod val="35000"/>
+            <a:lumOff val="65000"/>
+          </a:schemeClr>
+        </a:solidFill>
+        <a:round/>
+      </a:ln>
+    </cs:spPr>
+  </cs:dropLine>
+  <cs:errorBar>
+    <cs:lnRef idx="0"/>
+    <cs:fillRef idx="0"/>
+    <cs:effectRef idx="0"/>
+    <cs:fontRef idx="minor">
+      <a:schemeClr val="tx1"/>
+    </cs:fontRef>
+    <cs:spPr>
+      <a:ln w="9525" cap="flat" cmpd="sng" algn="ctr">
+        <a:solidFill>
+          <a:schemeClr val="tx1">
+            <a:lumMod val="65000"/>
+            <a:lumOff val="35000"/>
+          </a:schemeClr>
+        </a:solidFill>
+        <a:round/>
+      </a:ln>
+    </cs:spPr>
+  </cs:errorBar>
+  <cs:floor>
+    <cs:lnRef idx="0"/>
+    <cs:fillRef idx="0"/>
+    <cs:effectRef idx="0"/>
+    <cs:fontRef idx="minor">
+      <a:schemeClr val="tx1"/>
+    </cs:fontRef>
+    <cs:spPr>
+      <a:noFill/>
+      <a:ln>
+        <a:noFill/>
+      </a:ln>
+    </cs:spPr>
+  </cs:floor>
+  <cs:gridlineMajor>
+    <cs:lnRef idx="0"/>
+    <cs:fillRef idx="0"/>
+    <cs:effectRef idx="0"/>
+    <cs:fontRef idx="minor">
+      <a:schemeClr val="tx1"/>
+    </cs:fontRef>
+    <cs:spPr>
+      <a:ln w="9525" cap="flat" cmpd="sng" algn="ctr">
+        <a:solidFill>
+          <a:schemeClr val="tx1">
+            <a:lumMod val="15000"/>
+            <a:lumOff val="85000"/>
+          </a:schemeClr>
+        </a:solidFill>
+        <a:round/>
+      </a:ln>
+    </cs:spPr>
+  </cs:gridlineMajor>
+  <cs:gridlineMinor>
+    <cs:lnRef idx="0"/>
+    <cs:fillRef idx="0"/>
+    <cs:effectRef idx="0"/>
+    <cs:fontRef idx="minor">
+      <a:schemeClr val="tx1"/>
+    </cs:fontRef>
+    <cs:spPr>
+      <a:ln w="9525" cap="flat" cmpd="sng" algn="ctr">
+        <a:solidFill>
+          <a:schemeClr val="tx1">
+            <a:lumMod val="5000"/>
+            <a:lumOff val="95000"/>
+          </a:schemeClr>
+        </a:solidFill>
+        <a:round/>
+      </a:ln>
+    </cs:spPr>
+  </cs:gridlineMinor>
+  <cs:hiLoLine>
+    <cs:lnRef idx="0"/>
+    <cs:fillRef idx="0"/>
+    <cs:effectRef idx="0"/>
+    <cs:fontRef idx="minor">
+      <a:schemeClr val="tx1"/>
+    </cs:fontRef>
+    <cs:spPr>
+      <a:ln w="9525" cap="flat" cmpd="sng" algn="ctr">
+        <a:solidFill>
+          <a:schemeClr val="tx1">
+            <a:lumMod val="75000"/>
+            <a:lumOff val="25000"/>
+          </a:schemeClr>
+        </a:solidFill>
+        <a:round/>
+      </a:ln>
+    </cs:spPr>
+  </cs:hiLoLine>
+  <cs:leaderLine>
+    <cs:lnRef idx="0"/>
+    <cs:fillRef idx="0"/>
+    <cs:effectRef idx="0"/>
+    <cs:fontRef idx="minor">
+      <a:schemeClr val="tx1"/>
+    </cs:fontRef>
+    <cs:spPr>
+      <a:ln w="9525" cap="flat" cmpd="sng" algn="ctr">
+        <a:solidFill>
+          <a:schemeClr val="tx1">
+            <a:lumMod val="35000"/>
+            <a:lumOff val="65000"/>
+          </a:schemeClr>
+        </a:solidFill>
+        <a:round/>
+      </a:ln>
+    </cs:spPr>
+  </cs:leaderLine>
+  <cs:legend>
+    <cs:lnRef idx="0"/>
+    <cs:fillRef idx="0"/>
+    <cs:effectRef idx="0"/>
+    <cs:fontRef idx="minor">
+      <a:schemeClr val="tx1">
+        <a:lumMod val="65000"/>
+        <a:lumOff val="35000"/>
+      </a:schemeClr>
+    </cs:fontRef>
+    <cs:defRPr sz="900" kern="1200"/>
+  </cs:legend>
+  <cs:plotArea mods="allowNoFillOverride allowNoLineOverride">
+    <cs:lnRef idx="0"/>
+    <cs:fillRef idx="0"/>
+    <cs:effectRef idx="0"/>
+    <cs:fontRef idx="minor">
+      <a:schemeClr val="tx1"/>
+    </cs:fontRef>
+  </cs:plotArea>
+  <cs:plotArea3D mods="allowNoFillOverride allowNoLineOverride">
+    <cs:lnRef idx="0"/>
+    <cs:fillRef idx="0"/>
+    <cs:effectRef idx="0"/>
+    <cs:fontRef idx="minor">
+      <a:schemeClr val="tx1"/>
+    </cs:fontRef>
+  </cs:plotArea3D>
+  <cs:seriesAxis>
+    <cs:lnRef idx="0"/>
+    <cs:fillRef idx="0"/>
+    <cs:effectRef idx="0"/>
+    <cs:fontRef idx="minor">
+      <a:schemeClr val="tx1">
+        <a:lumMod val="65000"/>
+        <a:lumOff val="35000"/>
+      </a:schemeClr>
+    </cs:fontRef>
+    <cs:defRPr sz="900" kern="1200"/>
+  </cs:seriesAxis>
+  <cs:seriesLine>
+    <cs:lnRef idx="0"/>
+    <cs:fillRef idx="0"/>
+    <cs:effectRef idx="0"/>
+    <cs:fontRef idx="minor">
+      <a:schemeClr val="tx1"/>
+    </cs:fontRef>
+    <cs:spPr>
+      <a:ln w="9525" cap="flat" cmpd="sng" algn="ctr">
+        <a:solidFill>
+          <a:schemeClr val="tx1">
+            <a:lumMod val="35000"/>
+            <a:lumOff val="65000"/>
+          </a:schemeClr>
+        </a:solidFill>
+        <a:round/>
+      </a:ln>
+    </cs:spPr>
+  </cs:seriesLine>
+  <cs:title>
+    <cs:lnRef idx="0"/>
+    <cs:fillRef idx="0"/>
+    <cs:effectRef idx="0"/>
+    <cs:fontRef idx="minor">
+      <a:schemeClr val="tx1">
+        <a:lumMod val="65000"/>
+        <a:lumOff val="35000"/>
+      </a:schemeClr>
+    </cs:fontRef>
+    <cs:defRPr sz="1400" b="0" kern="1200" spc="0" baseline="0"/>
+  </cs:title>
+  <cs:trendline>
+    <cs:lnRef idx="0">
+      <cs:styleClr val="auto"/>
+    </cs:lnRef>
+    <cs:fillRef idx="0"/>
+    <cs:effectRef idx="0"/>
+    <cs:fontRef idx="minor">
+      <a:schemeClr val="tx1"/>
+    </cs:fontRef>
+    <cs:spPr>
+      <a:ln w="19050" cap="rnd">
+        <a:solidFill>
+          <a:schemeClr val="phClr"/>
+        </a:solidFill>
+        <a:prstDash val="sysDot"/>
+      </a:ln>
+    </cs:spPr>
+  </cs:trendline>
+  <cs:trendlineLabel>
+    <cs:lnRef idx="0"/>
+    <cs:fillRef idx="0"/>
+    <cs:effectRef idx="0"/>
+    <cs:fontRef idx="minor">
+      <a:schemeClr val="tx1">
+        <a:lumMod val="65000"/>
+        <a:lumOff val="35000"/>
+      </a:schemeClr>
+    </cs:fontRef>
+    <cs:defRPr sz="900" kern="1200"/>
+  </cs:trendlineLabel>
+  <cs:upBar>
+    <cs:lnRef idx="0"/>
+    <cs:fillRef idx="0"/>
+    <cs:effectRef idx="0"/>
+    <cs:fontRef idx="minor">
+      <a:schemeClr val="dk1"/>
+    </cs:fontRef>
+    <cs:spPr>
+      <a:solidFill>
+        <a:schemeClr val="lt1"/>
+      </a:solidFill>
+      <a:ln w="9525">
+        <a:solidFill>
+          <a:schemeClr val="tx1">
+            <a:lumMod val="15000"/>
+            <a:lumOff val="85000"/>
+          </a:schemeClr>
+        </a:solidFill>
+      </a:ln>
+    </cs:spPr>
+  </cs:upBar>
+  <cs:valueAxis>
+    <cs:lnRef idx="0"/>
+    <cs:fillRef idx="0"/>
+    <cs:effectRef idx="0"/>
+    <cs:fontRef idx="minor">
+      <a:schemeClr val="tx1">
+        <a:lumMod val="65000"/>
+        <a:lumOff val="35000"/>
+      </a:schemeClr>
+    </cs:fontRef>
+    <cs:defRPr sz="900" kern="1200"/>
+  </cs:valueAxis>
+  <cs:wall>
+    <cs:lnRef idx="0"/>
+    <cs:fillRef idx="0"/>
+    <cs:effectRef idx="0"/>
+    <cs:fontRef idx="minor">
+      <a:schemeClr val="tx1"/>
+    </cs:fontRef>
+    <cs:spPr>
+      <a:noFill/>
+      <a:ln>
+        <a:noFill/>
+      </a:ln>
+    </cs:spPr>
+  </cs:wall>
+</cs:chartStyle>
+</file>
+
+<file path=ppt/charts/style3.xml><?xml version="1.0" encoding="utf-8"?>
 <cs:chartStyle xmlns:cs="http://schemas.microsoft.com/office/drawing/2012/chartStyle" xmlns:a="http://schemas.openxmlformats.org/drawingml/2006/main" id="215">
   <cs:axisTitle>
     <cs:lnRef idx="0"/>
@@ -2319,7 +3316,7 @@
 </cs:chartStyle>
 </file>
 
-<file path=ppt/charts/style3.xml><?xml version="1.0" encoding="utf-8"?>
+<file path=ppt/charts/style4.xml><?xml version="1.0" encoding="utf-8"?>
 <cs:chartStyle xmlns:cs="http://schemas.microsoft.com/office/drawing/2012/chartStyle" xmlns:a="http://schemas.openxmlformats.org/drawingml/2006/main" id="206">
   <cs:axisTitle>
     <cs:lnRef idx="0"/>
@@ -9349,6 +10346,15 @@
               <a:t>Each strategy tested separately so that one will not interfere with other’s results</a:t>
             </a:r>
           </a:p>
+          <a:p>
+            <a:endParaRPr lang="en-US" dirty="0"/>
+          </a:p>
+          <a:p>
+            <a:r>
+              <a:rPr lang="en-US" dirty="0"/>
+              <a:t>Heatmap will display quadratic growth with increasing board size.</a:t>
+            </a:r>
+          </a:p>
         </p:txBody>
       </p:sp>
     </p:spTree>
@@ -9719,66 +10725,177 @@
                   <a:schemeClr val="bg1"/>
                 </a:solidFill>
               </a:rPr>
-              <a:t>Strafing</a:t>
-            </a:r>
-          </a:p>
-        </p:txBody>
-      </p:sp>
-      <p:sp>
-        <p:nvSpPr>
-          <p:cNvPr id="3" name="Content Placeholder 2">
-            <a:extLst>
-              <a:ext uri="{FF2B5EF4-FFF2-40B4-BE49-F238E27FC236}">
-                <a16:creationId xmlns:a16="http://schemas.microsoft.com/office/drawing/2014/main" id="{10ED26BF-7DC2-497B-BED7-1FE0E40ECD5D}"/>
-              </a:ext>
-            </a:extLst>
-          </p:cNvPr>
-          <p:cNvSpPr>
-            <a:spLocks noGrp="1"/>
-          </p:cNvSpPr>
-          <p:nvPr>
-            <p:ph idx="1"/>
-          </p:nvPr>
-        </p:nvSpPr>
-        <p:spPr>
-          <a:xfrm>
-            <a:off x="643468" y="2638044"/>
-            <a:ext cx="3363974" cy="3415622"/>
-          </a:xfrm>
-        </p:spPr>
-        <p:txBody>
-          <a:bodyPr>
-            <a:normAutofit/>
-          </a:bodyPr>
-          <a:lstStyle/>
-          <a:p>
-            <a:r>
-              <a:rPr lang="en-US" sz="2000" dirty="0">
-                <a:solidFill>
-                  <a:schemeClr val="bg1"/>
-                </a:solidFill>
-              </a:rPr>
-              <a:t>Description: Initially shooting at certain points on the board covering 1/3. Guaranteed to hit all ships except ship of length 2.</a:t>
-            </a:r>
-          </a:p>
-          <a:p>
-            <a:r>
-              <a:rPr lang="en-US" sz="2000" dirty="0">
-                <a:solidFill>
-                  <a:schemeClr val="bg1"/>
-                </a:solidFill>
-              </a:rPr>
-              <a:t>Notable results. Strafing resulted in about 6 fewer turns than only targeting even or odd cells, and about 15 fewer turns than random shooting.</a:t>
-            </a:r>
-          </a:p>
-        </p:txBody>
-      </p:sp>
+              <a:t>Heatmap growth</a:t>
+            </a:r>
+          </a:p>
+        </p:txBody>
+      </p:sp>
+      <mc:AlternateContent xmlns:mc="http://schemas.openxmlformats.org/markup-compatibility/2006">
+        <mc:Choice xmlns:a14="http://schemas.microsoft.com/office/drawing/2010/main" Requires="a14">
+          <p:sp>
+            <p:nvSpPr>
+              <p:cNvPr id="3" name="Content Placeholder 2">
+                <a:extLst>
+                  <a:ext uri="{FF2B5EF4-FFF2-40B4-BE49-F238E27FC236}">
+                    <a16:creationId xmlns:a16="http://schemas.microsoft.com/office/drawing/2014/main" id="{10ED26BF-7DC2-497B-BED7-1FE0E40ECD5D}"/>
+                  </a:ext>
+                </a:extLst>
+              </p:cNvPr>
+              <p:cNvSpPr>
+                <a:spLocks noGrp="1"/>
+              </p:cNvSpPr>
+              <p:nvPr>
+                <p:ph idx="1"/>
+              </p:nvPr>
+            </p:nvSpPr>
+            <p:spPr>
+              <a:xfrm>
+                <a:off x="643468" y="2638044"/>
+                <a:ext cx="3363974" cy="3415622"/>
+              </a:xfrm>
+            </p:spPr>
+            <p:txBody>
+              <a:bodyPr>
+                <a:normAutofit/>
+              </a:bodyPr>
+              <a:lstStyle/>
+              <a:p>
+                <a:r>
+                  <a:rPr lang="en-US" sz="2000" dirty="0">
+                    <a:solidFill>
+                      <a:schemeClr val="bg1"/>
+                    </a:solidFill>
+                  </a:rPr>
+                  <a:t>For each cell, check surrounding cells to left, right, up, and down.</a:t>
+                </a:r>
+              </a:p>
+              <a:p>
+                <a:r>
+                  <a:rPr lang="en-US" sz="2000" dirty="0">
+                    <a:solidFill>
+                      <a:schemeClr val="bg1"/>
+                    </a:solidFill>
+                  </a:rPr>
+                  <a:t>Complexity: O(</a:t>
+                </a:r>
+                <a14:m>
+                  <m:oMath xmlns:m="http://schemas.openxmlformats.org/officeDocument/2006/math">
+                    <m:sSup>
+                      <m:sSupPr>
+                        <m:ctrlPr>
+                          <a:rPr lang="en-US" sz="2000" i="1">
+                            <a:solidFill>
+                              <a:schemeClr val="bg1"/>
+                            </a:solidFill>
+                            <a:latin typeface="Cambria Math" panose="02040503050406030204" pitchFamily="18" charset="0"/>
+                          </a:rPr>
+                        </m:ctrlPr>
+                      </m:sSupPr>
+                      <m:e>
+                        <m:r>
+                          <a:rPr lang="en-US" sz="2000" b="0" i="1">
+                            <a:solidFill>
+                              <a:schemeClr val="bg1"/>
+                            </a:solidFill>
+                            <a:latin typeface="Cambria Math" panose="02040503050406030204" pitchFamily="18" charset="0"/>
+                          </a:rPr>
+                          <m:t>𝑁</m:t>
+                        </m:r>
+                      </m:e>
+                      <m:sup>
+                        <m:r>
+                          <a:rPr lang="en-US" sz="2000" b="0" i="1">
+                            <a:solidFill>
+                              <a:schemeClr val="bg1"/>
+                            </a:solidFill>
+                            <a:latin typeface="Cambria Math" panose="02040503050406030204" pitchFamily="18" charset="0"/>
+                          </a:rPr>
+                          <m:t>2</m:t>
+                        </m:r>
+                      </m:sup>
+                    </m:sSup>
+                  </m:oMath>
+                </a14:m>
+                <a:r>
+                  <a:rPr lang="en-US" sz="2000" i="1" dirty="0">
+                    <a:solidFill>
+                      <a:schemeClr val="bg1"/>
+                    </a:solidFill>
+                  </a:rPr>
+                  <a:t>/L</a:t>
+                </a:r>
+                <a:r>
+                  <a:rPr lang="en-US" sz="2000" dirty="0">
+                    <a:solidFill>
+                      <a:schemeClr val="bg1"/>
+                    </a:solidFill>
+                  </a:rPr>
+                  <a:t>)</a:t>
+                </a:r>
+              </a:p>
+              <a:p>
+                <a:r>
+                  <a:rPr lang="en-US" sz="2000" dirty="0">
+                    <a:solidFill>
+                      <a:schemeClr val="bg1"/>
+                    </a:solidFill>
+                  </a:rPr>
+                  <a:t>Appears to be quadratic</a:t>
+                </a:r>
+              </a:p>
+            </p:txBody>
+          </p:sp>
+        </mc:Choice>
+        <mc:Fallback>
+          <p:sp>
+            <p:nvSpPr>
+              <p:cNvPr id="3" name="Content Placeholder 2">
+                <a:extLst>
+                  <a:ext uri="{FF2B5EF4-FFF2-40B4-BE49-F238E27FC236}">
+                    <a16:creationId xmlns:a16="http://schemas.microsoft.com/office/drawing/2014/main" id="{10ED26BF-7DC2-497B-BED7-1FE0E40ECD5D}"/>
+                  </a:ext>
+                </a:extLst>
+              </p:cNvPr>
+              <p:cNvSpPr>
+                <a:spLocks noGrp="1" noRot="1" noChangeAspect="1" noMove="1" noResize="1" noEditPoints="1" noAdjustHandles="1" noChangeArrowheads="1" noChangeShapeType="1" noTextEdit="1"/>
+              </p:cNvSpPr>
+              <p:nvPr>
+                <p:ph idx="1"/>
+              </p:nvPr>
+            </p:nvSpPr>
+            <p:spPr>
+              <a:xfrm>
+                <a:off x="643468" y="2638044"/>
+                <a:ext cx="3363974" cy="3415622"/>
+              </a:xfrm>
+              <a:blipFill>
+                <a:blip r:embed="rId2"/>
+                <a:stretch>
+                  <a:fillRect l="-1633" t="-1964"/>
+                </a:stretch>
+              </a:blipFill>
+            </p:spPr>
+            <p:txBody>
+              <a:bodyPr/>
+              <a:lstStyle/>
+              <a:p>
+                <a:r>
+                  <a:rPr lang="en-US">
+                    <a:noFill/>
+                  </a:rPr>
+                  <a:t> </a:t>
+                </a:r>
+              </a:p>
+            </p:txBody>
+          </p:sp>
+        </mc:Fallback>
+      </mc:AlternateContent>
       <p:graphicFrame>
         <p:nvGraphicFramePr>
           <p:cNvPr id="6" name="Chart 5">
             <a:extLst>
               <a:ext uri="{FF2B5EF4-FFF2-40B4-BE49-F238E27FC236}">
-                <a16:creationId xmlns:a16="http://schemas.microsoft.com/office/drawing/2014/main" id="{5579ECBC-9690-440F-9578-AB518027AE25}"/>
+                <a16:creationId xmlns:a16="http://schemas.microsoft.com/office/drawing/2014/main" id="{ABFD00CD-36DC-4C8D-A03B-99A5E66E5A09}"/>
               </a:ext>
             </a:extLst>
           </p:cNvPr>
@@ -9786,7 +10903,7 @@
           <p:nvPr>
             <p:extLst>
               <p:ext uri="{D42A27DB-BD31-4B8C-83A1-F6EECF244321}">
-                <p14:modId xmlns:p14="http://schemas.microsoft.com/office/powerpoint/2010/main" val="567552875"/>
+                <p14:modId xmlns:p14="http://schemas.microsoft.com/office/powerpoint/2010/main" val="1556588003"/>
               </p:ext>
             </p:extLst>
           </p:nvPr>
@@ -9797,14 +10914,14 @@
         </p:xfrm>
         <a:graphic>
           <a:graphicData uri="http://schemas.openxmlformats.org/drawingml/2006/chart">
-            <c:chart xmlns:c="http://schemas.openxmlformats.org/drawingml/2006/chart" xmlns:r="http://schemas.openxmlformats.org/officeDocument/2006/relationships" r:id="rId2"/>
+            <c:chart xmlns:c="http://schemas.openxmlformats.org/drawingml/2006/chart" xmlns:r="http://schemas.openxmlformats.org/officeDocument/2006/relationships" r:id="rId3"/>
           </a:graphicData>
         </a:graphic>
       </p:graphicFrame>
     </p:spTree>
     <p:extLst>
       <p:ext uri="{BB962C8B-B14F-4D97-AF65-F5344CB8AC3E}">
-        <p14:creationId xmlns:p14="http://schemas.microsoft.com/office/powerpoint/2010/main" val="518111725"/>
+        <p14:creationId xmlns:p14="http://schemas.microsoft.com/office/powerpoint/2010/main" val="1913345365"/>
       </p:ext>
     </p:extLst>
   </p:cSld>
@@ -9841,7 +10958,7 @@
       </p:grpSpPr>
       <p:sp>
         <p:nvSpPr>
-          <p:cNvPr id="21" name="Rectangle 20">
+          <p:cNvPr id="16" name="Rectangle 15">
             <a:extLst>
               <a:ext uri="{FF2B5EF4-FFF2-40B4-BE49-F238E27FC236}">
                 <a16:creationId xmlns:a16="http://schemas.microsoft.com/office/drawing/2014/main" id="{867D4867-5BA7-4462-B2F6-A23F4A622AA7}"/>
@@ -9944,6 +11061,231 @@
                   <a:schemeClr val="bg1"/>
                 </a:solidFill>
               </a:rPr>
+              <a:t>Strafing</a:t>
+            </a:r>
+          </a:p>
+        </p:txBody>
+      </p:sp>
+      <p:sp>
+        <p:nvSpPr>
+          <p:cNvPr id="3" name="Content Placeholder 2">
+            <a:extLst>
+              <a:ext uri="{FF2B5EF4-FFF2-40B4-BE49-F238E27FC236}">
+                <a16:creationId xmlns:a16="http://schemas.microsoft.com/office/drawing/2014/main" id="{10ED26BF-7DC2-497B-BED7-1FE0E40ECD5D}"/>
+              </a:ext>
+            </a:extLst>
+          </p:cNvPr>
+          <p:cNvSpPr>
+            <a:spLocks noGrp="1"/>
+          </p:cNvSpPr>
+          <p:nvPr>
+            <p:ph idx="1"/>
+          </p:nvPr>
+        </p:nvSpPr>
+        <p:spPr>
+          <a:xfrm>
+            <a:off x="643468" y="2638044"/>
+            <a:ext cx="3363974" cy="3415622"/>
+          </a:xfrm>
+        </p:spPr>
+        <p:txBody>
+          <a:bodyPr>
+            <a:normAutofit/>
+          </a:bodyPr>
+          <a:lstStyle/>
+          <a:p>
+            <a:r>
+              <a:rPr lang="en-US" sz="2000" dirty="0">
+                <a:solidFill>
+                  <a:schemeClr val="bg1"/>
+                </a:solidFill>
+              </a:rPr>
+              <a:t>Description: Initially shooting at certain points on the board covering 1/3. Guaranteed to hit all ships except ship of length 2.</a:t>
+            </a:r>
+          </a:p>
+          <a:p>
+            <a:r>
+              <a:rPr lang="en-US" sz="2000" dirty="0">
+                <a:solidFill>
+                  <a:schemeClr val="bg1"/>
+                </a:solidFill>
+              </a:rPr>
+              <a:t>Notable results. Strafing resulted in about 6 fewer turns than only targeting even or odd cells, and about 15 fewer turns than random shooting.</a:t>
+            </a:r>
+          </a:p>
+        </p:txBody>
+      </p:sp>
+      <p:graphicFrame>
+        <p:nvGraphicFramePr>
+          <p:cNvPr id="6" name="Chart 5">
+            <a:extLst>
+              <a:ext uri="{FF2B5EF4-FFF2-40B4-BE49-F238E27FC236}">
+                <a16:creationId xmlns:a16="http://schemas.microsoft.com/office/drawing/2014/main" id="{5579ECBC-9690-440F-9578-AB518027AE25}"/>
+              </a:ext>
+            </a:extLst>
+          </p:cNvPr>
+          <p:cNvGraphicFramePr/>
+          <p:nvPr>
+            <p:extLst>
+              <p:ext uri="{D42A27DB-BD31-4B8C-83A1-F6EECF244321}">
+                <p14:modId xmlns:p14="http://schemas.microsoft.com/office/powerpoint/2010/main" val="567552875"/>
+              </p:ext>
+            </p:extLst>
+          </p:nvPr>
+        </p:nvGraphicFramePr>
+        <p:xfrm>
+          <a:off x="5297763" y="643467"/>
+          <a:ext cx="6250769" cy="5410199"/>
+        </p:xfrm>
+        <a:graphic>
+          <a:graphicData uri="http://schemas.openxmlformats.org/drawingml/2006/chart">
+            <c:chart xmlns:c="http://schemas.openxmlformats.org/drawingml/2006/chart" xmlns:r="http://schemas.openxmlformats.org/officeDocument/2006/relationships" r:id="rId2"/>
+          </a:graphicData>
+        </a:graphic>
+      </p:graphicFrame>
+    </p:spTree>
+    <p:extLst>
+      <p:ext uri="{BB962C8B-B14F-4D97-AF65-F5344CB8AC3E}">
+        <p14:creationId xmlns:p14="http://schemas.microsoft.com/office/powerpoint/2010/main" val="518111725"/>
+      </p:ext>
+    </p:extLst>
+  </p:cSld>
+  <p:clrMapOvr>
+    <a:masterClrMapping/>
+  </p:clrMapOvr>
+</p:sld>
+</file>
+
+<file path=ppt/slides/slide8.xml><?xml version="1.0" encoding="utf-8"?>
+<p:sld xmlns:a="http://schemas.openxmlformats.org/drawingml/2006/main" xmlns:r="http://schemas.openxmlformats.org/officeDocument/2006/relationships" xmlns:p="http://schemas.openxmlformats.org/presentationml/2006/main">
+  <p:cSld>
+    <p:bg>
+      <p:bgPr>
+        <a:solidFill>
+          <a:schemeClr val="bg1"/>
+        </a:solidFill>
+        <a:effectLst/>
+      </p:bgPr>
+    </p:bg>
+    <p:spTree>
+      <p:nvGrpSpPr>
+        <p:cNvPr id="1" name=""/>
+        <p:cNvGrpSpPr/>
+        <p:nvPr/>
+      </p:nvGrpSpPr>
+      <p:grpSpPr>
+        <a:xfrm>
+          <a:off x="0" y="0"/>
+          <a:ext cx="0" cy="0"/>
+          <a:chOff x="0" y="0"/>
+          <a:chExt cx="0" cy="0"/>
+        </a:xfrm>
+      </p:grpSpPr>
+      <p:sp>
+        <p:nvSpPr>
+          <p:cNvPr id="21" name="Rectangle 20">
+            <a:extLst>
+              <a:ext uri="{FF2B5EF4-FFF2-40B4-BE49-F238E27FC236}">
+                <a16:creationId xmlns:a16="http://schemas.microsoft.com/office/drawing/2014/main" id="{867D4867-5BA7-4462-B2F6-A23F4A622AA7}"/>
+              </a:ext>
+              <a:ext uri="{C183D7F6-B498-43B3-948B-1728B52AA6E4}">
+                <adec:decorative xmlns:adec="http://schemas.microsoft.com/office/drawing/2017/decorative" val="1"/>
+              </a:ext>
+            </a:extLst>
+          </p:cNvPr>
+          <p:cNvSpPr>
+            <a:spLocks noGrp="1" noRot="1" noChangeAspect="1" noMove="1" noResize="1" noEditPoints="1" noAdjustHandles="1" noChangeArrowheads="1" noChangeShapeType="1" noTextEdit="1"/>
+          </p:cNvSpPr>
+          <p:nvPr>
+            <p:extLst>
+              <p:ext uri="{386F3935-93C4-4BCD-93E2-E3B085C9AB24}">
+                <p16:designElem xmlns:p16="http://schemas.microsoft.com/office/powerpoint/2015/main" val="1"/>
+              </p:ext>
+            </p:extLst>
+          </p:nvPr>
+        </p:nvSpPr>
+        <p:spPr>
+          <a:xfrm>
+            <a:off x="0" y="0"/>
+            <a:ext cx="4654296" cy="6858000"/>
+          </a:xfrm>
+          <a:prstGeom prst="rect">
+            <a:avLst/>
+          </a:prstGeom>
+          <a:solidFill>
+            <a:schemeClr val="tx1">
+              <a:lumMod val="75000"/>
+              <a:lumOff val="25000"/>
+            </a:schemeClr>
+          </a:solidFill>
+          <a:ln>
+            <a:noFill/>
+          </a:ln>
+        </p:spPr>
+        <p:style>
+          <a:lnRef idx="0">
+            <a:scrgbClr r="0" g="0" b="0"/>
+          </a:lnRef>
+          <a:fillRef idx="0">
+            <a:scrgbClr r="0" g="0" b="0"/>
+          </a:fillRef>
+          <a:effectRef idx="0">
+            <a:scrgbClr r="0" g="0" b="0"/>
+          </a:effectRef>
+          <a:fontRef idx="minor">
+            <a:schemeClr val="lt1"/>
+          </a:fontRef>
+        </p:style>
+        <p:txBody>
+          <a:bodyPr rtlCol="0" anchor="ctr"/>
+          <a:lstStyle/>
+          <a:p>
+            <a:pPr algn="ctr"/>
+            <a:endParaRPr lang="en-US"/>
+          </a:p>
+        </p:txBody>
+      </p:sp>
+      <p:sp>
+        <p:nvSpPr>
+          <p:cNvPr id="2" name="Title 1">
+            <a:extLst>
+              <a:ext uri="{FF2B5EF4-FFF2-40B4-BE49-F238E27FC236}">
+                <a16:creationId xmlns:a16="http://schemas.microsoft.com/office/drawing/2014/main" id="{43E2FE7B-2476-4537-9A85-39EF900ACB90}"/>
+              </a:ext>
+            </a:extLst>
+          </p:cNvPr>
+          <p:cNvSpPr>
+            <a:spLocks noGrp="1"/>
+          </p:cNvSpPr>
+          <p:nvPr>
+            <p:ph type="title"/>
+          </p:nvPr>
+        </p:nvSpPr>
+        <p:spPr>
+          <a:xfrm>
+            <a:off x="643467" y="643467"/>
+            <a:ext cx="3363974" cy="1597315"/>
+          </a:xfrm>
+          <a:noFill/>
+          <a:ln w="19050">
+            <a:solidFill>
+              <a:schemeClr val="bg1"/>
+            </a:solidFill>
+          </a:ln>
+        </p:spPr>
+        <p:txBody>
+          <a:bodyPr wrap="square">
+            <a:normAutofit/>
+          </a:bodyPr>
+          <a:lstStyle/>
+          <a:p>
+            <a:pPr algn="ctr"/>
+            <a:r>
+              <a:rPr lang="en-US" sz="2800" dirty="0">
+                <a:solidFill>
+                  <a:schemeClr val="bg1"/>
+                </a:solidFill>
+              </a:rPr>
               <a:t>Clustering Logic</a:t>
             </a:r>
           </a:p>
@@ -10040,6 +11382,116 @@
     <p:extLst>
       <p:ext uri="{BB962C8B-B14F-4D97-AF65-F5344CB8AC3E}">
         <p14:creationId xmlns:p14="http://schemas.microsoft.com/office/powerpoint/2010/main" val="2306956037"/>
+      </p:ext>
+    </p:extLst>
+  </p:cSld>
+  <p:clrMapOvr>
+    <a:masterClrMapping/>
+  </p:clrMapOvr>
+</p:sld>
+</file>
+
+<file path=ppt/slides/slide9.xml><?xml version="1.0" encoding="utf-8"?>
+<p:sld xmlns:a="http://schemas.openxmlformats.org/drawingml/2006/main" xmlns:r="http://schemas.openxmlformats.org/officeDocument/2006/relationships" xmlns:p="http://schemas.openxmlformats.org/presentationml/2006/main">
+  <p:cSld>
+    <p:spTree>
+      <p:nvGrpSpPr>
+        <p:cNvPr id="1" name=""/>
+        <p:cNvGrpSpPr/>
+        <p:nvPr/>
+      </p:nvGrpSpPr>
+      <p:grpSpPr>
+        <a:xfrm>
+          <a:off x="0" y="0"/>
+          <a:ext cx="0" cy="0"/>
+          <a:chOff x="0" y="0"/>
+          <a:chExt cx="0" cy="0"/>
+        </a:xfrm>
+      </p:grpSpPr>
+      <p:sp>
+        <p:nvSpPr>
+          <p:cNvPr id="2" name="Title 1">
+            <a:extLst>
+              <a:ext uri="{FF2B5EF4-FFF2-40B4-BE49-F238E27FC236}">
+                <a16:creationId xmlns:a16="http://schemas.microsoft.com/office/drawing/2014/main" id="{08B20695-75B0-452B-A280-2F49D2797F7A}"/>
+              </a:ext>
+            </a:extLst>
+          </p:cNvPr>
+          <p:cNvSpPr>
+            <a:spLocks noGrp="1"/>
+          </p:cNvSpPr>
+          <p:nvPr>
+            <p:ph type="title"/>
+          </p:nvPr>
+        </p:nvSpPr>
+        <p:spPr/>
+        <p:txBody>
+          <a:bodyPr/>
+          <a:lstStyle/>
+          <a:p>
+            <a:r>
+              <a:rPr lang="en-US" dirty="0"/>
+              <a:t>Conclusions</a:t>
+            </a:r>
+          </a:p>
+        </p:txBody>
+      </p:sp>
+      <p:sp>
+        <p:nvSpPr>
+          <p:cNvPr id="3" name="Content Placeholder 2">
+            <a:extLst>
+              <a:ext uri="{FF2B5EF4-FFF2-40B4-BE49-F238E27FC236}">
+                <a16:creationId xmlns:a16="http://schemas.microsoft.com/office/drawing/2014/main" id="{39E5CFE0-BB5D-41B4-82ED-074396C2DAA2}"/>
+              </a:ext>
+            </a:extLst>
+          </p:cNvPr>
+          <p:cNvSpPr>
+            <a:spLocks noGrp="1"/>
+          </p:cNvSpPr>
+          <p:nvPr>
+            <p:ph idx="1"/>
+          </p:nvPr>
+        </p:nvSpPr>
+        <p:spPr/>
+        <p:txBody>
+          <a:bodyPr/>
+          <a:lstStyle/>
+          <a:p>
+            <a:r>
+              <a:rPr lang="en-US" dirty="0"/>
+              <a:t>Heatmap – not very effective</a:t>
+            </a:r>
+          </a:p>
+          <a:p>
+            <a:endParaRPr lang="en-US" dirty="0"/>
+          </a:p>
+          <a:p>
+            <a:r>
+              <a:rPr lang="en-US" dirty="0"/>
+              <a:t>Strafing – significant benefits</a:t>
+            </a:r>
+          </a:p>
+          <a:p>
+            <a:endParaRPr lang="en-US" dirty="0"/>
+          </a:p>
+          <a:p>
+            <a:r>
+              <a:rPr lang="en-US" dirty="0"/>
+              <a:t>Clustering logic – significant benefits</a:t>
+            </a:r>
+          </a:p>
+          <a:p>
+            <a:endParaRPr lang="en-US" dirty="0"/>
+          </a:p>
+          <a:p>
+            <a:endParaRPr lang="en-US" dirty="0"/>
+          </a:p>
+        </p:txBody>
+      </p:sp>
+    </p:spTree>
+    <p:extLst>
+      <p:ext uri="{BB962C8B-B14F-4D97-AF65-F5344CB8AC3E}">
+        <p14:creationId xmlns:p14="http://schemas.microsoft.com/office/powerpoint/2010/main" val="759453827"/>
       </p:ext>
     </p:extLst>
   </p:cSld>

</xml_diff>